<commit_message>
Docs: Edit UiComponentClassDiagram pptx
</commit_message>
<xml_diff>
--- a/docs/diagrams/UiComponentClassDiagram.pptx
+++ b/docs/diagrams/UiComponentClassDiagram.pptx
@@ -208,7 +208,7 @@
           <a:p>
             <a:fld id="{F5CC4B3F-88C1-4FFA-B1B6-F41C21DC6924}" type="datetimeFigureOut">
               <a:rPr lang="en-US" smtClean="0"/>
-              <a:t>25-Sep-18</a:t>
+              <a:t>9/30/18</a:t>
             </a:fld>
             <a:endParaRPr lang="en-US"/>
           </a:p>
@@ -654,7 +654,7 @@
           <a:p>
             <a:fld id="{78C97017-6FC3-485B-9764-EAC9E56C1D49}" type="datetimeFigureOut">
               <a:rPr lang="en-US" smtClean="0"/>
-              <a:t>25-Sep-18</a:t>
+              <a:t>9/30/18</a:t>
             </a:fld>
             <a:endParaRPr lang="en-US"/>
           </a:p>
@@ -822,7 +822,7 @@
           <a:p>
             <a:fld id="{78C97017-6FC3-485B-9764-EAC9E56C1D49}" type="datetimeFigureOut">
               <a:rPr lang="en-US" smtClean="0"/>
-              <a:t>25-Sep-18</a:t>
+              <a:t>9/30/18</a:t>
             </a:fld>
             <a:endParaRPr lang="en-US"/>
           </a:p>
@@ -1000,7 +1000,7 @@
           <a:p>
             <a:fld id="{78C97017-6FC3-485B-9764-EAC9E56C1D49}" type="datetimeFigureOut">
               <a:rPr lang="en-US" smtClean="0"/>
-              <a:t>25-Sep-18</a:t>
+              <a:t>9/30/18</a:t>
             </a:fld>
             <a:endParaRPr lang="en-US"/>
           </a:p>
@@ -1168,7 +1168,7 @@
           <a:p>
             <a:fld id="{78C97017-6FC3-485B-9764-EAC9E56C1D49}" type="datetimeFigureOut">
               <a:rPr lang="en-US" smtClean="0"/>
-              <a:t>25-Sep-18</a:t>
+              <a:t>9/30/18</a:t>
             </a:fld>
             <a:endParaRPr lang="en-US"/>
           </a:p>
@@ -1413,7 +1413,7 @@
           <a:p>
             <a:fld id="{78C97017-6FC3-485B-9764-EAC9E56C1D49}" type="datetimeFigureOut">
               <a:rPr lang="en-US" smtClean="0"/>
-              <a:t>25-Sep-18</a:t>
+              <a:t>9/30/18</a:t>
             </a:fld>
             <a:endParaRPr lang="en-US"/>
           </a:p>
@@ -1698,7 +1698,7 @@
           <a:p>
             <a:fld id="{78C97017-6FC3-485B-9764-EAC9E56C1D49}" type="datetimeFigureOut">
               <a:rPr lang="en-US" smtClean="0"/>
-              <a:t>25-Sep-18</a:t>
+              <a:t>9/30/18</a:t>
             </a:fld>
             <a:endParaRPr lang="en-US"/>
           </a:p>
@@ -2117,7 +2117,7 @@
           <a:p>
             <a:fld id="{78C97017-6FC3-485B-9764-EAC9E56C1D49}" type="datetimeFigureOut">
               <a:rPr lang="en-US" smtClean="0"/>
-              <a:t>25-Sep-18</a:t>
+              <a:t>9/30/18</a:t>
             </a:fld>
             <a:endParaRPr lang="en-US"/>
           </a:p>
@@ -2234,7 +2234,7 @@
           <a:p>
             <a:fld id="{78C97017-6FC3-485B-9764-EAC9E56C1D49}" type="datetimeFigureOut">
               <a:rPr lang="en-US" smtClean="0"/>
-              <a:t>25-Sep-18</a:t>
+              <a:t>9/30/18</a:t>
             </a:fld>
             <a:endParaRPr lang="en-US"/>
           </a:p>
@@ -2329,7 +2329,7 @@
           <a:p>
             <a:fld id="{78C97017-6FC3-485B-9764-EAC9E56C1D49}" type="datetimeFigureOut">
               <a:rPr lang="en-US" smtClean="0"/>
-              <a:t>25-Sep-18</a:t>
+              <a:t>9/30/18</a:t>
             </a:fld>
             <a:endParaRPr lang="en-US"/>
           </a:p>
@@ -2604,7 +2604,7 @@
           <a:p>
             <a:fld id="{78C97017-6FC3-485B-9764-EAC9E56C1D49}" type="datetimeFigureOut">
               <a:rPr lang="en-US" smtClean="0"/>
-              <a:t>25-Sep-18</a:t>
+              <a:t>9/30/18</a:t>
             </a:fld>
             <a:endParaRPr lang="en-US"/>
           </a:p>
@@ -2856,7 +2856,7 @@
           <a:p>
             <a:fld id="{78C97017-6FC3-485B-9764-EAC9E56C1D49}" type="datetimeFigureOut">
               <a:rPr lang="en-US" smtClean="0"/>
-              <a:t>25-Sep-18</a:t>
+              <a:t>9/30/18</a:t>
             </a:fld>
             <a:endParaRPr lang="en-US"/>
           </a:p>
@@ -3067,7 +3067,7 @@
           <a:p>
             <a:fld id="{78C97017-6FC3-485B-9764-EAC9E56C1D49}" type="datetimeFigureOut">
               <a:rPr lang="en-US" smtClean="0"/>
-              <a:t>25-Sep-18</a:t>
+              <a:t>9/30/18</a:t>
             </a:fld>
             <a:endParaRPr lang="en-US"/>
           </a:p>
@@ -3886,7 +3886,7 @@
         <p:spPr>
           <a:xfrm>
             <a:off x="2592528" y="3649359"/>
-            <a:ext cx="1093635" cy="236841"/>
+            <a:ext cx="1192712" cy="236841"/>
           </a:xfrm>
           <a:prstGeom prst="rect">
             <a:avLst/>
@@ -3918,14 +3918,24 @@
           <a:p>
             <a:pPr algn="ctr"/>
             <a:r>
-              <a:rPr lang="en-US" sz="1050" b="1" dirty="0" err="1">
+              <a:rPr lang="en-US" sz="1050" b="1" smtClean="0">
                 <a:solidFill>
                   <a:schemeClr val="accent3">
                     <a:lumMod val="75000"/>
                   </a:schemeClr>
                 </a:solidFill>
               </a:rPr>
-              <a:t>BrowserPanel</a:t>
+              <a:t>WishDetail</a:t>
+            </a:r>
+            <a:r>
+              <a:rPr lang="en-US" sz="1050" b="1" smtClean="0">
+                <a:solidFill>
+                  <a:schemeClr val="accent3">
+                    <a:lumMod val="75000"/>
+                  </a:schemeClr>
+                </a:solidFill>
+              </a:rPr>
+              <a:t>Panel</a:t>
             </a:r>
             <a:endParaRPr lang="en-SG" sz="1050" b="1" dirty="0">
               <a:solidFill>
@@ -4661,8 +4671,8 @@
         </p:nvCxnSpPr>
         <p:spPr>
           <a:xfrm rot="5400000">
-            <a:off x="3867176" y="2104987"/>
-            <a:ext cx="1481780" cy="1843806"/>
+            <a:off x="3916715" y="2154526"/>
+            <a:ext cx="1481780" cy="1744729"/>
           </a:xfrm>
           <a:prstGeom prst="bentConnector2">
             <a:avLst/>

</xml_diff>

<commit_message>
docs/diagrams/UiComponentClassDiagram.pptx & docs/imagesUiClassDiagram.png: - Replace PersonListPanel with EventListPanel - Replace PersonCard with EventCard
docs/images/LogicClassDiagram.png: Resize image
</commit_message>
<xml_diff>
--- a/docs/diagrams/UiComponentClassDiagram.pptx
+++ b/docs/diagrams/UiComponentClassDiagram.pptx
@@ -208,7 +208,7 @@
           <a:p>
             <a:fld id="{F5CC4B3F-88C1-4FFA-B1B6-F41C21DC6924}" type="datetimeFigureOut">
               <a:rPr lang="en-US" smtClean="0"/>
-              <a:t>1/7/2017</a:t>
+              <a:t>10/24/2018</a:t>
             </a:fld>
             <a:endParaRPr lang="en-US"/>
           </a:p>
@@ -654,7 +654,7 @@
           <a:p>
             <a:fld id="{78C97017-6FC3-485B-9764-EAC9E56C1D49}" type="datetimeFigureOut">
               <a:rPr lang="en-US" smtClean="0"/>
-              <a:t>1/7/2017</a:t>
+              <a:t>10/24/2018</a:t>
             </a:fld>
             <a:endParaRPr lang="en-US"/>
           </a:p>
@@ -822,7 +822,7 @@
           <a:p>
             <a:fld id="{78C97017-6FC3-485B-9764-EAC9E56C1D49}" type="datetimeFigureOut">
               <a:rPr lang="en-US" smtClean="0"/>
-              <a:t>1/7/2017</a:t>
+              <a:t>10/24/2018</a:t>
             </a:fld>
             <a:endParaRPr lang="en-US"/>
           </a:p>
@@ -1000,7 +1000,7 @@
           <a:p>
             <a:fld id="{78C97017-6FC3-485B-9764-EAC9E56C1D49}" type="datetimeFigureOut">
               <a:rPr lang="en-US" smtClean="0"/>
-              <a:t>1/7/2017</a:t>
+              <a:t>10/24/2018</a:t>
             </a:fld>
             <a:endParaRPr lang="en-US"/>
           </a:p>
@@ -1168,7 +1168,7 @@
           <a:p>
             <a:fld id="{78C97017-6FC3-485B-9764-EAC9E56C1D49}" type="datetimeFigureOut">
               <a:rPr lang="en-US" smtClean="0"/>
-              <a:t>1/7/2017</a:t>
+              <a:t>10/24/2018</a:t>
             </a:fld>
             <a:endParaRPr lang="en-US"/>
           </a:p>
@@ -1413,7 +1413,7 @@
           <a:p>
             <a:fld id="{78C97017-6FC3-485B-9764-EAC9E56C1D49}" type="datetimeFigureOut">
               <a:rPr lang="en-US" smtClean="0"/>
-              <a:t>1/7/2017</a:t>
+              <a:t>10/24/2018</a:t>
             </a:fld>
             <a:endParaRPr lang="en-US"/>
           </a:p>
@@ -1698,7 +1698,7 @@
           <a:p>
             <a:fld id="{78C97017-6FC3-485B-9764-EAC9E56C1D49}" type="datetimeFigureOut">
               <a:rPr lang="en-US" smtClean="0"/>
-              <a:t>1/7/2017</a:t>
+              <a:t>10/24/2018</a:t>
             </a:fld>
             <a:endParaRPr lang="en-US"/>
           </a:p>
@@ -2117,7 +2117,7 @@
           <a:p>
             <a:fld id="{78C97017-6FC3-485B-9764-EAC9E56C1D49}" type="datetimeFigureOut">
               <a:rPr lang="en-US" smtClean="0"/>
-              <a:t>1/7/2017</a:t>
+              <a:t>10/24/2018</a:t>
             </a:fld>
             <a:endParaRPr lang="en-US"/>
           </a:p>
@@ -2234,7 +2234,7 @@
           <a:p>
             <a:fld id="{78C97017-6FC3-485B-9764-EAC9E56C1D49}" type="datetimeFigureOut">
               <a:rPr lang="en-US" smtClean="0"/>
-              <a:t>1/7/2017</a:t>
+              <a:t>10/24/2018</a:t>
             </a:fld>
             <a:endParaRPr lang="en-US"/>
           </a:p>
@@ -2329,7 +2329,7 @@
           <a:p>
             <a:fld id="{78C97017-6FC3-485B-9764-EAC9E56C1D49}" type="datetimeFigureOut">
               <a:rPr lang="en-US" smtClean="0"/>
-              <a:t>1/7/2017</a:t>
+              <a:t>10/24/2018</a:t>
             </a:fld>
             <a:endParaRPr lang="en-US"/>
           </a:p>
@@ -2604,7 +2604,7 @@
           <a:p>
             <a:fld id="{78C97017-6FC3-485B-9764-EAC9E56C1D49}" type="datetimeFigureOut">
               <a:rPr lang="en-US" smtClean="0"/>
-              <a:t>1/7/2017</a:t>
+              <a:t>10/24/2018</a:t>
             </a:fld>
             <a:endParaRPr lang="en-US"/>
           </a:p>
@@ -2856,7 +2856,7 @@
           <a:p>
             <a:fld id="{78C97017-6FC3-485B-9764-EAC9E56C1D49}" type="datetimeFigureOut">
               <a:rPr lang="en-US" smtClean="0"/>
-              <a:t>1/7/2017</a:t>
+              <a:t>10/24/2018</a:t>
             </a:fld>
             <a:endParaRPr lang="en-US"/>
           </a:p>
@@ -3067,7 +3067,7 @@
           <a:p>
             <a:fld id="{78C97017-6FC3-485B-9764-EAC9E56C1D49}" type="datetimeFigureOut">
               <a:rPr lang="en-US" smtClean="0"/>
-              <a:t>1/7/2017</a:t>
+              <a:t>10/24/2018</a:t>
             </a:fld>
             <a:endParaRPr lang="en-US"/>
           </a:p>
@@ -4045,7 +4045,7 @@
                   </a:schemeClr>
                 </a:solidFill>
               </a:rPr>
-              <a:t>PersonListPanel</a:t>
+              <a:t>EventListPanel</a:t>
             </a:r>
             <a:endParaRPr lang="en-SG" sz="1050" b="1" dirty="0">
               <a:solidFill>
@@ -4105,7 +4105,7 @@
                   </a:schemeClr>
                 </a:solidFill>
               </a:rPr>
-              <a:t>PersonCard</a:t>
+              <a:t>EventCard</a:t>
             </a:r>
             <a:endParaRPr lang="en-SG" sz="1050" b="1" dirty="0">
               <a:solidFill>

</xml_diff>

<commit_message>
Finish updating personal contributions and add new UI class diagram
</commit_message>
<xml_diff>
--- a/docs/diagrams/UiComponentClassDiagram.pptx
+++ b/docs/diagrams/UiComponentClassDiagram.pptx
@@ -208,7 +208,7 @@
           <a:p>
             <a:fld id="{F5CC4B3F-88C1-4FFA-B1B6-F41C21DC6924}" type="datetimeFigureOut">
               <a:rPr lang="en-US" smtClean="0"/>
-              <a:t>1/7/2017</a:t>
+              <a:t>10/30/18</a:t>
             </a:fld>
             <a:endParaRPr lang="en-US"/>
           </a:p>
@@ -654,7 +654,7 @@
           <a:p>
             <a:fld id="{78C97017-6FC3-485B-9764-EAC9E56C1D49}" type="datetimeFigureOut">
               <a:rPr lang="en-US" smtClean="0"/>
-              <a:t>1/7/2017</a:t>
+              <a:t>10/30/18</a:t>
             </a:fld>
             <a:endParaRPr lang="en-US"/>
           </a:p>
@@ -822,7 +822,7 @@
           <a:p>
             <a:fld id="{78C97017-6FC3-485B-9764-EAC9E56C1D49}" type="datetimeFigureOut">
               <a:rPr lang="en-US" smtClean="0"/>
-              <a:t>1/7/2017</a:t>
+              <a:t>10/30/18</a:t>
             </a:fld>
             <a:endParaRPr lang="en-US"/>
           </a:p>
@@ -1000,7 +1000,7 @@
           <a:p>
             <a:fld id="{78C97017-6FC3-485B-9764-EAC9E56C1D49}" type="datetimeFigureOut">
               <a:rPr lang="en-US" smtClean="0"/>
-              <a:t>1/7/2017</a:t>
+              <a:t>10/30/18</a:t>
             </a:fld>
             <a:endParaRPr lang="en-US"/>
           </a:p>
@@ -1168,7 +1168,7 @@
           <a:p>
             <a:fld id="{78C97017-6FC3-485B-9764-EAC9E56C1D49}" type="datetimeFigureOut">
               <a:rPr lang="en-US" smtClean="0"/>
-              <a:t>1/7/2017</a:t>
+              <a:t>10/30/18</a:t>
             </a:fld>
             <a:endParaRPr lang="en-US"/>
           </a:p>
@@ -1413,7 +1413,7 @@
           <a:p>
             <a:fld id="{78C97017-6FC3-485B-9764-EAC9E56C1D49}" type="datetimeFigureOut">
               <a:rPr lang="en-US" smtClean="0"/>
-              <a:t>1/7/2017</a:t>
+              <a:t>10/30/18</a:t>
             </a:fld>
             <a:endParaRPr lang="en-US"/>
           </a:p>
@@ -1698,7 +1698,7 @@
           <a:p>
             <a:fld id="{78C97017-6FC3-485B-9764-EAC9E56C1D49}" type="datetimeFigureOut">
               <a:rPr lang="en-US" smtClean="0"/>
-              <a:t>1/7/2017</a:t>
+              <a:t>10/30/18</a:t>
             </a:fld>
             <a:endParaRPr lang="en-US"/>
           </a:p>
@@ -2117,7 +2117,7 @@
           <a:p>
             <a:fld id="{78C97017-6FC3-485B-9764-EAC9E56C1D49}" type="datetimeFigureOut">
               <a:rPr lang="en-US" smtClean="0"/>
-              <a:t>1/7/2017</a:t>
+              <a:t>10/30/18</a:t>
             </a:fld>
             <a:endParaRPr lang="en-US"/>
           </a:p>
@@ -2234,7 +2234,7 @@
           <a:p>
             <a:fld id="{78C97017-6FC3-485B-9764-EAC9E56C1D49}" type="datetimeFigureOut">
               <a:rPr lang="en-US" smtClean="0"/>
-              <a:t>1/7/2017</a:t>
+              <a:t>10/30/18</a:t>
             </a:fld>
             <a:endParaRPr lang="en-US"/>
           </a:p>
@@ -2329,7 +2329,7 @@
           <a:p>
             <a:fld id="{78C97017-6FC3-485B-9764-EAC9E56C1D49}" type="datetimeFigureOut">
               <a:rPr lang="en-US" smtClean="0"/>
-              <a:t>1/7/2017</a:t>
+              <a:t>10/30/18</a:t>
             </a:fld>
             <a:endParaRPr lang="en-US"/>
           </a:p>
@@ -2604,7 +2604,7 @@
           <a:p>
             <a:fld id="{78C97017-6FC3-485B-9764-EAC9E56C1D49}" type="datetimeFigureOut">
               <a:rPr lang="en-US" smtClean="0"/>
-              <a:t>1/7/2017</a:t>
+              <a:t>10/30/18</a:t>
             </a:fld>
             <a:endParaRPr lang="en-US"/>
           </a:p>
@@ -2856,7 +2856,7 @@
           <a:p>
             <a:fld id="{78C97017-6FC3-485B-9764-EAC9E56C1D49}" type="datetimeFigureOut">
               <a:rPr lang="en-US" smtClean="0"/>
-              <a:t>1/7/2017</a:t>
+              <a:t>10/30/18</a:t>
             </a:fld>
             <a:endParaRPr lang="en-US"/>
           </a:p>
@@ -3067,7 +3067,7 @@
           <a:p>
             <a:fld id="{78C97017-6FC3-485B-9764-EAC9E56C1D49}" type="datetimeFigureOut">
               <a:rPr lang="en-US" smtClean="0"/>
-              <a:t>1/7/2017</a:t>
+              <a:t>10/30/18</a:t>
             </a:fld>
             <a:endParaRPr lang="en-US"/>
           </a:p>
@@ -3450,8 +3450,8 @@
         </p:nvSpPr>
         <p:spPr>
           <a:xfrm>
-            <a:off x="1217465" y="1447800"/>
-            <a:ext cx="4917083" cy="3962400"/>
+            <a:off x="261686" y="1240866"/>
+            <a:ext cx="6527431" cy="5583487"/>
           </a:xfrm>
           <a:prstGeom prst="roundRect">
             <a:avLst>
@@ -3572,8 +3572,8 @@
         </p:nvSpPr>
         <p:spPr>
           <a:xfrm>
-            <a:off x="2592528" y="2971800"/>
-            <a:ext cx="1093635" cy="236841"/>
+            <a:off x="2592528" y="3694348"/>
+            <a:ext cx="1246794" cy="229041"/>
           </a:xfrm>
           <a:prstGeom prst="rect">
             <a:avLst/>
@@ -3777,13 +3777,15 @@
       <p:cxnSp>
         <p:nvCxnSpPr>
           <p:cNvPr id="19" name="Elbow Connector 122"/>
-          <p:cNvCxnSpPr/>
+          <p:cNvCxnSpPr>
+            <a:cxnSpLocks/>
+          </p:cNvCxnSpPr>
           <p:nvPr/>
         </p:nvCxnSpPr>
         <p:spPr>
-          <a:xfrm flipV="1">
-            <a:off x="644735" y="2991937"/>
-            <a:ext cx="684904" cy="1"/>
+          <a:xfrm>
+            <a:off x="113961" y="2646796"/>
+            <a:ext cx="504653" cy="1"/>
           </a:xfrm>
           <a:prstGeom prst="bentConnector3">
             <a:avLst>
@@ -3825,7 +3827,7 @@
         </p:nvSpPr>
         <p:spPr>
           <a:xfrm rot="16200000">
-            <a:off x="5703829" y="2464877"/>
+            <a:off x="6132749" y="2449040"/>
             <a:ext cx="2362201" cy="328045"/>
           </a:xfrm>
           <a:prstGeom prst="roundRect">
@@ -3885,8 +3887,8 @@
         </p:nvSpPr>
         <p:spPr>
           <a:xfrm>
-            <a:off x="2592528" y="3649359"/>
-            <a:ext cx="1093635" cy="236841"/>
+            <a:off x="2592528" y="4371907"/>
+            <a:ext cx="1232228" cy="235781"/>
           </a:xfrm>
           <a:prstGeom prst="rect">
             <a:avLst/>
@@ -3945,8 +3947,8 @@
         </p:nvSpPr>
         <p:spPr>
           <a:xfrm>
-            <a:off x="2592527" y="4563759"/>
-            <a:ext cx="1093635" cy="236841"/>
+            <a:off x="2560873" y="6182017"/>
+            <a:ext cx="1232229" cy="230877"/>
           </a:xfrm>
           <a:prstGeom prst="rect">
             <a:avLst/>
@@ -4005,8 +4007,8 @@
         </p:nvSpPr>
         <p:spPr>
           <a:xfrm>
-            <a:off x="2592526" y="3991960"/>
-            <a:ext cx="1093635" cy="236841"/>
+            <a:off x="2592526" y="4714509"/>
+            <a:ext cx="1232231" cy="229174"/>
           </a:xfrm>
           <a:prstGeom prst="rect">
             <a:avLst/>
@@ -4065,7 +4067,7 @@
         </p:nvSpPr>
         <p:spPr>
           <a:xfrm>
-            <a:off x="3839323" y="4228801"/>
+            <a:off x="4216894" y="4951349"/>
             <a:ext cx="1040906" cy="236841"/>
           </a:xfrm>
           <a:prstGeom prst="rect">
@@ -4125,8 +4127,8 @@
         </p:nvSpPr>
         <p:spPr>
           <a:xfrm>
-            <a:off x="2592528" y="4966000"/>
-            <a:ext cx="1093635" cy="236841"/>
+            <a:off x="2570362" y="6485567"/>
+            <a:ext cx="1232228" cy="240949"/>
           </a:xfrm>
           <a:prstGeom prst="rect">
             <a:avLst/>
@@ -4185,7 +4187,7 @@
         </p:nvSpPr>
         <p:spPr>
           <a:xfrm>
-            <a:off x="2324548" y="2706452"/>
+            <a:off x="1905241" y="2484492"/>
             <a:ext cx="183156" cy="161573"/>
           </a:xfrm>
           <a:prstGeom prst="flowChartDecision">
@@ -4229,6 +4231,7 @@
         <p:nvCxnSpPr>
           <p:cNvPr id="40" name="Elbow Connector 63"/>
           <p:cNvCxnSpPr>
+            <a:cxnSpLocks/>
             <a:stCxn id="39" idx="2"/>
             <a:endCxn id="3" idx="1"/>
           </p:cNvCxnSpPr>
@@ -4236,8 +4239,8 @@
         </p:nvCxnSpPr>
         <p:spPr>
           <a:xfrm rot="16200000" flipH="1">
-            <a:off x="2393229" y="2890922"/>
-            <a:ext cx="222196" cy="176402"/>
+            <a:off x="1713271" y="2929612"/>
+            <a:ext cx="1162804" cy="595709"/>
           </a:xfrm>
           <a:prstGeom prst="bentConnector2">
             <a:avLst/>
@@ -4274,8 +4277,8 @@
         </p:nvSpPr>
         <p:spPr>
           <a:xfrm>
-            <a:off x="2590799" y="3304308"/>
-            <a:ext cx="1095361" cy="236841"/>
+            <a:off x="2590799" y="4032610"/>
+            <a:ext cx="1248524" cy="213212"/>
           </a:xfrm>
           <a:prstGeom prst="rect">
             <a:avLst/>
@@ -4330,6 +4333,7 @@
         <p:nvCxnSpPr>
           <p:cNvPr id="44" name="Elbow Connector 63"/>
           <p:cNvCxnSpPr>
+            <a:cxnSpLocks/>
             <a:stCxn id="39" idx="2"/>
             <a:endCxn id="34" idx="1"/>
           </p:cNvCxnSpPr>
@@ -4337,8 +4341,8 @@
         </p:nvCxnSpPr>
         <p:spPr>
           <a:xfrm rot="16200000" flipH="1">
-            <a:off x="2054450" y="3229701"/>
-            <a:ext cx="899755" cy="176402"/>
+            <a:off x="1372807" y="3270076"/>
+            <a:ext cx="1843733" cy="595709"/>
           </a:xfrm>
           <a:prstGeom prst="bentConnector2">
             <a:avLst/>
@@ -4371,6 +4375,7 @@
         <p:nvCxnSpPr>
           <p:cNvPr id="47" name="Elbow Connector 63"/>
           <p:cNvCxnSpPr>
+            <a:cxnSpLocks/>
             <a:stCxn id="39" idx="2"/>
             <a:endCxn id="36" idx="1"/>
           </p:cNvCxnSpPr>
@@ -4378,8 +4383,8 @@
         </p:nvCxnSpPr>
         <p:spPr>
           <a:xfrm rot="16200000" flipH="1">
-            <a:off x="1883148" y="3401003"/>
-            <a:ext cx="1242356" cy="176400"/>
+            <a:off x="1203157" y="3439726"/>
+            <a:ext cx="2183031" cy="595707"/>
           </a:xfrm>
           <a:prstGeom prst="bentConnector2">
             <a:avLst/>
@@ -4412,6 +4417,7 @@
         <p:nvCxnSpPr>
           <p:cNvPr id="50" name="Elbow Connector 63"/>
           <p:cNvCxnSpPr>
+            <a:cxnSpLocks/>
             <a:stCxn id="39" idx="2"/>
             <a:endCxn id="35" idx="1"/>
           </p:cNvCxnSpPr>
@@ -4419,48 +4425,8 @@
         </p:nvCxnSpPr>
         <p:spPr>
           <a:xfrm rot="16200000" flipH="1">
-            <a:off x="1597249" y="3686901"/>
-            <a:ext cx="1814155" cy="176401"/>
-          </a:xfrm>
-          <a:prstGeom prst="bentConnector2">
-            <a:avLst/>
-          </a:prstGeom>
-          <a:ln w="19050">
-            <a:solidFill>
-              <a:schemeClr val="accent3"/>
-            </a:solidFill>
-            <a:headEnd type="none" w="med" len="med"/>
-            <a:tailEnd type="arrow" w="med" len="med"/>
-          </a:ln>
-          <a:effectLst/>
-        </p:spPr>
-        <p:style>
-          <a:lnRef idx="1">
-            <a:schemeClr val="accent2"/>
-          </a:lnRef>
-          <a:fillRef idx="2">
-            <a:schemeClr val="accent2"/>
-          </a:fillRef>
-          <a:effectRef idx="1">
-            <a:schemeClr val="accent2"/>
-          </a:effectRef>
-          <a:fontRef idx="minor">
-            <a:schemeClr val="dk1"/>
-          </a:fontRef>
-        </p:style>
-      </p:cxnSp>
-      <p:cxnSp>
-        <p:nvCxnSpPr>
-          <p:cNvPr id="53" name="Elbow Connector 63"/>
-          <p:cNvCxnSpPr>
-            <a:endCxn id="38" idx="1"/>
-          </p:cNvCxnSpPr>
-          <p:nvPr/>
-        </p:nvCxnSpPr>
-        <p:spPr>
-          <a:xfrm rot="16200000" flipH="1">
-            <a:off x="1184119" y="3676012"/>
-            <a:ext cx="2396440" cy="420377"/>
+            <a:off x="453151" y="4189733"/>
+            <a:ext cx="3651391" cy="564054"/>
           </a:xfrm>
           <a:prstGeom prst="bentConnector2">
             <a:avLst/>
@@ -4572,6 +4538,7 @@
         <p:nvCxnSpPr>
           <p:cNvPr id="74" name="Elbow Connector 63"/>
           <p:cNvCxnSpPr>
+            <a:cxnSpLocks/>
             <a:stCxn id="43" idx="3"/>
             <a:endCxn id="16" idx="3"/>
           </p:cNvCxnSpPr>
@@ -4579,8 +4546,8 @@
         </p:nvCxnSpPr>
         <p:spPr>
           <a:xfrm flipV="1">
-            <a:off x="3686160" y="2286000"/>
-            <a:ext cx="1843809" cy="1136729"/>
+            <a:off x="3839323" y="2286000"/>
+            <a:ext cx="1690646" cy="1853216"/>
           </a:xfrm>
           <a:prstGeom prst="bentConnector2">
             <a:avLst/>
@@ -4620,8 +4587,8 @@
         </p:nvCxnSpPr>
         <p:spPr>
           <a:xfrm rot="5400000">
-            <a:off x="4174488" y="2991741"/>
-            <a:ext cx="2061222" cy="649740"/>
+            <a:off x="4002000" y="3541801"/>
+            <a:ext cx="2783770" cy="272169"/>
           </a:xfrm>
           <a:prstGeom prst="bentConnector2">
             <a:avLst/>
@@ -4654,6 +4621,7 @@
         <p:nvCxnSpPr>
           <p:cNvPr id="82" name="Elbow Connector 63"/>
           <p:cNvCxnSpPr>
+            <a:cxnSpLocks/>
             <a:stCxn id="16" idx="3"/>
             <a:endCxn id="34" idx="3"/>
           </p:cNvCxnSpPr>
@@ -4661,8 +4629,8 @@
         </p:nvCxnSpPr>
         <p:spPr>
           <a:xfrm rot="5400000">
-            <a:off x="3867176" y="2104987"/>
-            <a:ext cx="1481780" cy="1843806"/>
+            <a:off x="3575464" y="2535293"/>
+            <a:ext cx="2203798" cy="1705213"/>
           </a:xfrm>
           <a:prstGeom prst="bentConnector2">
             <a:avLst/>
@@ -4736,6 +4704,7 @@
         <p:nvCxnSpPr>
           <p:cNvPr id="91" name="Elbow Connector 63"/>
           <p:cNvCxnSpPr>
+            <a:cxnSpLocks/>
             <a:stCxn id="16" idx="3"/>
             <a:endCxn id="35" idx="3"/>
           </p:cNvCxnSpPr>
@@ -4743,8 +4712,8 @@
         </p:nvCxnSpPr>
         <p:spPr>
           <a:xfrm rot="5400000">
-            <a:off x="3409976" y="2562187"/>
-            <a:ext cx="2396180" cy="1843807"/>
+            <a:off x="2655808" y="3423295"/>
+            <a:ext cx="4011456" cy="1736867"/>
           </a:xfrm>
           <a:prstGeom prst="bentConnector2">
             <a:avLst/>
@@ -4777,6 +4746,7 @@
         <p:nvCxnSpPr>
           <p:cNvPr id="94" name="Elbow Connector 63"/>
           <p:cNvCxnSpPr>
+            <a:cxnSpLocks/>
             <a:stCxn id="16" idx="3"/>
             <a:endCxn id="38" idx="3"/>
           </p:cNvCxnSpPr>
@@ -4784,8 +4754,8 @@
         </p:nvCxnSpPr>
         <p:spPr>
           <a:xfrm rot="5400000">
-            <a:off x="3208856" y="2763307"/>
-            <a:ext cx="2798421" cy="1843806"/>
+            <a:off x="2506259" y="3582332"/>
+            <a:ext cx="4320042" cy="1727379"/>
           </a:xfrm>
           <a:prstGeom prst="bentConnector2">
             <a:avLst/>
@@ -4818,14 +4788,15 @@
         <p:nvCxnSpPr>
           <p:cNvPr id="107" name="Elbow Connector 106"/>
           <p:cNvCxnSpPr>
+            <a:cxnSpLocks/>
             <a:stCxn id="9" idx="0"/>
           </p:cNvCxnSpPr>
           <p:nvPr/>
         </p:nvCxnSpPr>
         <p:spPr>
           <a:xfrm rot="5400000" flipH="1" flipV="1">
-            <a:off x="4594921" y="-355061"/>
-            <a:ext cx="170724" cy="4081246"/>
+            <a:off x="4771772" y="-531912"/>
+            <a:ext cx="170724" cy="4434948"/>
           </a:xfrm>
           <a:prstGeom prst="bentConnector2">
             <a:avLst/>
@@ -4863,7 +4834,7 @@
         </p:nvSpPr>
         <p:spPr>
           <a:xfrm rot="16200000">
-            <a:off x="6213739" y="4560376"/>
+            <a:off x="6627330" y="5495142"/>
             <a:ext cx="1371599" cy="328045"/>
           </a:xfrm>
           <a:prstGeom prst="roundRect">
@@ -4922,8 +4893,8 @@
           <p:nvPr/>
         </p:nvSpPr>
         <p:spPr>
-          <a:xfrm rot="16200000">
-            <a:off x="956202" y="2861202"/>
+          <a:xfrm>
+            <a:off x="674344" y="2484492"/>
             <a:ext cx="1093635" cy="346760"/>
           </a:xfrm>
           <a:prstGeom prst="rect">
@@ -5037,6 +5008,7 @@
         <p:nvCxnSpPr>
           <p:cNvPr id="121" name="Elbow Connector 63"/>
           <p:cNvCxnSpPr>
+            <a:cxnSpLocks/>
             <a:stCxn id="9" idx="1"/>
             <a:endCxn id="120" idx="3"/>
           </p:cNvCxnSpPr>
@@ -5077,17 +5049,60 @@
       </p:cxnSp>
       <p:cxnSp>
         <p:nvCxnSpPr>
-          <p:cNvPr id="131" name="Elbow Connector 130"/>
+          <p:cNvPr id="132" name="Elbow Connector 63"/>
           <p:cNvCxnSpPr>
-            <a:stCxn id="39" idx="2"/>
-            <a:endCxn id="43" idx="1"/>
+            <a:cxnSpLocks/>
+            <a:stCxn id="16" idx="3"/>
+            <a:endCxn id="3" idx="3"/>
           </p:cNvCxnSpPr>
           <p:nvPr/>
         </p:nvCxnSpPr>
         <p:spPr>
+          <a:xfrm rot="5400000">
+            <a:off x="3923212" y="2202111"/>
+            <a:ext cx="1522869" cy="1690647"/>
+          </a:xfrm>
+          <a:prstGeom prst="bentConnector2">
+            <a:avLst/>
+          </a:prstGeom>
+          <a:ln w="6350">
+            <a:solidFill>
+              <a:schemeClr val="accent3"/>
+            </a:solidFill>
+            <a:headEnd type="none" w="med" len="med"/>
+            <a:tailEnd type="none" w="med" len="med"/>
+          </a:ln>
+          <a:effectLst/>
+        </p:spPr>
+        <p:style>
+          <a:lnRef idx="1">
+            <a:schemeClr val="accent2"/>
+          </a:lnRef>
+          <a:fillRef idx="2">
+            <a:schemeClr val="accent2"/>
+          </a:fillRef>
+          <a:effectRef idx="1">
+            <a:schemeClr val="accent2"/>
+          </a:effectRef>
+          <a:fontRef idx="minor">
+            <a:schemeClr val="dk1"/>
+          </a:fontRef>
+        </p:style>
+      </p:cxnSp>
+      <p:cxnSp>
+        <p:nvCxnSpPr>
+          <p:cNvPr id="137" name="Elbow Connector 136"/>
+          <p:cNvCxnSpPr>
+            <a:cxnSpLocks/>
+            <a:stCxn id="36" idx="2"/>
+            <a:endCxn id="37" idx="1"/>
+          </p:cNvCxnSpPr>
+          <p:nvPr/>
+        </p:nvCxnSpPr>
+        <p:spPr>
           <a:xfrm rot="16200000" flipH="1">
-            <a:off x="2226110" y="3058040"/>
-            <a:ext cx="554704" cy="174673"/>
+            <a:off x="3649725" y="4502600"/>
+            <a:ext cx="126087" cy="1008252"/>
           </a:xfrm>
           <a:prstGeom prst="bentConnector2">
             <a:avLst/>
@@ -5118,90 +5133,9 @@
       </p:cxnSp>
       <p:cxnSp>
         <p:nvCxnSpPr>
-          <p:cNvPr id="132" name="Elbow Connector 63"/>
-          <p:cNvCxnSpPr>
-            <a:stCxn id="16" idx="3"/>
-            <a:endCxn id="3" idx="3"/>
-          </p:cNvCxnSpPr>
-          <p:nvPr/>
-        </p:nvCxnSpPr>
-        <p:spPr>
-          <a:xfrm rot="5400000">
-            <a:off x="4205956" y="1766207"/>
-            <a:ext cx="804221" cy="1843806"/>
-          </a:xfrm>
-          <a:prstGeom prst="bentConnector2">
-            <a:avLst/>
-          </a:prstGeom>
-          <a:ln w="6350">
-            <a:solidFill>
-              <a:schemeClr val="accent3"/>
-            </a:solidFill>
-            <a:headEnd type="none" w="med" len="med"/>
-            <a:tailEnd type="none" w="med" len="med"/>
-          </a:ln>
-          <a:effectLst/>
-        </p:spPr>
-        <p:style>
-          <a:lnRef idx="1">
-            <a:schemeClr val="accent2"/>
-          </a:lnRef>
-          <a:fillRef idx="2">
-            <a:schemeClr val="accent2"/>
-          </a:fillRef>
-          <a:effectRef idx="1">
-            <a:schemeClr val="accent2"/>
-          </a:effectRef>
-          <a:fontRef idx="minor">
-            <a:schemeClr val="dk1"/>
-          </a:fontRef>
-        </p:style>
-      </p:cxnSp>
-      <p:cxnSp>
-        <p:nvCxnSpPr>
-          <p:cNvPr id="137" name="Elbow Connector 136"/>
-          <p:cNvCxnSpPr>
-            <a:stCxn id="36" idx="2"/>
-            <a:endCxn id="37" idx="1"/>
-          </p:cNvCxnSpPr>
-          <p:nvPr/>
-        </p:nvCxnSpPr>
-        <p:spPr>
-          <a:xfrm rot="16200000" flipH="1">
-            <a:off x="3430123" y="3938021"/>
-            <a:ext cx="118421" cy="699979"/>
-          </a:xfrm>
-          <a:prstGeom prst="bentConnector2">
-            <a:avLst/>
-          </a:prstGeom>
-          <a:ln w="19050">
-            <a:solidFill>
-              <a:schemeClr val="accent3"/>
-            </a:solidFill>
-            <a:headEnd type="none" w="med" len="med"/>
-            <a:tailEnd type="arrow" w="med" len="med"/>
-          </a:ln>
-          <a:effectLst/>
-        </p:spPr>
-        <p:style>
-          <a:lnRef idx="1">
-            <a:schemeClr val="accent2"/>
-          </a:lnRef>
-          <a:fillRef idx="2">
-            <a:schemeClr val="accent2"/>
-          </a:fillRef>
-          <a:effectRef idx="1">
-            <a:schemeClr val="accent2"/>
-          </a:effectRef>
-          <a:fontRef idx="minor">
-            <a:schemeClr val="dk1"/>
-          </a:fontRef>
-        </p:style>
-      </p:cxnSp>
-      <p:cxnSp>
-        <p:nvCxnSpPr>
           <p:cNvPr id="140" name="Elbow Connector 63"/>
           <p:cNvCxnSpPr>
+            <a:cxnSpLocks/>
             <a:stCxn id="16" idx="3"/>
             <a:endCxn id="36" idx="3"/>
           </p:cNvCxnSpPr>
@@ -5209,8 +5143,8 @@
         </p:nvCxnSpPr>
         <p:spPr>
           <a:xfrm rot="5400000">
-            <a:off x="3695875" y="2276286"/>
-            <a:ext cx="1824381" cy="1843808"/>
+            <a:off x="3405815" y="2704942"/>
+            <a:ext cx="2543096" cy="1705212"/>
           </a:xfrm>
           <a:prstGeom prst="bentConnector2">
             <a:avLst/>
@@ -5300,8 +5234,8 @@
         </p:nvSpPr>
         <p:spPr>
           <a:xfrm>
-            <a:off x="3687515" y="2828802"/>
-            <a:ext cx="3048000" cy="203200"/>
+            <a:off x="3493732" y="3474410"/>
+            <a:ext cx="3580875" cy="225060"/>
           </a:xfrm>
           <a:custGeom>
             <a:avLst/>
@@ -5435,7 +5369,1284 @@
         </p:nvSpPr>
         <p:spPr>
           <a:xfrm flipV="1">
-            <a:off x="4114799" y="4472708"/>
+            <a:off x="4497424" y="5214424"/>
+            <a:ext cx="2642195" cy="101600"/>
+          </a:xfrm>
+          <a:custGeom>
+            <a:avLst/>
+            <a:gdLst>
+              <a:gd name="connsiteX0" fmla="*/ 0 w 3048000"/>
+              <a:gd name="connsiteY0" fmla="*/ 203200 h 203200"/>
+              <a:gd name="connsiteX1" fmla="*/ 221673 w 3048000"/>
+              <a:gd name="connsiteY1" fmla="*/ 0 h 203200"/>
+              <a:gd name="connsiteX2" fmla="*/ 3048000 w 3048000"/>
+              <a:gd name="connsiteY2" fmla="*/ 0 h 203200"/>
+            </a:gdLst>
+            <a:ahLst/>
+            <a:cxnLst>
+              <a:cxn ang="0">
+                <a:pos x="connsiteX0" y="connsiteY0"/>
+              </a:cxn>
+              <a:cxn ang="0">
+                <a:pos x="connsiteX1" y="connsiteY1"/>
+              </a:cxn>
+              <a:cxn ang="0">
+                <a:pos x="connsiteX2" y="connsiteY2"/>
+              </a:cxn>
+            </a:cxnLst>
+            <a:rect l="l" t="t" r="r" b="b"/>
+            <a:pathLst>
+              <a:path w="3048000" h="203200">
+                <a:moveTo>
+                  <a:pt x="0" y="203200"/>
+                </a:moveTo>
+                <a:lnTo>
+                  <a:pt x="221673" y="0"/>
+                </a:lnTo>
+                <a:lnTo>
+                  <a:pt x="3048000" y="0"/>
+                </a:lnTo>
+              </a:path>
+            </a:pathLst>
+          </a:custGeom>
+          <a:noFill/>
+          <a:ln w="19050">
+            <a:solidFill>
+              <a:schemeClr val="accent3"/>
+            </a:solidFill>
+            <a:prstDash val="sysDot"/>
+            <a:headEnd type="none" w="med" len="med"/>
+            <a:tailEnd type="arrow" w="med" len="med"/>
+          </a:ln>
+          <a:effectLst/>
+        </p:spPr>
+        <p:style>
+          <a:lnRef idx="1">
+            <a:schemeClr val="accent2"/>
+          </a:lnRef>
+          <a:fillRef idx="2">
+            <a:schemeClr val="accent2"/>
+          </a:fillRef>
+          <a:effectRef idx="1">
+            <a:schemeClr val="accent2"/>
+          </a:effectRef>
+          <a:fontRef idx="minor">
+            <a:schemeClr val="dk1"/>
+          </a:fontRef>
+        </p:style>
+        <p:txBody>
+          <a:bodyPr rtlCol="0" anchor="ctr"/>
+          <a:lstStyle/>
+          <a:p>
+            <a:pPr algn="ctr"/>
+            <a:endParaRPr lang="en-SG"/>
+          </a:p>
+        </p:txBody>
+      </p:sp>
+      <p:sp>
+        <p:nvSpPr>
+          <p:cNvPr id="45" name="Triangle 44">
+            <a:extLst>
+              <a:ext uri="{FF2B5EF4-FFF2-40B4-BE49-F238E27FC236}">
+                <a16:creationId xmlns:a16="http://schemas.microsoft.com/office/drawing/2014/main" id="{00806EAF-F9A5-B74E-B4A5-DBFE3202FAEC}"/>
+              </a:ext>
+            </a:extLst>
+          </p:cNvPr>
+          <p:cNvSpPr/>
+          <p:nvPr/>
+        </p:nvSpPr>
+        <p:spPr>
+          <a:xfrm>
+            <a:off x="2525359" y="2675134"/>
+            <a:ext cx="228600" cy="152400"/>
+          </a:xfrm>
+          <a:prstGeom prst="triangle">
+            <a:avLst/>
+          </a:prstGeom>
+        </p:spPr>
+        <p:style>
+          <a:lnRef idx="2">
+            <a:schemeClr val="accent3">
+              <a:shade val="50000"/>
+            </a:schemeClr>
+          </a:lnRef>
+          <a:fillRef idx="1">
+            <a:schemeClr val="accent3"/>
+          </a:fillRef>
+          <a:effectRef idx="0">
+            <a:schemeClr val="accent3"/>
+          </a:effectRef>
+          <a:fontRef idx="minor">
+            <a:schemeClr val="lt1"/>
+          </a:fontRef>
+        </p:style>
+        <p:txBody>
+          <a:bodyPr rtlCol="0" anchor="ctr"/>
+          <a:lstStyle/>
+          <a:p>
+            <a:pPr algn="ctr"/>
+            <a:endParaRPr lang="en-US" dirty="0"/>
+          </a:p>
+        </p:txBody>
+      </p:sp>
+      <p:sp>
+        <p:nvSpPr>
+          <p:cNvPr id="46" name="Rectangle 8">
+            <a:extLst>
+              <a:ext uri="{FF2B5EF4-FFF2-40B4-BE49-F238E27FC236}">
+                <a16:creationId xmlns:a16="http://schemas.microsoft.com/office/drawing/2014/main" id="{DB1F0DBE-5ACB-D044-8F38-A93C305794F2}"/>
+              </a:ext>
+            </a:extLst>
+          </p:cNvPr>
+          <p:cNvSpPr/>
+          <p:nvPr/>
+        </p:nvSpPr>
+        <p:spPr>
+          <a:xfrm>
+            <a:off x="508240" y="3099273"/>
+            <a:ext cx="1093635" cy="346760"/>
+          </a:xfrm>
+          <a:prstGeom prst="rect">
+            <a:avLst/>
+          </a:prstGeom>
+          <a:ln w="19050">
+            <a:solidFill>
+              <a:schemeClr val="accent3"/>
+            </a:solidFill>
+          </a:ln>
+          <a:effectLst/>
+        </p:spPr>
+        <p:style>
+          <a:lnRef idx="1">
+            <a:schemeClr val="accent3"/>
+          </a:lnRef>
+          <a:fillRef idx="2">
+            <a:schemeClr val="accent3"/>
+          </a:fillRef>
+          <a:effectRef idx="1">
+            <a:schemeClr val="accent3"/>
+          </a:effectRef>
+          <a:fontRef idx="minor">
+            <a:schemeClr val="dk1"/>
+          </a:fontRef>
+        </p:style>
+        <p:txBody>
+          <a:bodyPr rtlCol="0" anchor="ctr"/>
+          <a:lstStyle/>
+          <a:p>
+            <a:pPr algn="ctr"/>
+            <a:r>
+              <a:rPr lang="en-US" sz="1050" b="1" dirty="0" err="1">
+                <a:solidFill>
+                  <a:schemeClr val="accent3">
+                    <a:lumMod val="75000"/>
+                  </a:schemeClr>
+                </a:solidFill>
+              </a:rPr>
+              <a:t>PersonWindow</a:t>
+            </a:r>
+            <a:endParaRPr lang="en-SG" sz="1050" b="1" dirty="0">
+              <a:solidFill>
+                <a:schemeClr val="accent3">
+                  <a:lumMod val="75000"/>
+                </a:schemeClr>
+              </a:solidFill>
+            </a:endParaRPr>
+          </a:p>
+        </p:txBody>
+      </p:sp>
+      <p:sp>
+        <p:nvSpPr>
+          <p:cNvPr id="48" name="Rectangle 8">
+            <a:extLst>
+              <a:ext uri="{FF2B5EF4-FFF2-40B4-BE49-F238E27FC236}">
+                <a16:creationId xmlns:a16="http://schemas.microsoft.com/office/drawing/2014/main" id="{684A3CF4-8CB9-BE4C-B93D-1609323C81D4}"/>
+              </a:ext>
+            </a:extLst>
+          </p:cNvPr>
+          <p:cNvSpPr/>
+          <p:nvPr/>
+        </p:nvSpPr>
+        <p:spPr>
+          <a:xfrm>
+            <a:off x="2092841" y="3098007"/>
+            <a:ext cx="1093635" cy="346760"/>
+          </a:xfrm>
+          <a:prstGeom prst="rect">
+            <a:avLst/>
+          </a:prstGeom>
+          <a:ln w="19050">
+            <a:solidFill>
+              <a:schemeClr val="accent3"/>
+            </a:solidFill>
+          </a:ln>
+          <a:effectLst/>
+        </p:spPr>
+        <p:style>
+          <a:lnRef idx="1">
+            <a:schemeClr val="accent3"/>
+          </a:lnRef>
+          <a:fillRef idx="2">
+            <a:schemeClr val="accent3"/>
+          </a:fillRef>
+          <a:effectRef idx="1">
+            <a:schemeClr val="accent3"/>
+          </a:effectRef>
+          <a:fontRef idx="minor">
+            <a:schemeClr val="dk1"/>
+          </a:fontRef>
+        </p:style>
+        <p:txBody>
+          <a:bodyPr rtlCol="0" anchor="ctr"/>
+          <a:lstStyle/>
+          <a:p>
+            <a:pPr algn="ctr"/>
+            <a:r>
+              <a:rPr lang="en-US" sz="1050" b="1" dirty="0" err="1">
+                <a:solidFill>
+                  <a:schemeClr val="accent3">
+                    <a:lumMod val="75000"/>
+                  </a:schemeClr>
+                </a:solidFill>
+              </a:rPr>
+              <a:t>ModuleWindow</a:t>
+            </a:r>
+            <a:endParaRPr lang="en-SG" sz="1050" b="1" dirty="0">
+              <a:solidFill>
+                <a:schemeClr val="accent3">
+                  <a:lumMod val="75000"/>
+                </a:schemeClr>
+              </a:solidFill>
+            </a:endParaRPr>
+          </a:p>
+        </p:txBody>
+      </p:sp>
+      <p:sp>
+        <p:nvSpPr>
+          <p:cNvPr id="49" name="Rectangle 8">
+            <a:extLst>
+              <a:ext uri="{FF2B5EF4-FFF2-40B4-BE49-F238E27FC236}">
+                <a16:creationId xmlns:a16="http://schemas.microsoft.com/office/drawing/2014/main" id="{2B81743B-960A-E84A-A619-081F66D2BF4C}"/>
+              </a:ext>
+            </a:extLst>
+          </p:cNvPr>
+          <p:cNvSpPr/>
+          <p:nvPr/>
+        </p:nvSpPr>
+        <p:spPr>
+          <a:xfrm>
+            <a:off x="3261886" y="3086723"/>
+            <a:ext cx="1235538" cy="346760"/>
+          </a:xfrm>
+          <a:prstGeom prst="rect">
+            <a:avLst/>
+          </a:prstGeom>
+          <a:ln w="19050">
+            <a:solidFill>
+              <a:schemeClr val="accent3"/>
+            </a:solidFill>
+          </a:ln>
+          <a:effectLst/>
+        </p:spPr>
+        <p:style>
+          <a:lnRef idx="1">
+            <a:schemeClr val="accent3"/>
+          </a:lnRef>
+          <a:fillRef idx="2">
+            <a:schemeClr val="accent3"/>
+          </a:fillRef>
+          <a:effectRef idx="1">
+            <a:schemeClr val="accent3"/>
+          </a:effectRef>
+          <a:fontRef idx="minor">
+            <a:schemeClr val="dk1"/>
+          </a:fontRef>
+        </p:style>
+        <p:txBody>
+          <a:bodyPr rtlCol="0" anchor="ctr"/>
+          <a:lstStyle/>
+          <a:p>
+            <a:pPr algn="ctr"/>
+            <a:r>
+              <a:rPr lang="en-US" sz="1050" b="1" dirty="0" err="1">
+                <a:solidFill>
+                  <a:schemeClr val="accent3">
+                    <a:lumMod val="75000"/>
+                  </a:schemeClr>
+                </a:solidFill>
+              </a:rPr>
+              <a:t>OccasionWindow</a:t>
+            </a:r>
+            <a:endParaRPr lang="en-SG" sz="1050" b="1" dirty="0">
+              <a:solidFill>
+                <a:schemeClr val="accent3">
+                  <a:lumMod val="75000"/>
+                </a:schemeClr>
+              </a:solidFill>
+            </a:endParaRPr>
+          </a:p>
+        </p:txBody>
+      </p:sp>
+      <p:cxnSp>
+        <p:nvCxnSpPr>
+          <p:cNvPr id="61" name="Elbow Connector 63">
+            <a:extLst>
+              <a:ext uri="{FF2B5EF4-FFF2-40B4-BE49-F238E27FC236}">
+                <a16:creationId xmlns:a16="http://schemas.microsoft.com/office/drawing/2014/main" id="{11706DB7-7D0D-4E46-B938-AECDDE709E8F}"/>
+              </a:ext>
+            </a:extLst>
+          </p:cNvPr>
+          <p:cNvCxnSpPr>
+            <a:cxnSpLocks/>
+          </p:cNvCxnSpPr>
+          <p:nvPr/>
+        </p:nvCxnSpPr>
+        <p:spPr>
+          <a:xfrm flipV="1">
+            <a:off x="2631436" y="2970487"/>
+            <a:ext cx="1193321" cy="4918"/>
+          </a:xfrm>
+          <a:prstGeom prst="bentConnector3">
+            <a:avLst>
+              <a:gd name="adj1" fmla="val 50000"/>
+            </a:avLst>
+          </a:prstGeom>
+          <a:ln w="6350">
+            <a:solidFill>
+              <a:schemeClr val="accent3"/>
+            </a:solidFill>
+            <a:headEnd type="none" w="med" len="med"/>
+            <a:tailEnd type="none" w="med" len="med"/>
+          </a:ln>
+          <a:effectLst/>
+        </p:spPr>
+        <p:style>
+          <a:lnRef idx="1">
+            <a:schemeClr val="accent2"/>
+          </a:lnRef>
+          <a:fillRef idx="2">
+            <a:schemeClr val="accent2"/>
+          </a:fillRef>
+          <a:effectRef idx="1">
+            <a:schemeClr val="accent2"/>
+          </a:effectRef>
+          <a:fontRef idx="minor">
+            <a:schemeClr val="dk1"/>
+          </a:fontRef>
+        </p:style>
+      </p:cxnSp>
+      <p:cxnSp>
+        <p:nvCxnSpPr>
+          <p:cNvPr id="63" name="Elbow Connector 63">
+            <a:extLst>
+              <a:ext uri="{FF2B5EF4-FFF2-40B4-BE49-F238E27FC236}">
+                <a16:creationId xmlns:a16="http://schemas.microsoft.com/office/drawing/2014/main" id="{C8E83A05-68B9-5445-A4EE-57278049C966}"/>
+              </a:ext>
+            </a:extLst>
+          </p:cNvPr>
+          <p:cNvCxnSpPr>
+            <a:cxnSpLocks/>
+          </p:cNvCxnSpPr>
+          <p:nvPr/>
+        </p:nvCxnSpPr>
+        <p:spPr>
+          <a:xfrm>
+            <a:off x="987187" y="2967259"/>
+            <a:ext cx="1644249" cy="4541"/>
+          </a:xfrm>
+          <a:prstGeom prst="bentConnector3">
+            <a:avLst>
+              <a:gd name="adj1" fmla="val 50000"/>
+            </a:avLst>
+          </a:prstGeom>
+          <a:ln w="6350">
+            <a:solidFill>
+              <a:schemeClr val="accent3"/>
+            </a:solidFill>
+            <a:headEnd type="none" w="med" len="med"/>
+            <a:tailEnd type="none" w="med" len="med"/>
+          </a:ln>
+          <a:effectLst/>
+        </p:spPr>
+        <p:style>
+          <a:lnRef idx="1">
+            <a:schemeClr val="accent2"/>
+          </a:lnRef>
+          <a:fillRef idx="2">
+            <a:schemeClr val="accent2"/>
+          </a:fillRef>
+          <a:effectRef idx="1">
+            <a:schemeClr val="accent2"/>
+          </a:effectRef>
+          <a:fontRef idx="minor">
+            <a:schemeClr val="dk1"/>
+          </a:fontRef>
+        </p:style>
+      </p:cxnSp>
+      <p:cxnSp>
+        <p:nvCxnSpPr>
+          <p:cNvPr id="41" name="Straight Connector 40">
+            <a:extLst>
+              <a:ext uri="{FF2B5EF4-FFF2-40B4-BE49-F238E27FC236}">
+                <a16:creationId xmlns:a16="http://schemas.microsoft.com/office/drawing/2014/main" id="{5079BC55-419E-3D45-A266-3205609F8818}"/>
+              </a:ext>
+            </a:extLst>
+          </p:cNvPr>
+          <p:cNvCxnSpPr>
+            <a:stCxn id="45" idx="3"/>
+            <a:endCxn id="48" idx="0"/>
+          </p:cNvCxnSpPr>
+          <p:nvPr/>
+        </p:nvCxnSpPr>
+        <p:spPr>
+          <a:xfrm>
+            <a:off x="2639659" y="2827534"/>
+            <a:ext cx="0" cy="270473"/>
+          </a:xfrm>
+          <a:prstGeom prst="line">
+            <a:avLst/>
+          </a:prstGeom>
+          <a:ln>
+            <a:solidFill>
+              <a:schemeClr val="accent3"/>
+            </a:solidFill>
+          </a:ln>
+        </p:spPr>
+        <p:style>
+          <a:lnRef idx="1">
+            <a:schemeClr val="accent1"/>
+          </a:lnRef>
+          <a:fillRef idx="0">
+            <a:schemeClr val="accent1"/>
+          </a:fillRef>
+          <a:effectRef idx="0">
+            <a:schemeClr val="accent1"/>
+          </a:effectRef>
+          <a:fontRef idx="minor">
+            <a:schemeClr val="tx1"/>
+          </a:fontRef>
+        </p:style>
+      </p:cxnSp>
+      <p:cxnSp>
+        <p:nvCxnSpPr>
+          <p:cNvPr id="55" name="Straight Connector 54">
+            <a:extLst>
+              <a:ext uri="{FF2B5EF4-FFF2-40B4-BE49-F238E27FC236}">
+                <a16:creationId xmlns:a16="http://schemas.microsoft.com/office/drawing/2014/main" id="{898951A6-FD4B-0740-B5DB-13C03A0E3BD5}"/>
+              </a:ext>
+            </a:extLst>
+          </p:cNvPr>
+          <p:cNvCxnSpPr/>
+          <p:nvPr/>
+        </p:nvCxnSpPr>
+        <p:spPr>
+          <a:xfrm>
+            <a:off x="3824757" y="2970487"/>
+            <a:ext cx="0" cy="127520"/>
+          </a:xfrm>
+          <a:prstGeom prst="line">
+            <a:avLst/>
+          </a:prstGeom>
+          <a:ln w="6350">
+            <a:solidFill>
+              <a:schemeClr val="accent3"/>
+            </a:solidFill>
+          </a:ln>
+        </p:spPr>
+        <p:style>
+          <a:lnRef idx="1">
+            <a:schemeClr val="accent1"/>
+          </a:lnRef>
+          <a:fillRef idx="0">
+            <a:schemeClr val="accent1"/>
+          </a:fillRef>
+          <a:effectRef idx="0">
+            <a:schemeClr val="accent1"/>
+          </a:effectRef>
+          <a:fontRef idx="minor">
+            <a:schemeClr val="tx1"/>
+          </a:fontRef>
+        </p:style>
+      </p:cxnSp>
+      <p:cxnSp>
+        <p:nvCxnSpPr>
+          <p:cNvPr id="79" name="Straight Connector 78">
+            <a:extLst>
+              <a:ext uri="{FF2B5EF4-FFF2-40B4-BE49-F238E27FC236}">
+                <a16:creationId xmlns:a16="http://schemas.microsoft.com/office/drawing/2014/main" id="{5AA8A194-A151-C64E-B8FA-C23A6A4CD5DB}"/>
+              </a:ext>
+            </a:extLst>
+          </p:cNvPr>
+          <p:cNvCxnSpPr/>
+          <p:nvPr/>
+        </p:nvCxnSpPr>
+        <p:spPr>
+          <a:xfrm>
+            <a:off x="990600" y="2971800"/>
+            <a:ext cx="0" cy="127520"/>
+          </a:xfrm>
+          <a:prstGeom prst="line">
+            <a:avLst/>
+          </a:prstGeom>
+          <a:ln w="6350">
+            <a:solidFill>
+              <a:schemeClr val="accent3"/>
+            </a:solidFill>
+          </a:ln>
+        </p:spPr>
+        <p:style>
+          <a:lnRef idx="1">
+            <a:schemeClr val="accent1"/>
+          </a:lnRef>
+          <a:fillRef idx="0">
+            <a:schemeClr val="accent1"/>
+          </a:fillRef>
+          <a:effectRef idx="0">
+            <a:schemeClr val="accent1"/>
+          </a:effectRef>
+          <a:fontRef idx="minor">
+            <a:schemeClr val="tx1"/>
+          </a:fontRef>
+        </p:style>
+      </p:cxnSp>
+      <p:sp>
+        <p:nvSpPr>
+          <p:cNvPr id="80" name="Rectangle 11">
+            <a:extLst>
+              <a:ext uri="{FF2B5EF4-FFF2-40B4-BE49-F238E27FC236}">
+                <a16:creationId xmlns:a16="http://schemas.microsoft.com/office/drawing/2014/main" id="{30EB05E3-1734-1A41-BC15-474E59749641}"/>
+              </a:ext>
+            </a:extLst>
+          </p:cNvPr>
+          <p:cNvSpPr/>
+          <p:nvPr/>
+        </p:nvSpPr>
+        <p:spPr>
+          <a:xfrm>
+            <a:off x="2604672" y="5202793"/>
+            <a:ext cx="1234649" cy="219512"/>
+          </a:xfrm>
+          <a:prstGeom prst="rect">
+            <a:avLst/>
+          </a:prstGeom>
+          <a:ln w="19050">
+            <a:solidFill>
+              <a:schemeClr val="accent3"/>
+            </a:solidFill>
+          </a:ln>
+          <a:effectLst/>
+        </p:spPr>
+        <p:style>
+          <a:lnRef idx="1">
+            <a:schemeClr val="accent3"/>
+          </a:lnRef>
+          <a:fillRef idx="2">
+            <a:schemeClr val="accent3"/>
+          </a:fillRef>
+          <a:effectRef idx="1">
+            <a:schemeClr val="accent3"/>
+          </a:effectRef>
+          <a:fontRef idx="minor">
+            <a:schemeClr val="dk1"/>
+          </a:fontRef>
+        </p:style>
+        <p:txBody>
+          <a:bodyPr rtlCol="0" anchor="ctr"/>
+          <a:lstStyle/>
+          <a:p>
+            <a:pPr algn="ctr"/>
+            <a:r>
+              <a:rPr lang="en-US" sz="1050" b="1" dirty="0" err="1">
+                <a:solidFill>
+                  <a:schemeClr val="accent3">
+                    <a:lumMod val="75000"/>
+                  </a:schemeClr>
+                </a:solidFill>
+              </a:rPr>
+              <a:t>ModuleListPanel</a:t>
+            </a:r>
+            <a:endParaRPr lang="en-SG" sz="1050" b="1" dirty="0">
+              <a:solidFill>
+                <a:schemeClr val="accent3">
+                  <a:lumMod val="75000"/>
+                </a:schemeClr>
+              </a:solidFill>
+            </a:endParaRPr>
+          </a:p>
+        </p:txBody>
+      </p:sp>
+      <p:sp>
+        <p:nvSpPr>
+          <p:cNvPr id="81" name="Rectangle 11">
+            <a:extLst>
+              <a:ext uri="{FF2B5EF4-FFF2-40B4-BE49-F238E27FC236}">
+                <a16:creationId xmlns:a16="http://schemas.microsoft.com/office/drawing/2014/main" id="{D2CD4904-379B-D247-960D-BDDBE8788432}"/>
+              </a:ext>
+            </a:extLst>
+          </p:cNvPr>
+          <p:cNvSpPr/>
+          <p:nvPr/>
+        </p:nvSpPr>
+        <p:spPr>
+          <a:xfrm>
+            <a:off x="2607571" y="5613203"/>
+            <a:ext cx="1215402" cy="246279"/>
+          </a:xfrm>
+          <a:prstGeom prst="rect">
+            <a:avLst/>
+          </a:prstGeom>
+          <a:ln w="19050">
+            <a:solidFill>
+              <a:schemeClr val="accent3"/>
+            </a:solidFill>
+          </a:ln>
+          <a:effectLst/>
+        </p:spPr>
+        <p:style>
+          <a:lnRef idx="1">
+            <a:schemeClr val="accent3"/>
+          </a:lnRef>
+          <a:fillRef idx="2">
+            <a:schemeClr val="accent3"/>
+          </a:fillRef>
+          <a:effectRef idx="1">
+            <a:schemeClr val="accent3"/>
+          </a:effectRef>
+          <a:fontRef idx="minor">
+            <a:schemeClr val="dk1"/>
+          </a:fontRef>
+        </p:style>
+        <p:txBody>
+          <a:bodyPr rtlCol="0" anchor="ctr"/>
+          <a:lstStyle/>
+          <a:p>
+            <a:pPr algn="ctr"/>
+            <a:r>
+              <a:rPr lang="en-US" sz="1050" b="1" dirty="0" err="1">
+                <a:solidFill>
+                  <a:schemeClr val="accent3">
+                    <a:lumMod val="75000"/>
+                  </a:schemeClr>
+                </a:solidFill>
+              </a:rPr>
+              <a:t>OccasionListPanel</a:t>
+            </a:r>
+            <a:endParaRPr lang="en-SG" sz="1050" b="1" dirty="0">
+              <a:solidFill>
+                <a:schemeClr val="accent3">
+                  <a:lumMod val="75000"/>
+                </a:schemeClr>
+              </a:solidFill>
+            </a:endParaRPr>
+          </a:p>
+        </p:txBody>
+      </p:sp>
+      <p:cxnSp>
+        <p:nvCxnSpPr>
+          <p:cNvPr id="115" name="Elbow Connector 63">
+            <a:extLst>
+              <a:ext uri="{FF2B5EF4-FFF2-40B4-BE49-F238E27FC236}">
+                <a16:creationId xmlns:a16="http://schemas.microsoft.com/office/drawing/2014/main" id="{D545C9CF-2D65-0941-A314-0AB43DFD51EF}"/>
+              </a:ext>
+            </a:extLst>
+          </p:cNvPr>
+          <p:cNvCxnSpPr>
+            <a:cxnSpLocks/>
+          </p:cNvCxnSpPr>
+          <p:nvPr/>
+        </p:nvCxnSpPr>
+        <p:spPr>
+          <a:xfrm rot="16200000" flipH="1">
+            <a:off x="1713173" y="3276585"/>
+            <a:ext cx="1162804" cy="595709"/>
+          </a:xfrm>
+          <a:prstGeom prst="bentConnector2">
+            <a:avLst/>
+          </a:prstGeom>
+          <a:ln w="19050">
+            <a:solidFill>
+              <a:schemeClr val="accent3"/>
+            </a:solidFill>
+            <a:headEnd type="none" w="med" len="med"/>
+            <a:tailEnd type="arrow" w="med" len="med"/>
+          </a:ln>
+          <a:effectLst/>
+        </p:spPr>
+        <p:style>
+          <a:lnRef idx="1">
+            <a:schemeClr val="accent2"/>
+          </a:lnRef>
+          <a:fillRef idx="2">
+            <a:schemeClr val="accent2"/>
+          </a:fillRef>
+          <a:effectRef idx="1">
+            <a:schemeClr val="accent2"/>
+          </a:effectRef>
+          <a:fontRef idx="minor">
+            <a:schemeClr val="dk1"/>
+          </a:fontRef>
+        </p:style>
+      </p:cxnSp>
+      <p:cxnSp>
+        <p:nvCxnSpPr>
+          <p:cNvPr id="122" name="Elbow Connector 63">
+            <a:extLst>
+              <a:ext uri="{FF2B5EF4-FFF2-40B4-BE49-F238E27FC236}">
+                <a16:creationId xmlns:a16="http://schemas.microsoft.com/office/drawing/2014/main" id="{95B09A2D-7584-894A-ACAF-E304CEFB3676}"/>
+              </a:ext>
+            </a:extLst>
+          </p:cNvPr>
+          <p:cNvCxnSpPr>
+            <a:cxnSpLocks/>
+          </p:cNvCxnSpPr>
+          <p:nvPr/>
+        </p:nvCxnSpPr>
+        <p:spPr>
+          <a:xfrm rot="16200000" flipH="1">
+            <a:off x="1714229" y="4437399"/>
+            <a:ext cx="1162804" cy="595709"/>
+          </a:xfrm>
+          <a:prstGeom prst="bentConnector2">
+            <a:avLst/>
+          </a:prstGeom>
+          <a:ln w="19050">
+            <a:solidFill>
+              <a:schemeClr val="accent3"/>
+            </a:solidFill>
+            <a:headEnd type="none" w="med" len="med"/>
+            <a:tailEnd type="arrow" w="med" len="med"/>
+          </a:ln>
+          <a:effectLst/>
+        </p:spPr>
+        <p:style>
+          <a:lnRef idx="1">
+            <a:schemeClr val="accent2"/>
+          </a:lnRef>
+          <a:fillRef idx="2">
+            <a:schemeClr val="accent2"/>
+          </a:fillRef>
+          <a:effectRef idx="1">
+            <a:schemeClr val="accent2"/>
+          </a:effectRef>
+          <a:fontRef idx="minor">
+            <a:schemeClr val="dk1"/>
+          </a:fontRef>
+        </p:style>
+      </p:cxnSp>
+      <p:cxnSp>
+        <p:nvCxnSpPr>
+          <p:cNvPr id="123" name="Elbow Connector 63">
+            <a:extLst>
+              <a:ext uri="{FF2B5EF4-FFF2-40B4-BE49-F238E27FC236}">
+                <a16:creationId xmlns:a16="http://schemas.microsoft.com/office/drawing/2014/main" id="{CECF2D79-9ADD-A945-BAA9-E9A8684D25D1}"/>
+              </a:ext>
+            </a:extLst>
+          </p:cNvPr>
+          <p:cNvCxnSpPr>
+            <a:cxnSpLocks/>
+          </p:cNvCxnSpPr>
+          <p:nvPr/>
+        </p:nvCxnSpPr>
+        <p:spPr>
+          <a:xfrm rot="16200000" flipH="1">
+            <a:off x="1712380" y="4857086"/>
+            <a:ext cx="1162804" cy="595709"/>
+          </a:xfrm>
+          <a:prstGeom prst="bentConnector2">
+            <a:avLst/>
+          </a:prstGeom>
+          <a:ln w="19050">
+            <a:solidFill>
+              <a:schemeClr val="accent3"/>
+            </a:solidFill>
+            <a:headEnd type="none" w="med" len="med"/>
+            <a:tailEnd type="arrow" w="med" len="med"/>
+          </a:ln>
+          <a:effectLst/>
+        </p:spPr>
+        <p:style>
+          <a:lnRef idx="1">
+            <a:schemeClr val="accent2"/>
+          </a:lnRef>
+          <a:fillRef idx="2">
+            <a:schemeClr val="accent2"/>
+          </a:fillRef>
+          <a:effectRef idx="1">
+            <a:schemeClr val="accent2"/>
+          </a:effectRef>
+          <a:fontRef idx="minor">
+            <a:schemeClr val="dk1"/>
+          </a:fontRef>
+        </p:style>
+      </p:cxnSp>
+      <p:cxnSp>
+        <p:nvCxnSpPr>
+          <p:cNvPr id="124" name="Elbow Connector 63">
+            <a:extLst>
+              <a:ext uri="{FF2B5EF4-FFF2-40B4-BE49-F238E27FC236}">
+                <a16:creationId xmlns:a16="http://schemas.microsoft.com/office/drawing/2014/main" id="{3E2E3EA7-CAF9-F943-8BBD-38108F8806DC}"/>
+              </a:ext>
+            </a:extLst>
+          </p:cNvPr>
+          <p:cNvCxnSpPr>
+            <a:cxnSpLocks/>
+            <a:endCxn id="38" idx="1"/>
+          </p:cNvCxnSpPr>
+          <p:nvPr/>
+        </p:nvCxnSpPr>
+        <p:spPr>
+          <a:xfrm rot="16200000" flipH="1">
+            <a:off x="1701832" y="5737512"/>
+            <a:ext cx="1164474" cy="572586"/>
+          </a:xfrm>
+          <a:prstGeom prst="bentConnector2">
+            <a:avLst/>
+          </a:prstGeom>
+          <a:ln w="19050">
+            <a:solidFill>
+              <a:schemeClr val="accent3"/>
+            </a:solidFill>
+            <a:headEnd type="none" w="med" len="med"/>
+            <a:tailEnd type="arrow" w="med" len="med"/>
+          </a:ln>
+          <a:effectLst/>
+        </p:spPr>
+        <p:style>
+          <a:lnRef idx="1">
+            <a:schemeClr val="accent2"/>
+          </a:lnRef>
+          <a:fillRef idx="2">
+            <a:schemeClr val="accent2"/>
+          </a:fillRef>
+          <a:effectRef idx="1">
+            <a:schemeClr val="accent2"/>
+          </a:effectRef>
+          <a:fontRef idx="minor">
+            <a:schemeClr val="dk1"/>
+          </a:fontRef>
+        </p:style>
+      </p:cxnSp>
+      <p:cxnSp>
+        <p:nvCxnSpPr>
+          <p:cNvPr id="125" name="Elbow Connector 124">
+            <a:extLst>
+              <a:ext uri="{FF2B5EF4-FFF2-40B4-BE49-F238E27FC236}">
+                <a16:creationId xmlns:a16="http://schemas.microsoft.com/office/drawing/2014/main" id="{5E923AF1-1555-6743-9645-BBACD6D8E2F9}"/>
+              </a:ext>
+            </a:extLst>
+          </p:cNvPr>
+          <p:cNvCxnSpPr>
+            <a:cxnSpLocks/>
+          </p:cNvCxnSpPr>
+          <p:nvPr/>
+        </p:nvCxnSpPr>
+        <p:spPr>
+          <a:xfrm rot="16200000" flipH="1">
+            <a:off x="3700589" y="4967046"/>
+            <a:ext cx="126087" cy="1008252"/>
+          </a:xfrm>
+          <a:prstGeom prst="bentConnector2">
+            <a:avLst/>
+          </a:prstGeom>
+          <a:ln w="19050">
+            <a:solidFill>
+              <a:schemeClr val="accent3"/>
+            </a:solidFill>
+            <a:headEnd type="none" w="med" len="med"/>
+            <a:tailEnd type="arrow" w="med" len="med"/>
+          </a:ln>
+          <a:effectLst/>
+        </p:spPr>
+        <p:style>
+          <a:lnRef idx="1">
+            <a:schemeClr val="accent2"/>
+          </a:lnRef>
+          <a:fillRef idx="2">
+            <a:schemeClr val="accent2"/>
+          </a:fillRef>
+          <a:effectRef idx="1">
+            <a:schemeClr val="accent2"/>
+          </a:effectRef>
+          <a:fontRef idx="minor">
+            <a:schemeClr val="dk1"/>
+          </a:fontRef>
+        </p:style>
+      </p:cxnSp>
+      <p:cxnSp>
+        <p:nvCxnSpPr>
+          <p:cNvPr id="126" name="Elbow Connector 125">
+            <a:extLst>
+              <a:ext uri="{FF2B5EF4-FFF2-40B4-BE49-F238E27FC236}">
+                <a16:creationId xmlns:a16="http://schemas.microsoft.com/office/drawing/2014/main" id="{33A7AE17-DA38-E34D-9E52-EDEB7CEE891E}"/>
+              </a:ext>
+            </a:extLst>
+          </p:cNvPr>
+          <p:cNvCxnSpPr>
+            <a:cxnSpLocks/>
+          </p:cNvCxnSpPr>
+          <p:nvPr/>
+        </p:nvCxnSpPr>
+        <p:spPr>
+          <a:xfrm rot="16200000" flipH="1">
+            <a:off x="3700590" y="5420550"/>
+            <a:ext cx="126087" cy="1008252"/>
+          </a:xfrm>
+          <a:prstGeom prst="bentConnector2">
+            <a:avLst/>
+          </a:prstGeom>
+          <a:ln w="19050">
+            <a:solidFill>
+              <a:schemeClr val="accent3"/>
+            </a:solidFill>
+            <a:headEnd type="none" w="med" len="med"/>
+            <a:tailEnd type="arrow" w="med" len="med"/>
+          </a:ln>
+          <a:effectLst/>
+        </p:spPr>
+        <p:style>
+          <a:lnRef idx="1">
+            <a:schemeClr val="accent2"/>
+          </a:lnRef>
+          <a:fillRef idx="2">
+            <a:schemeClr val="accent2"/>
+          </a:fillRef>
+          <a:effectRef idx="1">
+            <a:schemeClr val="accent2"/>
+          </a:effectRef>
+          <a:fontRef idx="minor">
+            <a:schemeClr val="dk1"/>
+          </a:fontRef>
+        </p:style>
+      </p:cxnSp>
+      <p:sp>
+        <p:nvSpPr>
+          <p:cNvPr id="127" name="Rectangle 11">
+            <a:extLst>
+              <a:ext uri="{FF2B5EF4-FFF2-40B4-BE49-F238E27FC236}">
+                <a16:creationId xmlns:a16="http://schemas.microsoft.com/office/drawing/2014/main" id="{BF3D157F-9BDF-124F-A896-A80D11B57DAF}"/>
+              </a:ext>
+            </a:extLst>
+          </p:cNvPr>
+          <p:cNvSpPr/>
+          <p:nvPr/>
+        </p:nvSpPr>
+        <p:spPr>
+          <a:xfrm>
+            <a:off x="4260597" y="5425879"/>
+            <a:ext cx="1040906" cy="236841"/>
+          </a:xfrm>
+          <a:prstGeom prst="rect">
+            <a:avLst/>
+          </a:prstGeom>
+          <a:ln w="19050">
+            <a:solidFill>
+              <a:schemeClr val="accent3"/>
+            </a:solidFill>
+          </a:ln>
+          <a:effectLst/>
+        </p:spPr>
+        <p:style>
+          <a:lnRef idx="1">
+            <a:schemeClr val="accent3"/>
+          </a:lnRef>
+          <a:fillRef idx="2">
+            <a:schemeClr val="accent3"/>
+          </a:fillRef>
+          <a:effectRef idx="1">
+            <a:schemeClr val="accent3"/>
+          </a:effectRef>
+          <a:fontRef idx="minor">
+            <a:schemeClr val="dk1"/>
+          </a:fontRef>
+        </p:style>
+        <p:txBody>
+          <a:bodyPr rtlCol="0" anchor="ctr"/>
+          <a:lstStyle/>
+          <a:p>
+            <a:pPr algn="ctr"/>
+            <a:r>
+              <a:rPr lang="en-US" sz="1050" b="1" dirty="0" err="1">
+                <a:solidFill>
+                  <a:schemeClr val="accent3">
+                    <a:lumMod val="75000"/>
+                  </a:schemeClr>
+                </a:solidFill>
+              </a:rPr>
+              <a:t>ModuleCard</a:t>
+            </a:r>
+            <a:endParaRPr lang="en-SG" sz="1050" b="1" dirty="0">
+              <a:solidFill>
+                <a:schemeClr val="accent3">
+                  <a:lumMod val="75000"/>
+                </a:schemeClr>
+              </a:solidFill>
+            </a:endParaRPr>
+          </a:p>
+        </p:txBody>
+      </p:sp>
+      <p:sp>
+        <p:nvSpPr>
+          <p:cNvPr id="128" name="Rectangle 11">
+            <a:extLst>
+              <a:ext uri="{FF2B5EF4-FFF2-40B4-BE49-F238E27FC236}">
+                <a16:creationId xmlns:a16="http://schemas.microsoft.com/office/drawing/2014/main" id="{96A99AF1-583F-364A-9176-9ACFF1A9E258}"/>
+              </a:ext>
+            </a:extLst>
+          </p:cNvPr>
+          <p:cNvSpPr/>
+          <p:nvPr/>
+        </p:nvSpPr>
+        <p:spPr>
+          <a:xfrm>
+            <a:off x="4272863" y="5859482"/>
+            <a:ext cx="1040906" cy="236841"/>
+          </a:xfrm>
+          <a:prstGeom prst="rect">
+            <a:avLst/>
+          </a:prstGeom>
+          <a:ln w="19050">
+            <a:solidFill>
+              <a:schemeClr val="accent3"/>
+            </a:solidFill>
+          </a:ln>
+          <a:effectLst/>
+        </p:spPr>
+        <p:style>
+          <a:lnRef idx="1">
+            <a:schemeClr val="accent3"/>
+          </a:lnRef>
+          <a:fillRef idx="2">
+            <a:schemeClr val="accent3"/>
+          </a:fillRef>
+          <a:effectRef idx="1">
+            <a:schemeClr val="accent3"/>
+          </a:effectRef>
+          <a:fontRef idx="minor">
+            <a:schemeClr val="dk1"/>
+          </a:fontRef>
+        </p:style>
+        <p:txBody>
+          <a:bodyPr rtlCol="0" anchor="ctr"/>
+          <a:lstStyle/>
+          <a:p>
+            <a:pPr algn="ctr"/>
+            <a:r>
+              <a:rPr lang="en-US" sz="1050" b="1" dirty="0" err="1">
+                <a:solidFill>
+                  <a:schemeClr val="accent3">
+                    <a:lumMod val="75000"/>
+                  </a:schemeClr>
+                </a:solidFill>
+              </a:rPr>
+              <a:t>OccasionCard</a:t>
+            </a:r>
+            <a:endParaRPr lang="en-SG" sz="1050" b="1" dirty="0">
+              <a:solidFill>
+                <a:schemeClr val="accent3">
+                  <a:lumMod val="75000"/>
+                </a:schemeClr>
+              </a:solidFill>
+            </a:endParaRPr>
+          </a:p>
+        </p:txBody>
+      </p:sp>
+      <p:cxnSp>
+        <p:nvCxnSpPr>
+          <p:cNvPr id="129" name="Elbow Connector 63">
+            <a:extLst>
+              <a:ext uri="{FF2B5EF4-FFF2-40B4-BE49-F238E27FC236}">
+                <a16:creationId xmlns:a16="http://schemas.microsoft.com/office/drawing/2014/main" id="{73A7F5F9-91B8-9A48-8B1D-73AFD71FD2F0}"/>
+              </a:ext>
+            </a:extLst>
+          </p:cNvPr>
+          <p:cNvCxnSpPr>
+            <a:cxnSpLocks/>
+            <a:endCxn id="127" idx="3"/>
+          </p:cNvCxnSpPr>
+          <p:nvPr/>
+        </p:nvCxnSpPr>
+        <p:spPr>
+          <a:xfrm rot="5400000">
+            <a:off x="4015189" y="4029516"/>
+            <a:ext cx="2801099" cy="228469"/>
+          </a:xfrm>
+          <a:prstGeom prst="bentConnector2">
+            <a:avLst/>
+          </a:prstGeom>
+          <a:ln w="6350">
+            <a:solidFill>
+              <a:schemeClr val="accent3"/>
+            </a:solidFill>
+            <a:headEnd type="none" w="med" len="med"/>
+            <a:tailEnd type="none" w="med" len="med"/>
+          </a:ln>
+          <a:effectLst/>
+        </p:spPr>
+        <p:style>
+          <a:lnRef idx="1">
+            <a:schemeClr val="accent2"/>
+          </a:lnRef>
+          <a:fillRef idx="2">
+            <a:schemeClr val="accent2"/>
+          </a:fillRef>
+          <a:effectRef idx="1">
+            <a:schemeClr val="accent2"/>
+          </a:effectRef>
+          <a:fontRef idx="minor">
+            <a:schemeClr val="dk1"/>
+          </a:fontRef>
+        </p:style>
+      </p:cxnSp>
+      <p:cxnSp>
+        <p:nvCxnSpPr>
+          <p:cNvPr id="130" name="Elbow Connector 63">
+            <a:extLst>
+              <a:ext uri="{FF2B5EF4-FFF2-40B4-BE49-F238E27FC236}">
+                <a16:creationId xmlns:a16="http://schemas.microsoft.com/office/drawing/2014/main" id="{50C94ECD-A38A-9B42-94AF-FAC47F6880A3}"/>
+              </a:ext>
+            </a:extLst>
+          </p:cNvPr>
+          <p:cNvCxnSpPr>
+            <a:cxnSpLocks/>
+            <a:endCxn id="128" idx="3"/>
+          </p:cNvCxnSpPr>
+          <p:nvPr/>
+        </p:nvCxnSpPr>
+        <p:spPr>
+          <a:xfrm rot="5400000">
+            <a:off x="4033120" y="4481051"/>
+            <a:ext cx="2777501" cy="216202"/>
+          </a:xfrm>
+          <a:prstGeom prst="bentConnector2">
+            <a:avLst/>
+          </a:prstGeom>
+          <a:ln w="6350">
+            <a:solidFill>
+              <a:schemeClr val="accent3"/>
+            </a:solidFill>
+            <a:headEnd type="none" w="med" len="med"/>
+            <a:tailEnd type="none" w="med" len="med"/>
+          </a:ln>
+          <a:effectLst/>
+        </p:spPr>
+        <p:style>
+          <a:lnRef idx="1">
+            <a:schemeClr val="accent2"/>
+          </a:lnRef>
+          <a:fillRef idx="2">
+            <a:schemeClr val="accent2"/>
+          </a:fillRef>
+          <a:effectRef idx="1">
+            <a:schemeClr val="accent2"/>
+          </a:effectRef>
+          <a:fontRef idx="minor">
+            <a:schemeClr val="dk1"/>
+          </a:fontRef>
+        </p:style>
+      </p:cxnSp>
+      <p:sp>
+        <p:nvSpPr>
+          <p:cNvPr id="133" name="Freeform 132">
+            <a:extLst>
+              <a:ext uri="{FF2B5EF4-FFF2-40B4-BE49-F238E27FC236}">
+                <a16:creationId xmlns:a16="http://schemas.microsoft.com/office/drawing/2014/main" id="{064011E4-9E7D-9946-AF6B-BB14FAC84F5A}"/>
+              </a:ext>
+            </a:extLst>
+          </p:cNvPr>
+          <p:cNvSpPr/>
+          <p:nvPr/>
+        </p:nvSpPr>
+        <p:spPr>
+          <a:xfrm flipV="1">
+            <a:off x="4497424" y="5699126"/>
+            <a:ext cx="2642195" cy="101600"/>
+          </a:xfrm>
+          <a:custGeom>
+            <a:avLst/>
+            <a:gdLst>
+              <a:gd name="connsiteX0" fmla="*/ 0 w 3048000"/>
+              <a:gd name="connsiteY0" fmla="*/ 203200 h 203200"/>
+              <a:gd name="connsiteX1" fmla="*/ 221673 w 3048000"/>
+              <a:gd name="connsiteY1" fmla="*/ 0 h 203200"/>
+              <a:gd name="connsiteX2" fmla="*/ 3048000 w 3048000"/>
+              <a:gd name="connsiteY2" fmla="*/ 0 h 203200"/>
+            </a:gdLst>
+            <a:ahLst/>
+            <a:cxnLst>
+              <a:cxn ang="0">
+                <a:pos x="connsiteX0" y="connsiteY0"/>
+              </a:cxn>
+              <a:cxn ang="0">
+                <a:pos x="connsiteX1" y="connsiteY1"/>
+              </a:cxn>
+              <a:cxn ang="0">
+                <a:pos x="connsiteX2" y="connsiteY2"/>
+              </a:cxn>
+            </a:cxnLst>
+            <a:rect l="l" t="t" r="r" b="b"/>
+            <a:pathLst>
+              <a:path w="3048000" h="203200">
+                <a:moveTo>
+                  <a:pt x="0" y="203200"/>
+                </a:moveTo>
+                <a:lnTo>
+                  <a:pt x="221673" y="0"/>
+                </a:lnTo>
+                <a:lnTo>
+                  <a:pt x="3048000" y="0"/>
+                </a:lnTo>
+              </a:path>
+            </a:pathLst>
+          </a:custGeom>
+          <a:noFill/>
+          <a:ln w="19050">
+            <a:solidFill>
+              <a:schemeClr val="accent3"/>
+            </a:solidFill>
+            <a:prstDash val="sysDot"/>
+            <a:headEnd type="none" w="med" len="med"/>
+            <a:tailEnd type="arrow" w="med" len="med"/>
+          </a:ln>
+          <a:effectLst/>
+        </p:spPr>
+        <p:style>
+          <a:lnRef idx="1">
+            <a:schemeClr val="accent2"/>
+          </a:lnRef>
+          <a:fillRef idx="2">
+            <a:schemeClr val="accent2"/>
+          </a:fillRef>
+          <a:effectRef idx="1">
+            <a:schemeClr val="accent2"/>
+          </a:effectRef>
+          <a:fontRef idx="minor">
+            <a:schemeClr val="dk1"/>
+          </a:fontRef>
+        </p:style>
+        <p:txBody>
+          <a:bodyPr rtlCol="0" anchor="ctr"/>
+          <a:lstStyle/>
+          <a:p>
+            <a:pPr algn="ctr"/>
+            <a:endParaRPr lang="en-SG"/>
+          </a:p>
+        </p:txBody>
+      </p:sp>
+      <p:sp>
+        <p:nvSpPr>
+          <p:cNvPr id="134" name="Freeform 133">
+            <a:extLst>
+              <a:ext uri="{FF2B5EF4-FFF2-40B4-BE49-F238E27FC236}">
+                <a16:creationId xmlns:a16="http://schemas.microsoft.com/office/drawing/2014/main" id="{1632A3BF-02C9-024D-BE42-ECF32477AF30}"/>
+              </a:ext>
+            </a:extLst>
+          </p:cNvPr>
+          <p:cNvSpPr/>
+          <p:nvPr/>
+        </p:nvSpPr>
+        <p:spPr>
+          <a:xfrm flipV="1">
+            <a:off x="4497423" y="6152493"/>
             <a:ext cx="2642195" cy="101600"/>
           </a:xfrm>
           <a:custGeom>

</xml_diff>

<commit_message>
Update UI class diagram to shift arrow correctly
</commit_message>
<xml_diff>
--- a/docs/diagrams/UiComponentClassDiagram.pptx
+++ b/docs/diagrams/UiComponentClassDiagram.pptx
@@ -208,7 +208,7 @@
           <a:p>
             <a:fld id="{F5CC4B3F-88C1-4FFA-B1B6-F41C21DC6924}" type="datetimeFigureOut">
               <a:rPr lang="en-US" smtClean="0"/>
-              <a:t>10/29/2018</a:t>
+              <a:t>11/10/2018</a:t>
             </a:fld>
             <a:endParaRPr lang="en-US"/>
           </a:p>
@@ -654,7 +654,7 @@
           <a:p>
             <a:fld id="{78C97017-6FC3-485B-9764-EAC9E56C1D49}" type="datetimeFigureOut">
               <a:rPr lang="en-US" smtClean="0"/>
-              <a:t>10/29/2018</a:t>
+              <a:t>11/10/2018</a:t>
             </a:fld>
             <a:endParaRPr lang="en-US"/>
           </a:p>
@@ -822,7 +822,7 @@
           <a:p>
             <a:fld id="{78C97017-6FC3-485B-9764-EAC9E56C1D49}" type="datetimeFigureOut">
               <a:rPr lang="en-US" smtClean="0"/>
-              <a:t>10/29/2018</a:t>
+              <a:t>11/10/2018</a:t>
             </a:fld>
             <a:endParaRPr lang="en-US"/>
           </a:p>
@@ -1000,7 +1000,7 @@
           <a:p>
             <a:fld id="{78C97017-6FC3-485B-9764-EAC9E56C1D49}" type="datetimeFigureOut">
               <a:rPr lang="en-US" smtClean="0"/>
-              <a:t>10/29/2018</a:t>
+              <a:t>11/10/2018</a:t>
             </a:fld>
             <a:endParaRPr lang="en-US"/>
           </a:p>
@@ -1168,7 +1168,7 @@
           <a:p>
             <a:fld id="{78C97017-6FC3-485B-9764-EAC9E56C1D49}" type="datetimeFigureOut">
               <a:rPr lang="en-US" smtClean="0"/>
-              <a:t>10/29/2018</a:t>
+              <a:t>11/10/2018</a:t>
             </a:fld>
             <a:endParaRPr lang="en-US"/>
           </a:p>
@@ -1413,7 +1413,7 @@
           <a:p>
             <a:fld id="{78C97017-6FC3-485B-9764-EAC9E56C1D49}" type="datetimeFigureOut">
               <a:rPr lang="en-US" smtClean="0"/>
-              <a:t>10/29/2018</a:t>
+              <a:t>11/10/2018</a:t>
             </a:fld>
             <a:endParaRPr lang="en-US"/>
           </a:p>
@@ -1698,7 +1698,7 @@
           <a:p>
             <a:fld id="{78C97017-6FC3-485B-9764-EAC9E56C1D49}" type="datetimeFigureOut">
               <a:rPr lang="en-US" smtClean="0"/>
-              <a:t>10/29/2018</a:t>
+              <a:t>11/10/2018</a:t>
             </a:fld>
             <a:endParaRPr lang="en-US"/>
           </a:p>
@@ -2117,7 +2117,7 @@
           <a:p>
             <a:fld id="{78C97017-6FC3-485B-9764-EAC9E56C1D49}" type="datetimeFigureOut">
               <a:rPr lang="en-US" smtClean="0"/>
-              <a:t>10/29/2018</a:t>
+              <a:t>11/10/2018</a:t>
             </a:fld>
             <a:endParaRPr lang="en-US"/>
           </a:p>
@@ -2234,7 +2234,7 @@
           <a:p>
             <a:fld id="{78C97017-6FC3-485B-9764-EAC9E56C1D49}" type="datetimeFigureOut">
               <a:rPr lang="en-US" smtClean="0"/>
-              <a:t>10/29/2018</a:t>
+              <a:t>11/10/2018</a:t>
             </a:fld>
             <a:endParaRPr lang="en-US"/>
           </a:p>
@@ -2329,7 +2329,7 @@
           <a:p>
             <a:fld id="{78C97017-6FC3-485B-9764-EAC9E56C1D49}" type="datetimeFigureOut">
               <a:rPr lang="en-US" smtClean="0"/>
-              <a:t>10/29/2018</a:t>
+              <a:t>11/10/2018</a:t>
             </a:fld>
             <a:endParaRPr lang="en-US"/>
           </a:p>
@@ -2604,7 +2604,7 @@
           <a:p>
             <a:fld id="{78C97017-6FC3-485B-9764-EAC9E56C1D49}" type="datetimeFigureOut">
               <a:rPr lang="en-US" smtClean="0"/>
-              <a:t>10/29/2018</a:t>
+              <a:t>11/10/2018</a:t>
             </a:fld>
             <a:endParaRPr lang="en-US"/>
           </a:p>
@@ -2856,7 +2856,7 @@
           <a:p>
             <a:fld id="{78C97017-6FC3-485B-9764-EAC9E56C1D49}" type="datetimeFigureOut">
               <a:rPr lang="en-US" smtClean="0"/>
-              <a:t>10/29/2018</a:t>
+              <a:t>11/10/2018</a:t>
             </a:fld>
             <a:endParaRPr lang="en-US"/>
           </a:p>
@@ -3067,7 +3067,7 @@
           <a:p>
             <a:fld id="{78C97017-6FC3-485B-9764-EAC9E56C1D49}" type="datetimeFigureOut">
               <a:rPr lang="en-US" smtClean="0"/>
-              <a:t>10/29/2018</a:t>
+              <a:t>11/10/2018</a:t>
             </a:fld>
             <a:endParaRPr lang="en-US"/>
           </a:p>
@@ -4453,14 +4453,16 @@
         <p:nvCxnSpPr>
           <p:cNvPr id="53" name="Elbow Connector 63"/>
           <p:cNvCxnSpPr>
+            <a:cxnSpLocks/>
+            <a:stCxn id="39" idx="2"/>
             <a:endCxn id="38" idx="1"/>
           </p:cNvCxnSpPr>
           <p:nvPr/>
         </p:nvCxnSpPr>
         <p:spPr>
           <a:xfrm rot="16200000" flipH="1">
-            <a:off x="1184119" y="4188171"/>
-            <a:ext cx="2396440" cy="420377"/>
+            <a:off x="1140050" y="4144101"/>
+            <a:ext cx="2728555" cy="176402"/>
           </a:xfrm>
           <a:prstGeom prst="bentConnector2">
             <a:avLst/>

</xml_diff>

<commit_message>
docs: Update UI component pptx and png
Currently it still display Person-related UI.

This might confuse future developers as it is the only remaining portion of the developer guide that still mentions "Person".

Let's update it to fit the existing state of the application.
</commit_message>
<xml_diff>
--- a/docs/diagrams/UiComponentClassDiagram.pptx
+++ b/docs/diagrams/UiComponentClassDiagram.pptx
@@ -208,7 +208,7 @@
           <a:p>
             <a:fld id="{F5CC4B3F-88C1-4FFA-B1B6-F41C21DC6924}" type="datetimeFigureOut">
               <a:rPr lang="en-US" smtClean="0"/>
-              <a:t>1/7/2017</a:t>
+              <a:t>11/10/2018</a:t>
             </a:fld>
             <a:endParaRPr lang="en-US"/>
           </a:p>
@@ -654,7 +654,7 @@
           <a:p>
             <a:fld id="{78C97017-6FC3-485B-9764-EAC9E56C1D49}" type="datetimeFigureOut">
               <a:rPr lang="en-US" smtClean="0"/>
-              <a:t>1/7/2017</a:t>
+              <a:t>11/10/2018</a:t>
             </a:fld>
             <a:endParaRPr lang="en-US"/>
           </a:p>
@@ -822,7 +822,7 @@
           <a:p>
             <a:fld id="{78C97017-6FC3-485B-9764-EAC9E56C1D49}" type="datetimeFigureOut">
               <a:rPr lang="en-US" smtClean="0"/>
-              <a:t>1/7/2017</a:t>
+              <a:t>11/10/2018</a:t>
             </a:fld>
             <a:endParaRPr lang="en-US"/>
           </a:p>
@@ -1000,7 +1000,7 @@
           <a:p>
             <a:fld id="{78C97017-6FC3-485B-9764-EAC9E56C1D49}" type="datetimeFigureOut">
               <a:rPr lang="en-US" smtClean="0"/>
-              <a:t>1/7/2017</a:t>
+              <a:t>11/10/2018</a:t>
             </a:fld>
             <a:endParaRPr lang="en-US"/>
           </a:p>
@@ -1168,7 +1168,7 @@
           <a:p>
             <a:fld id="{78C97017-6FC3-485B-9764-EAC9E56C1D49}" type="datetimeFigureOut">
               <a:rPr lang="en-US" smtClean="0"/>
-              <a:t>1/7/2017</a:t>
+              <a:t>11/10/2018</a:t>
             </a:fld>
             <a:endParaRPr lang="en-US"/>
           </a:p>
@@ -1413,7 +1413,7 @@
           <a:p>
             <a:fld id="{78C97017-6FC3-485B-9764-EAC9E56C1D49}" type="datetimeFigureOut">
               <a:rPr lang="en-US" smtClean="0"/>
-              <a:t>1/7/2017</a:t>
+              <a:t>11/10/2018</a:t>
             </a:fld>
             <a:endParaRPr lang="en-US"/>
           </a:p>
@@ -1698,7 +1698,7 @@
           <a:p>
             <a:fld id="{78C97017-6FC3-485B-9764-EAC9E56C1D49}" type="datetimeFigureOut">
               <a:rPr lang="en-US" smtClean="0"/>
-              <a:t>1/7/2017</a:t>
+              <a:t>11/10/2018</a:t>
             </a:fld>
             <a:endParaRPr lang="en-US"/>
           </a:p>
@@ -2117,7 +2117,7 @@
           <a:p>
             <a:fld id="{78C97017-6FC3-485B-9764-EAC9E56C1D49}" type="datetimeFigureOut">
               <a:rPr lang="en-US" smtClean="0"/>
-              <a:t>1/7/2017</a:t>
+              <a:t>11/10/2018</a:t>
             </a:fld>
             <a:endParaRPr lang="en-US"/>
           </a:p>
@@ -2234,7 +2234,7 @@
           <a:p>
             <a:fld id="{78C97017-6FC3-485B-9764-EAC9E56C1D49}" type="datetimeFigureOut">
               <a:rPr lang="en-US" smtClean="0"/>
-              <a:t>1/7/2017</a:t>
+              <a:t>11/10/2018</a:t>
             </a:fld>
             <a:endParaRPr lang="en-US"/>
           </a:p>
@@ -2329,7 +2329,7 @@
           <a:p>
             <a:fld id="{78C97017-6FC3-485B-9764-EAC9E56C1D49}" type="datetimeFigureOut">
               <a:rPr lang="en-US" smtClean="0"/>
-              <a:t>1/7/2017</a:t>
+              <a:t>11/10/2018</a:t>
             </a:fld>
             <a:endParaRPr lang="en-US"/>
           </a:p>
@@ -2604,7 +2604,7 @@
           <a:p>
             <a:fld id="{78C97017-6FC3-485B-9764-EAC9E56C1D49}" type="datetimeFigureOut">
               <a:rPr lang="en-US" smtClean="0"/>
-              <a:t>1/7/2017</a:t>
+              <a:t>11/10/2018</a:t>
             </a:fld>
             <a:endParaRPr lang="en-US"/>
           </a:p>
@@ -2856,7 +2856,7 @@
           <a:p>
             <a:fld id="{78C97017-6FC3-485B-9764-EAC9E56C1D49}" type="datetimeFigureOut">
               <a:rPr lang="en-US" smtClean="0"/>
-              <a:t>1/7/2017</a:t>
+              <a:t>11/10/2018</a:t>
             </a:fld>
             <a:endParaRPr lang="en-US"/>
           </a:p>
@@ -3067,7 +3067,7 @@
           <a:p>
             <a:fld id="{78C97017-6FC3-485B-9764-EAC9E56C1D49}" type="datetimeFigureOut">
               <a:rPr lang="en-US" smtClean="0"/>
-              <a:t>1/7/2017</a:t>
+              <a:t>11/10/2018</a:t>
             </a:fld>
             <a:endParaRPr lang="en-US"/>
           </a:p>
@@ -3450,8 +3450,8 @@
         </p:nvSpPr>
         <p:spPr>
           <a:xfrm>
-            <a:off x="1217465" y="1447800"/>
-            <a:ext cx="4917083" cy="3962400"/>
+            <a:off x="272260" y="1097458"/>
+            <a:ext cx="7368721" cy="7894142"/>
           </a:xfrm>
           <a:prstGeom prst="roundRect">
             <a:avLst>
@@ -3925,7 +3925,7 @@
                   </a:schemeClr>
                 </a:solidFill>
               </a:rPr>
-              <a:t>BrowserPanel</a:t>
+              <a:t>DetailPanel</a:t>
             </a:r>
             <a:endParaRPr lang="en-SG" sz="1050" b="1" dirty="0">
               <a:solidFill>
@@ -3945,7 +3945,7 @@
         </p:nvSpPr>
         <p:spPr>
           <a:xfrm>
-            <a:off x="2592527" y="4563759"/>
+            <a:off x="2592527" y="7133318"/>
             <a:ext cx="1093635" cy="236841"/>
           </a:xfrm>
           <a:prstGeom prst="rect">
@@ -4006,7 +4006,7 @@
         <p:spPr>
           <a:xfrm>
             <a:off x="2592526" y="3991960"/>
-            <a:ext cx="1093635" cy="236841"/>
+            <a:ext cx="1246796" cy="246020"/>
           </a:xfrm>
           <a:prstGeom prst="rect">
             <a:avLst/>
@@ -4045,7 +4045,7 @@
                   </a:schemeClr>
                 </a:solidFill>
               </a:rPr>
-              <a:t>PersonListPanel</a:t>
+              <a:t>AccountListPanel</a:t>
             </a:r>
             <a:endParaRPr lang="en-SG" sz="1050" b="1" dirty="0">
               <a:solidFill>
@@ -4065,7 +4065,7 @@
         </p:nvSpPr>
         <p:spPr>
           <a:xfrm>
-            <a:off x="3839323" y="4228801"/>
+            <a:off x="3952492" y="4228801"/>
             <a:ext cx="1040906" cy="236841"/>
           </a:xfrm>
           <a:prstGeom prst="rect">
@@ -4105,7 +4105,7 @@
                   </a:schemeClr>
                 </a:solidFill>
               </a:rPr>
-              <a:t>PersonCard</a:t>
+              <a:t>AccountCard</a:t>
             </a:r>
             <a:endParaRPr lang="en-SG" sz="1050" b="1" dirty="0">
               <a:solidFill>
@@ -4125,7 +4125,7 @@
         </p:nvSpPr>
         <p:spPr>
           <a:xfrm>
-            <a:off x="2592528" y="4966000"/>
+            <a:off x="2592528" y="7535559"/>
             <a:ext cx="1093635" cy="236841"/>
           </a:xfrm>
           <a:prstGeom prst="rect">
@@ -4371,6 +4371,7 @@
         <p:nvCxnSpPr>
           <p:cNvPr id="47" name="Elbow Connector 63"/>
           <p:cNvCxnSpPr>
+            <a:cxnSpLocks/>
             <a:stCxn id="39" idx="2"/>
             <a:endCxn id="36" idx="1"/>
           </p:cNvCxnSpPr>
@@ -4378,8 +4379,8 @@
         </p:nvCxnSpPr>
         <p:spPr>
           <a:xfrm rot="16200000" flipH="1">
-            <a:off x="1883148" y="3401003"/>
-            <a:ext cx="1242356" cy="176400"/>
+            <a:off x="1880854" y="3403297"/>
+            <a:ext cx="1246945" cy="176400"/>
           </a:xfrm>
           <a:prstGeom prst="bentConnector2">
             <a:avLst/>
@@ -4412,6 +4413,7 @@
         <p:nvCxnSpPr>
           <p:cNvPr id="50" name="Elbow Connector 63"/>
           <p:cNvCxnSpPr>
+            <a:cxnSpLocks/>
             <a:stCxn id="39" idx="2"/>
             <a:endCxn id="35" idx="1"/>
           </p:cNvCxnSpPr>
@@ -4419,8 +4421,8 @@
         </p:nvCxnSpPr>
         <p:spPr>
           <a:xfrm rot="16200000" flipH="1">
-            <a:off x="1597249" y="3686901"/>
-            <a:ext cx="1814155" cy="176401"/>
+            <a:off x="312469" y="4971681"/>
+            <a:ext cx="4383714" cy="176401"/>
           </a:xfrm>
           <a:prstGeom prst="bentConnector2">
             <a:avLst/>
@@ -4453,17 +4455,21 @@
         <p:nvCxnSpPr>
           <p:cNvPr id="53" name="Elbow Connector 63"/>
           <p:cNvCxnSpPr>
+            <a:cxnSpLocks/>
+            <a:stCxn id="2" idx="1"/>
             <a:endCxn id="38" idx="1"/>
           </p:cNvCxnSpPr>
           <p:nvPr/>
         </p:nvCxnSpPr>
         <p:spPr>
-          <a:xfrm rot="16200000" flipH="1">
-            <a:off x="1184119" y="3676012"/>
-            <a:ext cx="2396440" cy="420377"/>
-          </a:xfrm>
-          <a:prstGeom prst="bentConnector2">
-            <a:avLst/>
+          <a:xfrm rot="10800000" flipH="1" flipV="1">
+            <a:off x="2095948" y="2514600"/>
+            <a:ext cx="496580" cy="5139380"/>
+          </a:xfrm>
+          <a:prstGeom prst="bentConnector3">
+            <a:avLst>
+              <a:gd name="adj1" fmla="val -46035"/>
+            </a:avLst>
           </a:prstGeom>
           <a:ln w="19050">
             <a:solidFill>
@@ -4620,8 +4626,8 @@
         </p:nvCxnSpPr>
         <p:spPr>
           <a:xfrm rot="5400000">
-            <a:off x="4174488" y="2991741"/>
-            <a:ext cx="2061222" cy="649740"/>
+            <a:off x="4231073" y="3048326"/>
+            <a:ext cx="2061222" cy="536571"/>
           </a:xfrm>
           <a:prstGeom prst="bentConnector2">
             <a:avLst/>
@@ -4736,6 +4742,7 @@
         <p:nvCxnSpPr>
           <p:cNvPr id="91" name="Elbow Connector 63"/>
           <p:cNvCxnSpPr>
+            <a:cxnSpLocks/>
             <a:stCxn id="16" idx="3"/>
             <a:endCxn id="35" idx="3"/>
           </p:cNvCxnSpPr>
@@ -4743,8 +4750,8 @@
         </p:nvCxnSpPr>
         <p:spPr>
           <a:xfrm rot="5400000">
-            <a:off x="3409976" y="2562187"/>
-            <a:ext cx="2396180" cy="1843807"/>
+            <a:off x="2125197" y="3846966"/>
+            <a:ext cx="4965739" cy="1843807"/>
           </a:xfrm>
           <a:prstGeom prst="bentConnector2">
             <a:avLst/>
@@ -4777,6 +4784,7 @@
         <p:nvCxnSpPr>
           <p:cNvPr id="94" name="Elbow Connector 63"/>
           <p:cNvCxnSpPr>
+            <a:cxnSpLocks/>
             <a:stCxn id="16" idx="3"/>
             <a:endCxn id="38" idx="3"/>
           </p:cNvCxnSpPr>
@@ -4784,8 +4792,8 @@
         </p:nvCxnSpPr>
         <p:spPr>
           <a:xfrm rot="5400000">
-            <a:off x="3208856" y="2763307"/>
-            <a:ext cx="2798421" cy="1843806"/>
+            <a:off x="1924076" y="4048087"/>
+            <a:ext cx="5367980" cy="1843806"/>
           </a:xfrm>
           <a:prstGeom prst="bentConnector2">
             <a:avLst/>
@@ -4863,8 +4871,8 @@
         </p:nvSpPr>
         <p:spPr>
           <a:xfrm rot="16200000">
-            <a:off x="6213739" y="4560376"/>
-            <a:ext cx="1371599" cy="328045"/>
+            <a:off x="4586059" y="6188055"/>
+            <a:ext cx="4626960" cy="328045"/>
           </a:xfrm>
           <a:prstGeom prst="roundRect">
             <a:avLst/>
@@ -5161,6 +5169,7 @@
         <p:nvCxnSpPr>
           <p:cNvPr id="137" name="Elbow Connector 136"/>
           <p:cNvCxnSpPr>
+            <a:cxnSpLocks/>
             <a:stCxn id="36" idx="2"/>
             <a:endCxn id="37" idx="1"/>
           </p:cNvCxnSpPr>
@@ -5168,8 +5177,8 @@
         </p:nvCxnSpPr>
         <p:spPr>
           <a:xfrm rot="16200000" flipH="1">
-            <a:off x="3430123" y="3938021"/>
-            <a:ext cx="118421" cy="699979"/>
+            <a:off x="3529587" y="3924317"/>
+            <a:ext cx="109242" cy="736568"/>
           </a:xfrm>
           <a:prstGeom prst="bentConnector2">
             <a:avLst/>
@@ -5202,6 +5211,7 @@
         <p:nvCxnSpPr>
           <p:cNvPr id="140" name="Elbow Connector 63"/>
           <p:cNvCxnSpPr>
+            <a:cxnSpLocks/>
             <a:stCxn id="16" idx="3"/>
             <a:endCxn id="36" idx="3"/>
           </p:cNvCxnSpPr>
@@ -5209,8 +5219,8 @@
         </p:nvCxnSpPr>
         <p:spPr>
           <a:xfrm rot="5400000">
-            <a:off x="3695875" y="2276286"/>
-            <a:ext cx="1824381" cy="1843808"/>
+            <a:off x="3770161" y="2355162"/>
+            <a:ext cx="1828970" cy="1690647"/>
           </a:xfrm>
           <a:prstGeom prst="bentConnector2">
             <a:avLst/>
@@ -5239,59 +5249,6 @@
           </a:fontRef>
         </p:style>
       </p:cxnSp>
-      <p:sp>
-        <p:nvSpPr>
-          <p:cNvPr id="143" name="Rectangle 142"/>
-          <p:cNvSpPr/>
-          <p:nvPr/>
-        </p:nvSpPr>
-        <p:spPr>
-          <a:xfrm>
-            <a:off x="5435896" y="2743200"/>
-            <a:ext cx="229325" cy="166560"/>
-          </a:xfrm>
-          <a:prstGeom prst="rect">
-            <a:avLst/>
-          </a:prstGeom>
-          <a:solidFill>
-            <a:schemeClr val="accent3">
-              <a:lumMod val="20000"/>
-              <a:lumOff val="80000"/>
-              <a:alpha val="80000"/>
-            </a:schemeClr>
-          </a:solidFill>
-          <a:ln>
-            <a:noFill/>
-          </a:ln>
-          <a:effectLst>
-            <a:softEdge rad="31750"/>
-          </a:effectLst>
-        </p:spPr>
-        <p:style>
-          <a:lnRef idx="2">
-            <a:schemeClr val="accent1">
-              <a:shade val="50000"/>
-            </a:schemeClr>
-          </a:lnRef>
-          <a:fillRef idx="1">
-            <a:schemeClr val="accent1"/>
-          </a:fillRef>
-          <a:effectRef idx="0">
-            <a:schemeClr val="accent1"/>
-          </a:effectRef>
-          <a:fontRef idx="minor">
-            <a:schemeClr val="lt1"/>
-          </a:fontRef>
-        </p:style>
-        <p:txBody>
-          <a:bodyPr rtlCol="0" anchor="ctr"/>
-          <a:lstStyle/>
-          <a:p>
-            <a:pPr algn="ctr"/>
-            <a:endParaRPr lang="en-SG"/>
-          </a:p>
-        </p:txBody>
-      </p:sp>
       <p:sp>
         <p:nvSpPr>
           <p:cNvPr id="116" name="Freeform 115"/>
@@ -5376,67 +5333,14 @@
       </p:sp>
       <p:sp>
         <p:nvSpPr>
-          <p:cNvPr id="144" name="Rectangle 143"/>
-          <p:cNvSpPr/>
-          <p:nvPr/>
-        </p:nvSpPr>
-        <p:spPr>
-          <a:xfrm>
-            <a:off x="5431573" y="4488138"/>
-            <a:ext cx="229325" cy="160062"/>
-          </a:xfrm>
-          <a:prstGeom prst="rect">
-            <a:avLst/>
-          </a:prstGeom>
-          <a:solidFill>
-            <a:schemeClr val="accent3">
-              <a:lumMod val="20000"/>
-              <a:lumOff val="80000"/>
-              <a:alpha val="80000"/>
-            </a:schemeClr>
-          </a:solidFill>
-          <a:ln>
-            <a:noFill/>
-          </a:ln>
-          <a:effectLst>
-            <a:softEdge rad="31750"/>
-          </a:effectLst>
-        </p:spPr>
-        <p:style>
-          <a:lnRef idx="2">
-            <a:schemeClr val="accent1">
-              <a:shade val="50000"/>
-            </a:schemeClr>
-          </a:lnRef>
-          <a:fillRef idx="1">
-            <a:schemeClr val="accent1"/>
-          </a:fillRef>
-          <a:effectRef idx="0">
-            <a:schemeClr val="accent1"/>
-          </a:effectRef>
-          <a:fontRef idx="minor">
-            <a:schemeClr val="lt1"/>
-          </a:fontRef>
-        </p:style>
-        <p:txBody>
-          <a:bodyPr rtlCol="0" anchor="ctr"/>
-          <a:lstStyle/>
-          <a:p>
-            <a:pPr algn="ctr"/>
-            <a:endParaRPr lang="en-SG"/>
-          </a:p>
-        </p:txBody>
-      </p:sp>
-      <p:sp>
-        <p:nvSpPr>
           <p:cNvPr id="118" name="Freeform 117"/>
           <p:cNvSpPr/>
           <p:nvPr/>
         </p:nvSpPr>
         <p:spPr>
           <a:xfrm flipV="1">
-            <a:off x="4114799" y="4472708"/>
-            <a:ext cx="2642195" cy="101600"/>
+            <a:off x="4110745" y="4472708"/>
+            <a:ext cx="2646249" cy="80021"/>
           </a:xfrm>
           <a:custGeom>
             <a:avLst/>
@@ -5509,6 +5413,1462 @@
           </a:p>
         </p:txBody>
       </p:sp>
+      <p:sp>
+        <p:nvSpPr>
+          <p:cNvPr id="46" name="Rectangle 11">
+            <a:extLst>
+              <a:ext uri="{FF2B5EF4-FFF2-40B4-BE49-F238E27FC236}">
+                <a16:creationId xmlns:a16="http://schemas.microsoft.com/office/drawing/2014/main" id="{398A544B-38D1-4DA6-A84A-141E5B7281C8}"/>
+              </a:ext>
+            </a:extLst>
+          </p:cNvPr>
+          <p:cNvSpPr/>
+          <p:nvPr/>
+        </p:nvSpPr>
+        <p:spPr>
+          <a:xfrm>
+            <a:off x="2590800" y="4631718"/>
+            <a:ext cx="1269071" cy="246020"/>
+          </a:xfrm>
+          <a:prstGeom prst="rect">
+            <a:avLst/>
+          </a:prstGeom>
+          <a:ln w="19050">
+            <a:solidFill>
+              <a:schemeClr val="accent3"/>
+            </a:solidFill>
+          </a:ln>
+          <a:effectLst/>
+        </p:spPr>
+        <p:style>
+          <a:lnRef idx="1">
+            <a:schemeClr val="accent3"/>
+          </a:lnRef>
+          <a:fillRef idx="2">
+            <a:schemeClr val="accent3"/>
+          </a:fillRef>
+          <a:effectRef idx="1">
+            <a:schemeClr val="accent3"/>
+          </a:effectRef>
+          <a:fontRef idx="minor">
+            <a:schemeClr val="dk1"/>
+          </a:fontRef>
+        </p:style>
+        <p:txBody>
+          <a:bodyPr rtlCol="0" anchor="ctr"/>
+          <a:lstStyle/>
+          <a:p>
+            <a:pPr algn="ctr"/>
+            <a:r>
+              <a:rPr lang="en-US" sz="1050" b="1" dirty="0" err="1">
+                <a:solidFill>
+                  <a:schemeClr val="accent3">
+                    <a:lumMod val="75000"/>
+                  </a:schemeClr>
+                </a:solidFill>
+              </a:rPr>
+              <a:t>IngredientListPanel</a:t>
+            </a:r>
+            <a:endParaRPr lang="en-SG" sz="1050" b="1" dirty="0">
+              <a:solidFill>
+                <a:schemeClr val="accent3">
+                  <a:lumMod val="75000"/>
+                </a:schemeClr>
+              </a:solidFill>
+            </a:endParaRPr>
+          </a:p>
+        </p:txBody>
+      </p:sp>
+      <p:sp>
+        <p:nvSpPr>
+          <p:cNvPr id="48" name="Rectangle 11">
+            <a:extLst>
+              <a:ext uri="{FF2B5EF4-FFF2-40B4-BE49-F238E27FC236}">
+                <a16:creationId xmlns:a16="http://schemas.microsoft.com/office/drawing/2014/main" id="{6450AD39-7722-4F43-B62B-9804D7433964}"/>
+              </a:ext>
+            </a:extLst>
+          </p:cNvPr>
+          <p:cNvSpPr/>
+          <p:nvPr/>
+        </p:nvSpPr>
+        <p:spPr>
+          <a:xfrm>
+            <a:off x="3962400" y="4868559"/>
+            <a:ext cx="1040906" cy="236841"/>
+          </a:xfrm>
+          <a:prstGeom prst="rect">
+            <a:avLst/>
+          </a:prstGeom>
+          <a:ln w="19050">
+            <a:solidFill>
+              <a:schemeClr val="accent3"/>
+            </a:solidFill>
+          </a:ln>
+          <a:effectLst/>
+        </p:spPr>
+        <p:style>
+          <a:lnRef idx="1">
+            <a:schemeClr val="accent3"/>
+          </a:lnRef>
+          <a:fillRef idx="2">
+            <a:schemeClr val="accent3"/>
+          </a:fillRef>
+          <a:effectRef idx="1">
+            <a:schemeClr val="accent3"/>
+          </a:effectRef>
+          <a:fontRef idx="minor">
+            <a:schemeClr val="dk1"/>
+          </a:fontRef>
+        </p:style>
+        <p:txBody>
+          <a:bodyPr rtlCol="0" anchor="ctr"/>
+          <a:lstStyle/>
+          <a:p>
+            <a:pPr algn="ctr"/>
+            <a:r>
+              <a:rPr lang="en-US" sz="1050" b="1" dirty="0" err="1">
+                <a:solidFill>
+                  <a:schemeClr val="accent3">
+                    <a:lumMod val="75000"/>
+                  </a:schemeClr>
+                </a:solidFill>
+              </a:rPr>
+              <a:t>IngredientCard</a:t>
+            </a:r>
+            <a:endParaRPr lang="en-SG" sz="1050" b="1" dirty="0">
+              <a:solidFill>
+                <a:schemeClr val="accent3">
+                  <a:lumMod val="75000"/>
+                </a:schemeClr>
+              </a:solidFill>
+            </a:endParaRPr>
+          </a:p>
+        </p:txBody>
+      </p:sp>
+      <p:cxnSp>
+        <p:nvCxnSpPr>
+          <p:cNvPr id="49" name="Elbow Connector 63">
+            <a:extLst>
+              <a:ext uri="{FF2B5EF4-FFF2-40B4-BE49-F238E27FC236}">
+                <a16:creationId xmlns:a16="http://schemas.microsoft.com/office/drawing/2014/main" id="{B6454DA9-AA14-4E8C-A302-2BA6819DDC23}"/>
+              </a:ext>
+            </a:extLst>
+          </p:cNvPr>
+          <p:cNvCxnSpPr>
+            <a:cxnSpLocks/>
+            <a:stCxn id="16" idx="3"/>
+            <a:endCxn id="48" idx="3"/>
+          </p:cNvCxnSpPr>
+          <p:nvPr/>
+        </p:nvCxnSpPr>
+        <p:spPr>
+          <a:xfrm rot="5400000">
+            <a:off x="3916148" y="3373159"/>
+            <a:ext cx="2700980" cy="526663"/>
+          </a:xfrm>
+          <a:prstGeom prst="bentConnector2">
+            <a:avLst/>
+          </a:prstGeom>
+          <a:ln w="6350">
+            <a:solidFill>
+              <a:schemeClr val="accent3"/>
+            </a:solidFill>
+            <a:headEnd type="none" w="med" len="med"/>
+            <a:tailEnd type="none" w="med" len="med"/>
+          </a:ln>
+          <a:effectLst/>
+        </p:spPr>
+        <p:style>
+          <a:lnRef idx="1">
+            <a:schemeClr val="accent2"/>
+          </a:lnRef>
+          <a:fillRef idx="2">
+            <a:schemeClr val="accent2"/>
+          </a:fillRef>
+          <a:effectRef idx="1">
+            <a:schemeClr val="accent2"/>
+          </a:effectRef>
+          <a:fontRef idx="minor">
+            <a:schemeClr val="dk1"/>
+          </a:fontRef>
+        </p:style>
+      </p:cxnSp>
+      <p:cxnSp>
+        <p:nvCxnSpPr>
+          <p:cNvPr id="51" name="Elbow Connector 136">
+            <a:extLst>
+              <a:ext uri="{FF2B5EF4-FFF2-40B4-BE49-F238E27FC236}">
+                <a16:creationId xmlns:a16="http://schemas.microsoft.com/office/drawing/2014/main" id="{0E150F76-8B03-4ED4-BF19-DEFE002DB521}"/>
+              </a:ext>
+            </a:extLst>
+          </p:cNvPr>
+          <p:cNvCxnSpPr>
+            <a:cxnSpLocks/>
+            <a:stCxn id="46" idx="2"/>
+            <a:endCxn id="48" idx="1"/>
+          </p:cNvCxnSpPr>
+          <p:nvPr/>
+        </p:nvCxnSpPr>
+        <p:spPr>
+          <a:xfrm rot="16200000" flipH="1">
+            <a:off x="3539247" y="4563827"/>
+            <a:ext cx="109242" cy="737064"/>
+          </a:xfrm>
+          <a:prstGeom prst="bentConnector2">
+            <a:avLst/>
+          </a:prstGeom>
+          <a:ln w="19050">
+            <a:solidFill>
+              <a:schemeClr val="accent3"/>
+            </a:solidFill>
+            <a:headEnd type="none" w="med" len="med"/>
+            <a:tailEnd type="arrow" w="med" len="med"/>
+          </a:ln>
+          <a:effectLst/>
+        </p:spPr>
+        <p:style>
+          <a:lnRef idx="1">
+            <a:schemeClr val="accent2"/>
+          </a:lnRef>
+          <a:fillRef idx="2">
+            <a:schemeClr val="accent2"/>
+          </a:fillRef>
+          <a:effectRef idx="1">
+            <a:schemeClr val="accent2"/>
+          </a:effectRef>
+          <a:fontRef idx="minor">
+            <a:schemeClr val="dk1"/>
+          </a:fontRef>
+        </p:style>
+      </p:cxnSp>
+      <p:sp>
+        <p:nvSpPr>
+          <p:cNvPr id="52" name="Freeform 117">
+            <a:extLst>
+              <a:ext uri="{FF2B5EF4-FFF2-40B4-BE49-F238E27FC236}">
+                <a16:creationId xmlns:a16="http://schemas.microsoft.com/office/drawing/2014/main" id="{C5D837D6-11C7-4AC5-9C4A-987381F90ED6}"/>
+              </a:ext>
+            </a:extLst>
+          </p:cNvPr>
+          <p:cNvSpPr/>
+          <p:nvPr/>
+        </p:nvSpPr>
+        <p:spPr>
+          <a:xfrm flipV="1">
+            <a:off x="4115050" y="5128350"/>
+            <a:ext cx="2642195" cy="101600"/>
+          </a:xfrm>
+          <a:custGeom>
+            <a:avLst/>
+            <a:gdLst>
+              <a:gd name="connsiteX0" fmla="*/ 0 w 3048000"/>
+              <a:gd name="connsiteY0" fmla="*/ 203200 h 203200"/>
+              <a:gd name="connsiteX1" fmla="*/ 221673 w 3048000"/>
+              <a:gd name="connsiteY1" fmla="*/ 0 h 203200"/>
+              <a:gd name="connsiteX2" fmla="*/ 3048000 w 3048000"/>
+              <a:gd name="connsiteY2" fmla="*/ 0 h 203200"/>
+            </a:gdLst>
+            <a:ahLst/>
+            <a:cxnLst>
+              <a:cxn ang="0">
+                <a:pos x="connsiteX0" y="connsiteY0"/>
+              </a:cxn>
+              <a:cxn ang="0">
+                <a:pos x="connsiteX1" y="connsiteY1"/>
+              </a:cxn>
+              <a:cxn ang="0">
+                <a:pos x="connsiteX2" y="connsiteY2"/>
+              </a:cxn>
+            </a:cxnLst>
+            <a:rect l="l" t="t" r="r" b="b"/>
+            <a:pathLst>
+              <a:path w="3048000" h="203200">
+                <a:moveTo>
+                  <a:pt x="0" y="203200"/>
+                </a:moveTo>
+                <a:lnTo>
+                  <a:pt x="221673" y="0"/>
+                </a:lnTo>
+                <a:lnTo>
+                  <a:pt x="3048000" y="0"/>
+                </a:lnTo>
+              </a:path>
+            </a:pathLst>
+          </a:custGeom>
+          <a:noFill/>
+          <a:ln w="19050">
+            <a:solidFill>
+              <a:schemeClr val="accent3"/>
+            </a:solidFill>
+            <a:prstDash val="sysDot"/>
+            <a:headEnd type="none" w="med" len="med"/>
+            <a:tailEnd type="arrow" w="med" len="med"/>
+          </a:ln>
+          <a:effectLst/>
+        </p:spPr>
+        <p:style>
+          <a:lnRef idx="1">
+            <a:schemeClr val="accent2"/>
+          </a:lnRef>
+          <a:fillRef idx="2">
+            <a:schemeClr val="accent2"/>
+          </a:fillRef>
+          <a:effectRef idx="1">
+            <a:schemeClr val="accent2"/>
+          </a:effectRef>
+          <a:fontRef idx="minor">
+            <a:schemeClr val="dk1"/>
+          </a:fontRef>
+        </p:style>
+        <p:txBody>
+          <a:bodyPr rtlCol="0" anchor="ctr"/>
+          <a:lstStyle/>
+          <a:p>
+            <a:pPr algn="ctr"/>
+            <a:endParaRPr lang="en-SG"/>
+          </a:p>
+        </p:txBody>
+      </p:sp>
+      <p:cxnSp>
+        <p:nvCxnSpPr>
+          <p:cNvPr id="55" name="Elbow Connector 63">
+            <a:extLst>
+              <a:ext uri="{FF2B5EF4-FFF2-40B4-BE49-F238E27FC236}">
+                <a16:creationId xmlns:a16="http://schemas.microsoft.com/office/drawing/2014/main" id="{FF8DE650-26C9-4BA0-9FB2-454B15817AFA}"/>
+              </a:ext>
+            </a:extLst>
+          </p:cNvPr>
+          <p:cNvCxnSpPr>
+            <a:cxnSpLocks/>
+            <a:stCxn id="39" idx="2"/>
+            <a:endCxn id="46" idx="1"/>
+          </p:cNvCxnSpPr>
+          <p:nvPr/>
+        </p:nvCxnSpPr>
+        <p:spPr>
+          <a:xfrm rot="16200000" flipH="1">
+            <a:off x="1560112" y="3724039"/>
+            <a:ext cx="1886703" cy="174674"/>
+          </a:xfrm>
+          <a:prstGeom prst="bentConnector2">
+            <a:avLst/>
+          </a:prstGeom>
+          <a:ln w="19050">
+            <a:solidFill>
+              <a:schemeClr val="accent3"/>
+            </a:solidFill>
+            <a:headEnd type="none" w="med" len="med"/>
+            <a:tailEnd type="arrow" w="med" len="med"/>
+          </a:ln>
+          <a:effectLst/>
+        </p:spPr>
+        <p:style>
+          <a:lnRef idx="1">
+            <a:schemeClr val="accent2"/>
+          </a:lnRef>
+          <a:fillRef idx="2">
+            <a:schemeClr val="accent2"/>
+          </a:fillRef>
+          <a:effectRef idx="1">
+            <a:schemeClr val="accent2"/>
+          </a:effectRef>
+          <a:fontRef idx="minor">
+            <a:schemeClr val="dk1"/>
+          </a:fontRef>
+        </p:style>
+      </p:cxnSp>
+      <p:sp>
+        <p:nvSpPr>
+          <p:cNvPr id="57" name="Rectangle 11">
+            <a:extLst>
+              <a:ext uri="{FF2B5EF4-FFF2-40B4-BE49-F238E27FC236}">
+                <a16:creationId xmlns:a16="http://schemas.microsoft.com/office/drawing/2014/main" id="{D035B32D-902A-432A-BBA4-0589DAF70B9B}"/>
+              </a:ext>
+            </a:extLst>
+          </p:cNvPr>
+          <p:cNvSpPr/>
+          <p:nvPr/>
+        </p:nvSpPr>
+        <p:spPr>
+          <a:xfrm>
+            <a:off x="2613074" y="5269168"/>
+            <a:ext cx="1020359" cy="246020"/>
+          </a:xfrm>
+          <a:prstGeom prst="rect">
+            <a:avLst/>
+          </a:prstGeom>
+          <a:ln w="19050">
+            <a:solidFill>
+              <a:schemeClr val="accent3"/>
+            </a:solidFill>
+          </a:ln>
+          <a:effectLst/>
+        </p:spPr>
+        <p:style>
+          <a:lnRef idx="1">
+            <a:schemeClr val="accent3"/>
+          </a:lnRef>
+          <a:fillRef idx="2">
+            <a:schemeClr val="accent3"/>
+          </a:fillRef>
+          <a:effectRef idx="1">
+            <a:schemeClr val="accent3"/>
+          </a:effectRef>
+          <a:fontRef idx="minor">
+            <a:schemeClr val="dk1"/>
+          </a:fontRef>
+        </p:style>
+        <p:txBody>
+          <a:bodyPr rtlCol="0" anchor="ctr"/>
+          <a:lstStyle/>
+          <a:p>
+            <a:pPr algn="ctr"/>
+            <a:r>
+              <a:rPr lang="en-US" sz="1050" b="1" dirty="0" err="1">
+                <a:solidFill>
+                  <a:schemeClr val="accent3">
+                    <a:lumMod val="75000"/>
+                  </a:schemeClr>
+                </a:solidFill>
+              </a:rPr>
+              <a:t>ItemListPanel</a:t>
+            </a:r>
+            <a:endParaRPr lang="en-SG" sz="1050" b="1" dirty="0">
+              <a:solidFill>
+                <a:schemeClr val="accent3">
+                  <a:lumMod val="75000"/>
+                </a:schemeClr>
+              </a:solidFill>
+            </a:endParaRPr>
+          </a:p>
+        </p:txBody>
+      </p:sp>
+      <p:cxnSp>
+        <p:nvCxnSpPr>
+          <p:cNvPr id="59" name="Elbow Connector 63">
+            <a:extLst>
+              <a:ext uri="{FF2B5EF4-FFF2-40B4-BE49-F238E27FC236}">
+                <a16:creationId xmlns:a16="http://schemas.microsoft.com/office/drawing/2014/main" id="{CBA804DF-1331-4390-AA19-72A2B5038673}"/>
+              </a:ext>
+            </a:extLst>
+          </p:cNvPr>
+          <p:cNvCxnSpPr>
+            <a:cxnSpLocks/>
+            <a:stCxn id="16" idx="3"/>
+            <a:endCxn id="92" idx="3"/>
+          </p:cNvCxnSpPr>
+          <p:nvPr/>
+        </p:nvCxnSpPr>
+        <p:spPr>
+          <a:xfrm rot="5400000">
+            <a:off x="3647152" y="3748303"/>
+            <a:ext cx="3345121" cy="420514"/>
+          </a:xfrm>
+          <a:prstGeom prst="bentConnector2">
+            <a:avLst/>
+          </a:prstGeom>
+          <a:ln w="6350">
+            <a:solidFill>
+              <a:schemeClr val="accent3"/>
+            </a:solidFill>
+            <a:headEnd type="none" w="med" len="med"/>
+            <a:tailEnd type="none" w="med" len="med"/>
+          </a:ln>
+          <a:effectLst/>
+        </p:spPr>
+        <p:style>
+          <a:lnRef idx="1">
+            <a:schemeClr val="accent2"/>
+          </a:lnRef>
+          <a:fillRef idx="2">
+            <a:schemeClr val="accent2"/>
+          </a:fillRef>
+          <a:effectRef idx="1">
+            <a:schemeClr val="accent2"/>
+          </a:effectRef>
+          <a:fontRef idx="minor">
+            <a:schemeClr val="dk1"/>
+          </a:fontRef>
+        </p:style>
+      </p:cxnSp>
+      <p:cxnSp>
+        <p:nvCxnSpPr>
+          <p:cNvPr id="60" name="Elbow Connector 136">
+            <a:extLst>
+              <a:ext uri="{FF2B5EF4-FFF2-40B4-BE49-F238E27FC236}">
+                <a16:creationId xmlns:a16="http://schemas.microsoft.com/office/drawing/2014/main" id="{B7842E2F-F907-4253-AFD0-5D66309C7575}"/>
+              </a:ext>
+            </a:extLst>
+          </p:cNvPr>
+          <p:cNvCxnSpPr>
+            <a:cxnSpLocks/>
+            <a:stCxn id="57" idx="2"/>
+            <a:endCxn id="92" idx="1"/>
+          </p:cNvCxnSpPr>
+          <p:nvPr/>
+        </p:nvCxnSpPr>
+        <p:spPr>
+          <a:xfrm rot="16200000" flipH="1">
+            <a:off x="3484861" y="5153581"/>
+            <a:ext cx="115933" cy="839146"/>
+          </a:xfrm>
+          <a:prstGeom prst="bentConnector2">
+            <a:avLst/>
+          </a:prstGeom>
+          <a:ln w="19050">
+            <a:solidFill>
+              <a:schemeClr val="accent3"/>
+            </a:solidFill>
+            <a:headEnd type="none" w="med" len="med"/>
+            <a:tailEnd type="arrow" w="med" len="med"/>
+          </a:ln>
+          <a:effectLst/>
+        </p:spPr>
+        <p:style>
+          <a:lnRef idx="1">
+            <a:schemeClr val="accent2"/>
+          </a:lnRef>
+          <a:fillRef idx="2">
+            <a:schemeClr val="accent2"/>
+          </a:fillRef>
+          <a:effectRef idx="1">
+            <a:schemeClr val="accent2"/>
+          </a:effectRef>
+          <a:fontRef idx="minor">
+            <a:schemeClr val="dk1"/>
+          </a:fontRef>
+        </p:style>
+      </p:cxnSp>
+      <p:sp>
+        <p:nvSpPr>
+          <p:cNvPr id="61" name="Freeform 117">
+            <a:extLst>
+              <a:ext uri="{FF2B5EF4-FFF2-40B4-BE49-F238E27FC236}">
+                <a16:creationId xmlns:a16="http://schemas.microsoft.com/office/drawing/2014/main" id="{BC4651B5-A347-4926-8D08-4B0195A778F0}"/>
+              </a:ext>
+            </a:extLst>
+          </p:cNvPr>
+          <p:cNvSpPr/>
+          <p:nvPr/>
+        </p:nvSpPr>
+        <p:spPr>
+          <a:xfrm flipV="1">
+            <a:off x="4175782" y="5738260"/>
+            <a:ext cx="2559733" cy="162228"/>
+          </a:xfrm>
+          <a:custGeom>
+            <a:avLst/>
+            <a:gdLst>
+              <a:gd name="connsiteX0" fmla="*/ 0 w 3048000"/>
+              <a:gd name="connsiteY0" fmla="*/ 203200 h 203200"/>
+              <a:gd name="connsiteX1" fmla="*/ 221673 w 3048000"/>
+              <a:gd name="connsiteY1" fmla="*/ 0 h 203200"/>
+              <a:gd name="connsiteX2" fmla="*/ 3048000 w 3048000"/>
+              <a:gd name="connsiteY2" fmla="*/ 0 h 203200"/>
+            </a:gdLst>
+            <a:ahLst/>
+            <a:cxnLst>
+              <a:cxn ang="0">
+                <a:pos x="connsiteX0" y="connsiteY0"/>
+              </a:cxn>
+              <a:cxn ang="0">
+                <a:pos x="connsiteX1" y="connsiteY1"/>
+              </a:cxn>
+              <a:cxn ang="0">
+                <a:pos x="connsiteX2" y="connsiteY2"/>
+              </a:cxn>
+            </a:cxnLst>
+            <a:rect l="l" t="t" r="r" b="b"/>
+            <a:pathLst>
+              <a:path w="3048000" h="203200">
+                <a:moveTo>
+                  <a:pt x="0" y="203200"/>
+                </a:moveTo>
+                <a:lnTo>
+                  <a:pt x="221673" y="0"/>
+                </a:lnTo>
+                <a:lnTo>
+                  <a:pt x="3048000" y="0"/>
+                </a:lnTo>
+              </a:path>
+            </a:pathLst>
+          </a:custGeom>
+          <a:noFill/>
+          <a:ln w="19050">
+            <a:solidFill>
+              <a:schemeClr val="accent3"/>
+            </a:solidFill>
+            <a:prstDash val="sysDot"/>
+            <a:headEnd type="none" w="med" len="med"/>
+            <a:tailEnd type="arrow" w="med" len="med"/>
+          </a:ln>
+          <a:effectLst/>
+        </p:spPr>
+        <p:style>
+          <a:lnRef idx="1">
+            <a:schemeClr val="accent2"/>
+          </a:lnRef>
+          <a:fillRef idx="2">
+            <a:schemeClr val="accent2"/>
+          </a:fillRef>
+          <a:effectRef idx="1">
+            <a:schemeClr val="accent2"/>
+          </a:effectRef>
+          <a:fontRef idx="minor">
+            <a:schemeClr val="dk1"/>
+          </a:fontRef>
+        </p:style>
+        <p:txBody>
+          <a:bodyPr rtlCol="0" anchor="ctr"/>
+          <a:lstStyle/>
+          <a:p>
+            <a:pPr algn="ctr"/>
+            <a:endParaRPr lang="en-SG"/>
+          </a:p>
+        </p:txBody>
+      </p:sp>
+      <p:cxnSp>
+        <p:nvCxnSpPr>
+          <p:cNvPr id="62" name="Elbow Connector 63">
+            <a:extLst>
+              <a:ext uri="{FF2B5EF4-FFF2-40B4-BE49-F238E27FC236}">
+                <a16:creationId xmlns:a16="http://schemas.microsoft.com/office/drawing/2014/main" id="{B21686D0-7A53-414F-8C1D-6A9C235FF6E4}"/>
+              </a:ext>
+            </a:extLst>
+          </p:cNvPr>
+          <p:cNvCxnSpPr>
+            <a:cxnSpLocks/>
+            <a:stCxn id="39" idx="2"/>
+            <a:endCxn id="57" idx="1"/>
+          </p:cNvCxnSpPr>
+          <p:nvPr/>
+        </p:nvCxnSpPr>
+        <p:spPr>
+          <a:xfrm rot="16200000" flipH="1">
+            <a:off x="1252524" y="4031627"/>
+            <a:ext cx="2524153" cy="196948"/>
+          </a:xfrm>
+          <a:prstGeom prst="bentConnector2">
+            <a:avLst/>
+          </a:prstGeom>
+          <a:ln w="19050">
+            <a:solidFill>
+              <a:schemeClr val="accent3"/>
+            </a:solidFill>
+            <a:headEnd type="none" w="med" len="med"/>
+            <a:tailEnd type="arrow" w="med" len="med"/>
+          </a:ln>
+          <a:effectLst/>
+        </p:spPr>
+        <p:style>
+          <a:lnRef idx="1">
+            <a:schemeClr val="accent2"/>
+          </a:lnRef>
+          <a:fillRef idx="2">
+            <a:schemeClr val="accent2"/>
+          </a:fillRef>
+          <a:effectRef idx="1">
+            <a:schemeClr val="accent2"/>
+          </a:effectRef>
+          <a:fontRef idx="minor">
+            <a:schemeClr val="dk1"/>
+          </a:fontRef>
+        </p:style>
+      </p:cxnSp>
+      <p:sp>
+        <p:nvSpPr>
+          <p:cNvPr id="75" name="Rectangle 11">
+            <a:extLst>
+              <a:ext uri="{FF2B5EF4-FFF2-40B4-BE49-F238E27FC236}">
+                <a16:creationId xmlns:a16="http://schemas.microsoft.com/office/drawing/2014/main" id="{38B9029B-E8F4-42C4-A59B-2CFA317D6578}"/>
+              </a:ext>
+            </a:extLst>
+          </p:cNvPr>
+          <p:cNvSpPr/>
+          <p:nvPr/>
+        </p:nvSpPr>
+        <p:spPr>
+          <a:xfrm>
+            <a:off x="2635348" y="5830144"/>
+            <a:ext cx="1366726" cy="246020"/>
+          </a:xfrm>
+          <a:prstGeom prst="rect">
+            <a:avLst/>
+          </a:prstGeom>
+          <a:ln w="19050">
+            <a:solidFill>
+              <a:schemeClr val="accent3"/>
+            </a:solidFill>
+          </a:ln>
+          <a:effectLst/>
+        </p:spPr>
+        <p:style>
+          <a:lnRef idx="1">
+            <a:schemeClr val="accent3"/>
+          </a:lnRef>
+          <a:fillRef idx="2">
+            <a:schemeClr val="accent3"/>
+          </a:fillRef>
+          <a:effectRef idx="1">
+            <a:schemeClr val="accent3"/>
+          </a:effectRef>
+          <a:fontRef idx="minor">
+            <a:schemeClr val="dk1"/>
+          </a:fontRef>
+        </p:style>
+        <p:txBody>
+          <a:bodyPr rtlCol="0" anchor="ctr"/>
+          <a:lstStyle/>
+          <a:p>
+            <a:pPr algn="ctr"/>
+            <a:r>
+              <a:rPr lang="en-US" sz="1050" b="1" dirty="0" err="1">
+                <a:solidFill>
+                  <a:schemeClr val="accent3">
+                    <a:lumMod val="75000"/>
+                  </a:schemeClr>
+                </a:solidFill>
+              </a:rPr>
+              <a:t>ReservationListPanel</a:t>
+            </a:r>
+            <a:endParaRPr lang="en-SG" sz="1050" b="1" dirty="0">
+              <a:solidFill>
+                <a:schemeClr val="accent3">
+                  <a:lumMod val="75000"/>
+                </a:schemeClr>
+              </a:solidFill>
+            </a:endParaRPr>
+          </a:p>
+        </p:txBody>
+      </p:sp>
+      <p:sp>
+        <p:nvSpPr>
+          <p:cNvPr id="76" name="Rectangle 11">
+            <a:extLst>
+              <a:ext uri="{FF2B5EF4-FFF2-40B4-BE49-F238E27FC236}">
+                <a16:creationId xmlns:a16="http://schemas.microsoft.com/office/drawing/2014/main" id="{66FEF5AF-FDBB-4FD1-BB04-B343A11FA3B2}"/>
+              </a:ext>
+            </a:extLst>
+          </p:cNvPr>
+          <p:cNvSpPr/>
+          <p:nvPr/>
+        </p:nvSpPr>
+        <p:spPr>
+          <a:xfrm>
+            <a:off x="4110745" y="6098452"/>
+            <a:ext cx="1147055" cy="205374"/>
+          </a:xfrm>
+          <a:prstGeom prst="rect">
+            <a:avLst/>
+          </a:prstGeom>
+          <a:ln w="19050">
+            <a:solidFill>
+              <a:schemeClr val="accent3"/>
+            </a:solidFill>
+          </a:ln>
+          <a:effectLst/>
+        </p:spPr>
+        <p:style>
+          <a:lnRef idx="1">
+            <a:schemeClr val="accent3"/>
+          </a:lnRef>
+          <a:fillRef idx="2">
+            <a:schemeClr val="accent3"/>
+          </a:fillRef>
+          <a:effectRef idx="1">
+            <a:schemeClr val="accent3"/>
+          </a:effectRef>
+          <a:fontRef idx="minor">
+            <a:schemeClr val="dk1"/>
+          </a:fontRef>
+        </p:style>
+        <p:txBody>
+          <a:bodyPr rtlCol="0" anchor="ctr"/>
+          <a:lstStyle/>
+          <a:p>
+            <a:pPr algn="ctr"/>
+            <a:r>
+              <a:rPr lang="en-US" sz="1050" b="1" dirty="0" err="1">
+                <a:solidFill>
+                  <a:schemeClr val="accent3">
+                    <a:lumMod val="75000"/>
+                  </a:schemeClr>
+                </a:solidFill>
+              </a:rPr>
+              <a:t>ReservationCard</a:t>
+            </a:r>
+            <a:endParaRPr lang="en-SG" sz="1050" b="1" dirty="0">
+              <a:solidFill>
+                <a:schemeClr val="accent3">
+                  <a:lumMod val="75000"/>
+                </a:schemeClr>
+              </a:solidFill>
+            </a:endParaRPr>
+          </a:p>
+        </p:txBody>
+      </p:sp>
+      <p:cxnSp>
+        <p:nvCxnSpPr>
+          <p:cNvPr id="78" name="Elbow Connector 136">
+            <a:extLst>
+              <a:ext uri="{FF2B5EF4-FFF2-40B4-BE49-F238E27FC236}">
+                <a16:creationId xmlns:a16="http://schemas.microsoft.com/office/drawing/2014/main" id="{D55E06A5-3126-4D29-A739-D1DA5ED0D1C7}"/>
+              </a:ext>
+            </a:extLst>
+          </p:cNvPr>
+          <p:cNvCxnSpPr>
+            <a:cxnSpLocks/>
+            <a:stCxn id="75" idx="2"/>
+            <a:endCxn id="76" idx="1"/>
+          </p:cNvCxnSpPr>
+          <p:nvPr/>
+        </p:nvCxnSpPr>
+        <p:spPr>
+          <a:xfrm rot="16200000" flipH="1">
+            <a:off x="3652241" y="5742634"/>
+            <a:ext cx="124975" cy="792034"/>
+          </a:xfrm>
+          <a:prstGeom prst="bentConnector2">
+            <a:avLst/>
+          </a:prstGeom>
+          <a:ln w="19050">
+            <a:solidFill>
+              <a:schemeClr val="accent3"/>
+            </a:solidFill>
+            <a:headEnd type="none" w="med" len="med"/>
+            <a:tailEnd type="arrow" w="med" len="med"/>
+          </a:ln>
+          <a:effectLst/>
+        </p:spPr>
+        <p:style>
+          <a:lnRef idx="1">
+            <a:schemeClr val="accent2"/>
+          </a:lnRef>
+          <a:fillRef idx="2">
+            <a:schemeClr val="accent2"/>
+          </a:fillRef>
+          <a:effectRef idx="1">
+            <a:schemeClr val="accent2"/>
+          </a:effectRef>
+          <a:fontRef idx="minor">
+            <a:schemeClr val="dk1"/>
+          </a:fontRef>
+        </p:style>
+      </p:cxnSp>
+      <p:sp>
+        <p:nvSpPr>
+          <p:cNvPr id="79" name="Freeform 117">
+            <a:extLst>
+              <a:ext uri="{FF2B5EF4-FFF2-40B4-BE49-F238E27FC236}">
+                <a16:creationId xmlns:a16="http://schemas.microsoft.com/office/drawing/2014/main" id="{05E93C67-58DE-4236-B1EB-68190B6D1212}"/>
+              </a:ext>
+            </a:extLst>
+          </p:cNvPr>
+          <p:cNvSpPr/>
+          <p:nvPr/>
+        </p:nvSpPr>
+        <p:spPr>
+          <a:xfrm flipV="1">
+            <a:off x="4276950" y="6310191"/>
+            <a:ext cx="2443956" cy="117496"/>
+          </a:xfrm>
+          <a:custGeom>
+            <a:avLst/>
+            <a:gdLst>
+              <a:gd name="connsiteX0" fmla="*/ 0 w 3048000"/>
+              <a:gd name="connsiteY0" fmla="*/ 203200 h 203200"/>
+              <a:gd name="connsiteX1" fmla="*/ 221673 w 3048000"/>
+              <a:gd name="connsiteY1" fmla="*/ 0 h 203200"/>
+              <a:gd name="connsiteX2" fmla="*/ 3048000 w 3048000"/>
+              <a:gd name="connsiteY2" fmla="*/ 0 h 203200"/>
+            </a:gdLst>
+            <a:ahLst/>
+            <a:cxnLst>
+              <a:cxn ang="0">
+                <a:pos x="connsiteX0" y="connsiteY0"/>
+              </a:cxn>
+              <a:cxn ang="0">
+                <a:pos x="connsiteX1" y="connsiteY1"/>
+              </a:cxn>
+              <a:cxn ang="0">
+                <a:pos x="connsiteX2" y="connsiteY2"/>
+              </a:cxn>
+            </a:cxnLst>
+            <a:rect l="l" t="t" r="r" b="b"/>
+            <a:pathLst>
+              <a:path w="3048000" h="203200">
+                <a:moveTo>
+                  <a:pt x="0" y="203200"/>
+                </a:moveTo>
+                <a:lnTo>
+                  <a:pt x="221673" y="0"/>
+                </a:lnTo>
+                <a:lnTo>
+                  <a:pt x="3048000" y="0"/>
+                </a:lnTo>
+              </a:path>
+            </a:pathLst>
+          </a:custGeom>
+          <a:noFill/>
+          <a:ln w="19050">
+            <a:solidFill>
+              <a:schemeClr val="accent3"/>
+            </a:solidFill>
+            <a:prstDash val="sysDot"/>
+            <a:headEnd type="none" w="med" len="med"/>
+            <a:tailEnd type="arrow" w="med" len="med"/>
+          </a:ln>
+          <a:effectLst/>
+        </p:spPr>
+        <p:style>
+          <a:lnRef idx="1">
+            <a:schemeClr val="accent2"/>
+          </a:lnRef>
+          <a:fillRef idx="2">
+            <a:schemeClr val="accent2"/>
+          </a:fillRef>
+          <a:effectRef idx="1">
+            <a:schemeClr val="accent2"/>
+          </a:effectRef>
+          <a:fontRef idx="minor">
+            <a:schemeClr val="dk1"/>
+          </a:fontRef>
+        </p:style>
+        <p:txBody>
+          <a:bodyPr rtlCol="0" anchor="ctr"/>
+          <a:lstStyle/>
+          <a:p>
+            <a:pPr algn="ctr"/>
+            <a:endParaRPr lang="en-SG"/>
+          </a:p>
+        </p:txBody>
+      </p:sp>
+      <p:cxnSp>
+        <p:nvCxnSpPr>
+          <p:cNvPr id="80" name="Elbow Connector 63">
+            <a:extLst>
+              <a:ext uri="{FF2B5EF4-FFF2-40B4-BE49-F238E27FC236}">
+                <a16:creationId xmlns:a16="http://schemas.microsoft.com/office/drawing/2014/main" id="{BC1BE101-DC11-425D-966E-7788666C2509}"/>
+              </a:ext>
+            </a:extLst>
+          </p:cNvPr>
+          <p:cNvCxnSpPr>
+            <a:cxnSpLocks/>
+            <a:stCxn id="39" idx="2"/>
+            <a:endCxn id="75" idx="1"/>
+          </p:cNvCxnSpPr>
+          <p:nvPr/>
+        </p:nvCxnSpPr>
+        <p:spPr>
+          <a:xfrm rot="16200000" flipH="1">
+            <a:off x="983173" y="4300978"/>
+            <a:ext cx="3085129" cy="219222"/>
+          </a:xfrm>
+          <a:prstGeom prst="bentConnector2">
+            <a:avLst/>
+          </a:prstGeom>
+          <a:ln w="19050">
+            <a:solidFill>
+              <a:schemeClr val="accent3"/>
+            </a:solidFill>
+            <a:headEnd type="none" w="med" len="med"/>
+            <a:tailEnd type="arrow" w="med" len="med"/>
+          </a:ln>
+          <a:effectLst/>
+        </p:spPr>
+        <p:style>
+          <a:lnRef idx="1">
+            <a:schemeClr val="accent2"/>
+          </a:lnRef>
+          <a:fillRef idx="2">
+            <a:schemeClr val="accent2"/>
+          </a:fillRef>
+          <a:effectRef idx="1">
+            <a:schemeClr val="accent2"/>
+          </a:effectRef>
+          <a:fontRef idx="minor">
+            <a:schemeClr val="dk1"/>
+          </a:fontRef>
+        </p:style>
+      </p:cxnSp>
+      <p:sp>
+        <p:nvSpPr>
+          <p:cNvPr id="83" name="Rectangle 11">
+            <a:extLst>
+              <a:ext uri="{FF2B5EF4-FFF2-40B4-BE49-F238E27FC236}">
+                <a16:creationId xmlns:a16="http://schemas.microsoft.com/office/drawing/2014/main" id="{B0D4192D-55A2-4BCE-991F-68223CCD45E2}"/>
+              </a:ext>
+            </a:extLst>
+          </p:cNvPr>
+          <p:cNvSpPr/>
+          <p:nvPr/>
+        </p:nvSpPr>
+        <p:spPr>
+          <a:xfrm>
+            <a:off x="2620041" y="6412168"/>
+            <a:ext cx="1366726" cy="246020"/>
+          </a:xfrm>
+          <a:prstGeom prst="rect">
+            <a:avLst/>
+          </a:prstGeom>
+          <a:ln w="19050">
+            <a:solidFill>
+              <a:schemeClr val="accent3"/>
+            </a:solidFill>
+          </a:ln>
+          <a:effectLst/>
+        </p:spPr>
+        <p:style>
+          <a:lnRef idx="1">
+            <a:schemeClr val="accent3"/>
+          </a:lnRef>
+          <a:fillRef idx="2">
+            <a:schemeClr val="accent3"/>
+          </a:fillRef>
+          <a:effectRef idx="1">
+            <a:schemeClr val="accent3"/>
+          </a:effectRef>
+          <a:fontRef idx="minor">
+            <a:schemeClr val="dk1"/>
+          </a:fontRef>
+        </p:style>
+        <p:txBody>
+          <a:bodyPr rtlCol="0" anchor="ctr"/>
+          <a:lstStyle/>
+          <a:p>
+            <a:pPr algn="ctr"/>
+            <a:r>
+              <a:rPr lang="en-US" sz="1050" b="1" dirty="0" err="1">
+                <a:solidFill>
+                  <a:schemeClr val="accent3">
+                    <a:lumMod val="75000"/>
+                  </a:schemeClr>
+                </a:solidFill>
+              </a:rPr>
+              <a:t>RecordListPanel</a:t>
+            </a:r>
+            <a:endParaRPr lang="en-SG" sz="1050" b="1" dirty="0">
+              <a:solidFill>
+                <a:schemeClr val="accent3">
+                  <a:lumMod val="75000"/>
+                </a:schemeClr>
+              </a:solidFill>
+            </a:endParaRPr>
+          </a:p>
+        </p:txBody>
+      </p:sp>
+      <p:sp>
+        <p:nvSpPr>
+          <p:cNvPr id="84" name="Rectangle 11">
+            <a:extLst>
+              <a:ext uri="{FF2B5EF4-FFF2-40B4-BE49-F238E27FC236}">
+                <a16:creationId xmlns:a16="http://schemas.microsoft.com/office/drawing/2014/main" id="{D9E22B85-F282-4FE6-B0F4-F29D6A2799EB}"/>
+              </a:ext>
+            </a:extLst>
+          </p:cNvPr>
+          <p:cNvSpPr/>
+          <p:nvPr/>
+        </p:nvSpPr>
+        <p:spPr>
+          <a:xfrm>
+            <a:off x="4095438" y="6680476"/>
+            <a:ext cx="1147055" cy="205374"/>
+          </a:xfrm>
+          <a:prstGeom prst="rect">
+            <a:avLst/>
+          </a:prstGeom>
+          <a:ln w="19050">
+            <a:solidFill>
+              <a:schemeClr val="accent3"/>
+            </a:solidFill>
+          </a:ln>
+          <a:effectLst/>
+        </p:spPr>
+        <p:style>
+          <a:lnRef idx="1">
+            <a:schemeClr val="accent3"/>
+          </a:lnRef>
+          <a:fillRef idx="2">
+            <a:schemeClr val="accent3"/>
+          </a:fillRef>
+          <a:effectRef idx="1">
+            <a:schemeClr val="accent3"/>
+          </a:effectRef>
+          <a:fontRef idx="minor">
+            <a:schemeClr val="dk1"/>
+          </a:fontRef>
+        </p:style>
+        <p:txBody>
+          <a:bodyPr rtlCol="0" anchor="ctr"/>
+          <a:lstStyle/>
+          <a:p>
+            <a:pPr algn="ctr"/>
+            <a:r>
+              <a:rPr lang="en-US" sz="1050" b="1" dirty="0" err="1">
+                <a:solidFill>
+                  <a:schemeClr val="accent3">
+                    <a:lumMod val="75000"/>
+                  </a:schemeClr>
+                </a:solidFill>
+              </a:rPr>
+              <a:t>RecordCard</a:t>
+            </a:r>
+            <a:endParaRPr lang="en-SG" sz="1050" b="1" dirty="0">
+              <a:solidFill>
+                <a:schemeClr val="accent3">
+                  <a:lumMod val="75000"/>
+                </a:schemeClr>
+              </a:solidFill>
+            </a:endParaRPr>
+          </a:p>
+        </p:txBody>
+      </p:sp>
+      <p:cxnSp>
+        <p:nvCxnSpPr>
+          <p:cNvPr id="85" name="Elbow Connector 136">
+            <a:extLst>
+              <a:ext uri="{FF2B5EF4-FFF2-40B4-BE49-F238E27FC236}">
+                <a16:creationId xmlns:a16="http://schemas.microsoft.com/office/drawing/2014/main" id="{F2DA7E5D-640F-4DA9-A45E-D5CE3FFC3331}"/>
+              </a:ext>
+            </a:extLst>
+          </p:cNvPr>
+          <p:cNvCxnSpPr>
+            <a:cxnSpLocks/>
+            <a:stCxn id="83" idx="2"/>
+            <a:endCxn id="84" idx="1"/>
+          </p:cNvCxnSpPr>
+          <p:nvPr/>
+        </p:nvCxnSpPr>
+        <p:spPr>
+          <a:xfrm rot="16200000" flipH="1">
+            <a:off x="3636934" y="6324658"/>
+            <a:ext cx="124975" cy="792034"/>
+          </a:xfrm>
+          <a:prstGeom prst="bentConnector2">
+            <a:avLst/>
+          </a:prstGeom>
+          <a:ln w="19050">
+            <a:solidFill>
+              <a:schemeClr val="accent3"/>
+            </a:solidFill>
+            <a:headEnd type="none" w="med" len="med"/>
+            <a:tailEnd type="arrow" w="med" len="med"/>
+          </a:ln>
+          <a:effectLst/>
+        </p:spPr>
+        <p:style>
+          <a:lnRef idx="1">
+            <a:schemeClr val="accent2"/>
+          </a:lnRef>
+          <a:fillRef idx="2">
+            <a:schemeClr val="accent2"/>
+          </a:fillRef>
+          <a:effectRef idx="1">
+            <a:schemeClr val="accent2"/>
+          </a:effectRef>
+          <a:fontRef idx="minor">
+            <a:schemeClr val="dk1"/>
+          </a:fontRef>
+        </p:style>
+      </p:cxnSp>
+      <p:sp>
+        <p:nvSpPr>
+          <p:cNvPr id="86" name="Freeform 117">
+            <a:extLst>
+              <a:ext uri="{FF2B5EF4-FFF2-40B4-BE49-F238E27FC236}">
+                <a16:creationId xmlns:a16="http://schemas.microsoft.com/office/drawing/2014/main" id="{847D5359-7F96-4798-8755-BFC1481996A4}"/>
+              </a:ext>
+            </a:extLst>
+          </p:cNvPr>
+          <p:cNvSpPr/>
+          <p:nvPr/>
+        </p:nvSpPr>
+        <p:spPr>
+          <a:xfrm flipV="1">
+            <a:off x="4276950" y="6879830"/>
+            <a:ext cx="2458566" cy="117496"/>
+          </a:xfrm>
+          <a:custGeom>
+            <a:avLst/>
+            <a:gdLst>
+              <a:gd name="connsiteX0" fmla="*/ 0 w 3048000"/>
+              <a:gd name="connsiteY0" fmla="*/ 203200 h 203200"/>
+              <a:gd name="connsiteX1" fmla="*/ 221673 w 3048000"/>
+              <a:gd name="connsiteY1" fmla="*/ 0 h 203200"/>
+              <a:gd name="connsiteX2" fmla="*/ 3048000 w 3048000"/>
+              <a:gd name="connsiteY2" fmla="*/ 0 h 203200"/>
+            </a:gdLst>
+            <a:ahLst/>
+            <a:cxnLst>
+              <a:cxn ang="0">
+                <a:pos x="connsiteX0" y="connsiteY0"/>
+              </a:cxn>
+              <a:cxn ang="0">
+                <a:pos x="connsiteX1" y="connsiteY1"/>
+              </a:cxn>
+              <a:cxn ang="0">
+                <a:pos x="connsiteX2" y="connsiteY2"/>
+              </a:cxn>
+            </a:cxnLst>
+            <a:rect l="l" t="t" r="r" b="b"/>
+            <a:pathLst>
+              <a:path w="3048000" h="203200">
+                <a:moveTo>
+                  <a:pt x="0" y="203200"/>
+                </a:moveTo>
+                <a:lnTo>
+                  <a:pt x="221673" y="0"/>
+                </a:lnTo>
+                <a:lnTo>
+                  <a:pt x="3048000" y="0"/>
+                </a:lnTo>
+              </a:path>
+            </a:pathLst>
+          </a:custGeom>
+          <a:noFill/>
+          <a:ln w="19050">
+            <a:solidFill>
+              <a:schemeClr val="accent3"/>
+            </a:solidFill>
+            <a:prstDash val="sysDot"/>
+            <a:headEnd type="none" w="med" len="med"/>
+            <a:tailEnd type="arrow" w="med" len="med"/>
+          </a:ln>
+          <a:effectLst/>
+        </p:spPr>
+        <p:style>
+          <a:lnRef idx="1">
+            <a:schemeClr val="accent2"/>
+          </a:lnRef>
+          <a:fillRef idx="2">
+            <a:schemeClr val="accent2"/>
+          </a:fillRef>
+          <a:effectRef idx="1">
+            <a:schemeClr val="accent2"/>
+          </a:effectRef>
+          <a:fontRef idx="minor">
+            <a:schemeClr val="dk1"/>
+          </a:fontRef>
+        </p:style>
+        <p:txBody>
+          <a:bodyPr rtlCol="0" anchor="ctr"/>
+          <a:lstStyle/>
+          <a:p>
+            <a:pPr algn="ctr"/>
+            <a:endParaRPr lang="en-SG"/>
+          </a:p>
+        </p:txBody>
+      </p:sp>
+      <p:cxnSp>
+        <p:nvCxnSpPr>
+          <p:cNvPr id="87" name="Elbow Connector 63">
+            <a:extLst>
+              <a:ext uri="{FF2B5EF4-FFF2-40B4-BE49-F238E27FC236}">
+                <a16:creationId xmlns:a16="http://schemas.microsoft.com/office/drawing/2014/main" id="{5FD66F0D-40CA-4102-972B-88DD475AB16F}"/>
+              </a:ext>
+            </a:extLst>
+          </p:cNvPr>
+          <p:cNvCxnSpPr>
+            <a:cxnSpLocks/>
+            <a:stCxn id="39" idx="2"/>
+            <a:endCxn id="83" idx="1"/>
+          </p:cNvCxnSpPr>
+          <p:nvPr/>
+        </p:nvCxnSpPr>
+        <p:spPr>
+          <a:xfrm rot="16200000" flipH="1">
+            <a:off x="684507" y="4599643"/>
+            <a:ext cx="3667153" cy="203915"/>
+          </a:xfrm>
+          <a:prstGeom prst="bentConnector2">
+            <a:avLst/>
+          </a:prstGeom>
+          <a:ln w="19050">
+            <a:solidFill>
+              <a:schemeClr val="accent3"/>
+            </a:solidFill>
+            <a:headEnd type="none" w="med" len="med"/>
+            <a:tailEnd type="arrow" w="med" len="med"/>
+          </a:ln>
+          <a:effectLst/>
+        </p:spPr>
+        <p:style>
+          <a:lnRef idx="1">
+            <a:schemeClr val="accent2"/>
+          </a:lnRef>
+          <a:fillRef idx="2">
+            <a:schemeClr val="accent2"/>
+          </a:fillRef>
+          <a:effectRef idx="1">
+            <a:schemeClr val="accent2"/>
+          </a:effectRef>
+          <a:fontRef idx="minor">
+            <a:schemeClr val="dk1"/>
+          </a:fontRef>
+        </p:style>
+      </p:cxnSp>
+      <p:sp>
+        <p:nvSpPr>
+          <p:cNvPr id="92" name="Rectangle 11">
+            <a:extLst>
+              <a:ext uri="{FF2B5EF4-FFF2-40B4-BE49-F238E27FC236}">
+                <a16:creationId xmlns:a16="http://schemas.microsoft.com/office/drawing/2014/main" id="{386138D9-B0AB-43B2-8A61-F664C0320673}"/>
+              </a:ext>
+            </a:extLst>
+          </p:cNvPr>
+          <p:cNvSpPr/>
+          <p:nvPr/>
+        </p:nvSpPr>
+        <p:spPr>
+          <a:xfrm>
+            <a:off x="3962400" y="5528434"/>
+            <a:ext cx="1147055" cy="205374"/>
+          </a:xfrm>
+          <a:prstGeom prst="rect">
+            <a:avLst/>
+          </a:prstGeom>
+          <a:ln w="19050">
+            <a:solidFill>
+              <a:schemeClr val="accent3"/>
+            </a:solidFill>
+          </a:ln>
+          <a:effectLst/>
+        </p:spPr>
+        <p:style>
+          <a:lnRef idx="1">
+            <a:schemeClr val="accent3"/>
+          </a:lnRef>
+          <a:fillRef idx="2">
+            <a:schemeClr val="accent3"/>
+          </a:fillRef>
+          <a:effectRef idx="1">
+            <a:schemeClr val="accent3"/>
+          </a:effectRef>
+          <a:fontRef idx="minor">
+            <a:schemeClr val="dk1"/>
+          </a:fontRef>
+        </p:style>
+        <p:txBody>
+          <a:bodyPr rtlCol="0" anchor="ctr"/>
+          <a:lstStyle/>
+          <a:p>
+            <a:pPr algn="ctr"/>
+            <a:r>
+              <a:rPr lang="en-US" sz="1050" b="1" dirty="0" err="1">
+                <a:solidFill>
+                  <a:schemeClr val="accent3">
+                    <a:lumMod val="75000"/>
+                  </a:schemeClr>
+                </a:solidFill>
+              </a:rPr>
+              <a:t>ItemCard</a:t>
+            </a:r>
+            <a:endParaRPr lang="en-SG" sz="1050" b="1" dirty="0">
+              <a:solidFill>
+                <a:schemeClr val="accent3">
+                  <a:lumMod val="75000"/>
+                </a:schemeClr>
+              </a:solidFill>
+            </a:endParaRPr>
+          </a:p>
+        </p:txBody>
+      </p:sp>
+      <p:cxnSp>
+        <p:nvCxnSpPr>
+          <p:cNvPr id="97" name="Elbow Connector 63">
+            <a:extLst>
+              <a:ext uri="{FF2B5EF4-FFF2-40B4-BE49-F238E27FC236}">
+                <a16:creationId xmlns:a16="http://schemas.microsoft.com/office/drawing/2014/main" id="{11D0CB64-2D38-4F02-9993-DFB68283E852}"/>
+              </a:ext>
+            </a:extLst>
+          </p:cNvPr>
+          <p:cNvCxnSpPr>
+            <a:cxnSpLocks/>
+            <a:stCxn id="16" idx="3"/>
+            <a:endCxn id="84" idx="3"/>
+          </p:cNvCxnSpPr>
+          <p:nvPr/>
+        </p:nvCxnSpPr>
+        <p:spPr>
+          <a:xfrm rot="5400000">
+            <a:off x="3137650" y="4390843"/>
+            <a:ext cx="4497163" cy="287476"/>
+          </a:xfrm>
+          <a:prstGeom prst="bentConnector2">
+            <a:avLst/>
+          </a:prstGeom>
+          <a:ln w="6350">
+            <a:solidFill>
+              <a:schemeClr val="accent3"/>
+            </a:solidFill>
+            <a:headEnd type="none" w="med" len="med"/>
+            <a:tailEnd type="none" w="med" len="med"/>
+          </a:ln>
+          <a:effectLst/>
+        </p:spPr>
+        <p:style>
+          <a:lnRef idx="1">
+            <a:schemeClr val="accent2"/>
+          </a:lnRef>
+          <a:fillRef idx="2">
+            <a:schemeClr val="accent2"/>
+          </a:fillRef>
+          <a:effectRef idx="1">
+            <a:schemeClr val="accent2"/>
+          </a:effectRef>
+          <a:fontRef idx="minor">
+            <a:schemeClr val="dk1"/>
+          </a:fontRef>
+        </p:style>
+      </p:cxnSp>
+      <p:cxnSp>
+        <p:nvCxnSpPr>
+          <p:cNvPr id="100" name="Elbow Connector 63">
+            <a:extLst>
+              <a:ext uri="{FF2B5EF4-FFF2-40B4-BE49-F238E27FC236}">
+                <a16:creationId xmlns:a16="http://schemas.microsoft.com/office/drawing/2014/main" id="{C966CDF8-EDF4-4DDB-A43F-EF035D7779E2}"/>
+              </a:ext>
+            </a:extLst>
+          </p:cNvPr>
+          <p:cNvCxnSpPr>
+            <a:cxnSpLocks/>
+            <a:stCxn id="16" idx="3"/>
+            <a:endCxn id="76" idx="3"/>
+          </p:cNvCxnSpPr>
+          <p:nvPr/>
+        </p:nvCxnSpPr>
+        <p:spPr>
+          <a:xfrm rot="5400000">
+            <a:off x="3436316" y="4107485"/>
+            <a:ext cx="3915139" cy="272169"/>
+          </a:xfrm>
+          <a:prstGeom prst="bentConnector2">
+            <a:avLst/>
+          </a:prstGeom>
+          <a:ln w="6350">
+            <a:solidFill>
+              <a:schemeClr val="accent3"/>
+            </a:solidFill>
+            <a:headEnd type="none" w="med" len="med"/>
+            <a:tailEnd type="none" w="med" len="med"/>
+          </a:ln>
+          <a:effectLst/>
+        </p:spPr>
+        <p:style>
+          <a:lnRef idx="1">
+            <a:schemeClr val="accent2"/>
+          </a:lnRef>
+          <a:fillRef idx="2">
+            <a:schemeClr val="accent2"/>
+          </a:fillRef>
+          <a:effectRef idx="1">
+            <a:schemeClr val="accent2"/>
+          </a:effectRef>
+          <a:fontRef idx="minor">
+            <a:schemeClr val="dk1"/>
+          </a:fontRef>
+        </p:style>
+      </p:cxnSp>
     </p:spTree>
     <p:extLst>
       <p:ext uri="{BB962C8B-B14F-4D97-AF65-F5344CB8AC3E}">

</xml_diff>

<commit_message>
Update UI class diagram in DG and add some writeup (#172)
</commit_message>
<xml_diff>
--- a/docs/diagrams/UiComponentClassDiagram.pptx
+++ b/docs/diagrams/UiComponentClassDiagram.pptx
@@ -208,7 +208,7 @@
           <a:p>
             <a:fld id="{F5CC4B3F-88C1-4FFA-B1B6-F41C21DC6924}" type="datetimeFigureOut">
               <a:rPr lang="en-US" smtClean="0"/>
-              <a:t>1/7/2017</a:t>
+              <a:t>11/11/18</a:t>
             </a:fld>
             <a:endParaRPr lang="en-US"/>
           </a:p>
@@ -654,7 +654,7 @@
           <a:p>
             <a:fld id="{78C97017-6FC3-485B-9764-EAC9E56C1D49}" type="datetimeFigureOut">
               <a:rPr lang="en-US" smtClean="0"/>
-              <a:t>1/7/2017</a:t>
+              <a:t>11/11/18</a:t>
             </a:fld>
             <a:endParaRPr lang="en-US"/>
           </a:p>
@@ -822,7 +822,7 @@
           <a:p>
             <a:fld id="{78C97017-6FC3-485B-9764-EAC9E56C1D49}" type="datetimeFigureOut">
               <a:rPr lang="en-US" smtClean="0"/>
-              <a:t>1/7/2017</a:t>
+              <a:t>11/11/18</a:t>
             </a:fld>
             <a:endParaRPr lang="en-US"/>
           </a:p>
@@ -1000,7 +1000,7 @@
           <a:p>
             <a:fld id="{78C97017-6FC3-485B-9764-EAC9E56C1D49}" type="datetimeFigureOut">
               <a:rPr lang="en-US" smtClean="0"/>
-              <a:t>1/7/2017</a:t>
+              <a:t>11/11/18</a:t>
             </a:fld>
             <a:endParaRPr lang="en-US"/>
           </a:p>
@@ -1168,7 +1168,7 @@
           <a:p>
             <a:fld id="{78C97017-6FC3-485B-9764-EAC9E56C1D49}" type="datetimeFigureOut">
               <a:rPr lang="en-US" smtClean="0"/>
-              <a:t>1/7/2017</a:t>
+              <a:t>11/11/18</a:t>
             </a:fld>
             <a:endParaRPr lang="en-US"/>
           </a:p>
@@ -1413,7 +1413,7 @@
           <a:p>
             <a:fld id="{78C97017-6FC3-485B-9764-EAC9E56C1D49}" type="datetimeFigureOut">
               <a:rPr lang="en-US" smtClean="0"/>
-              <a:t>1/7/2017</a:t>
+              <a:t>11/11/18</a:t>
             </a:fld>
             <a:endParaRPr lang="en-US"/>
           </a:p>
@@ -1698,7 +1698,7 @@
           <a:p>
             <a:fld id="{78C97017-6FC3-485B-9764-EAC9E56C1D49}" type="datetimeFigureOut">
               <a:rPr lang="en-US" smtClean="0"/>
-              <a:t>1/7/2017</a:t>
+              <a:t>11/11/18</a:t>
             </a:fld>
             <a:endParaRPr lang="en-US"/>
           </a:p>
@@ -2117,7 +2117,7 @@
           <a:p>
             <a:fld id="{78C97017-6FC3-485B-9764-EAC9E56C1D49}" type="datetimeFigureOut">
               <a:rPr lang="en-US" smtClean="0"/>
-              <a:t>1/7/2017</a:t>
+              <a:t>11/11/18</a:t>
             </a:fld>
             <a:endParaRPr lang="en-US"/>
           </a:p>
@@ -2234,7 +2234,7 @@
           <a:p>
             <a:fld id="{78C97017-6FC3-485B-9764-EAC9E56C1D49}" type="datetimeFigureOut">
               <a:rPr lang="en-US" smtClean="0"/>
-              <a:t>1/7/2017</a:t>
+              <a:t>11/11/18</a:t>
             </a:fld>
             <a:endParaRPr lang="en-US"/>
           </a:p>
@@ -2329,7 +2329,7 @@
           <a:p>
             <a:fld id="{78C97017-6FC3-485B-9764-EAC9E56C1D49}" type="datetimeFigureOut">
               <a:rPr lang="en-US" smtClean="0"/>
-              <a:t>1/7/2017</a:t>
+              <a:t>11/11/18</a:t>
             </a:fld>
             <a:endParaRPr lang="en-US"/>
           </a:p>
@@ -2604,7 +2604,7 @@
           <a:p>
             <a:fld id="{78C97017-6FC3-485B-9764-EAC9E56C1D49}" type="datetimeFigureOut">
               <a:rPr lang="en-US" smtClean="0"/>
-              <a:t>1/7/2017</a:t>
+              <a:t>11/11/18</a:t>
             </a:fld>
             <a:endParaRPr lang="en-US"/>
           </a:p>
@@ -2856,7 +2856,7 @@
           <a:p>
             <a:fld id="{78C97017-6FC3-485B-9764-EAC9E56C1D49}" type="datetimeFigureOut">
               <a:rPr lang="en-US" smtClean="0"/>
-              <a:t>1/7/2017</a:t>
+              <a:t>11/11/18</a:t>
             </a:fld>
             <a:endParaRPr lang="en-US"/>
           </a:p>
@@ -3067,7 +3067,7 @@
           <a:p>
             <a:fld id="{78C97017-6FC3-485B-9764-EAC9E56C1D49}" type="datetimeFigureOut">
               <a:rPr lang="en-US" smtClean="0"/>
-              <a:t>1/7/2017</a:t>
+              <a:t>11/11/18</a:t>
             </a:fld>
             <a:endParaRPr lang="en-US"/>
           </a:p>
@@ -3450,8 +3450,8 @@
         </p:nvSpPr>
         <p:spPr>
           <a:xfrm>
-            <a:off x="1217465" y="1447800"/>
-            <a:ext cx="4917083" cy="3962400"/>
+            <a:off x="1216694" y="271747"/>
+            <a:ext cx="4917083" cy="6052854"/>
           </a:xfrm>
           <a:prstGeom prst="roundRect">
             <a:avLst>
@@ -3512,7 +3512,7 @@
         </p:nvSpPr>
         <p:spPr>
           <a:xfrm>
-            <a:off x="2095948" y="2341220"/>
+            <a:off x="2097683" y="1045821"/>
             <a:ext cx="1093635" cy="346760"/>
           </a:xfrm>
           <a:prstGeom prst="rect">
@@ -3572,7 +3572,7 @@
         </p:nvSpPr>
         <p:spPr>
           <a:xfrm>
-            <a:off x="2592528" y="2971800"/>
+            <a:off x="2594263" y="1676401"/>
             <a:ext cx="1093635" cy="236841"/>
           </a:xfrm>
           <a:prstGeom prst="rect">
@@ -3632,7 +3632,7 @@
         </p:nvSpPr>
         <p:spPr>
           <a:xfrm>
-            <a:off x="2092842" y="1770924"/>
+            <a:off x="2094577" y="475525"/>
             <a:ext cx="1093635" cy="346760"/>
           </a:xfrm>
           <a:prstGeom prst="rect">
@@ -3694,7 +3694,7 @@
         </p:nvCxnSpPr>
         <p:spPr>
           <a:xfrm rot="16200000" flipH="1">
-            <a:off x="2529445" y="2227899"/>
+            <a:off x="2531180" y="932500"/>
             <a:ext cx="223536" cy="3106"/>
           </a:xfrm>
           <a:prstGeom prst="bentConnector3">
@@ -3734,7 +3734,7 @@
         </p:nvSpPr>
         <p:spPr>
           <a:xfrm rot="10800000" flipV="1">
-            <a:off x="5394717" y="2110477"/>
+            <a:off x="5396452" y="815078"/>
             <a:ext cx="270504" cy="175523"/>
           </a:xfrm>
           <a:prstGeom prst="triangle">
@@ -3782,7 +3782,7 @@
         </p:nvCxnSpPr>
         <p:spPr>
           <a:xfrm flipV="1">
-            <a:off x="644735" y="2991937"/>
+            <a:off x="646470" y="1696538"/>
             <a:ext cx="684904" cy="1"/>
           </a:xfrm>
           <a:prstGeom prst="bentConnector3">
@@ -3825,7 +3825,7 @@
         </p:nvSpPr>
         <p:spPr>
           <a:xfrm rot="16200000">
-            <a:off x="5703829" y="2464877"/>
+            <a:off x="5705564" y="1169478"/>
             <a:ext cx="2362201" cy="328045"/>
           </a:xfrm>
           <a:prstGeom prst="roundRect">
@@ -3885,7 +3885,7 @@
         </p:nvSpPr>
         <p:spPr>
           <a:xfrm>
-            <a:off x="2592528" y="3649359"/>
+            <a:off x="2594263" y="2353960"/>
             <a:ext cx="1093635" cy="236841"/>
           </a:xfrm>
           <a:prstGeom prst="rect">
@@ -3925,7 +3925,7 @@
                   </a:schemeClr>
                 </a:solidFill>
               </a:rPr>
-              <a:t>BrowserPanel</a:t>
+              <a:t>TaskDetailsPane</a:t>
             </a:r>
             <a:endParaRPr lang="en-SG" sz="1050" b="1" dirty="0">
               <a:solidFill>
@@ -3945,7 +3945,7 @@
         </p:nvSpPr>
         <p:spPr>
           <a:xfrm>
-            <a:off x="2592527" y="4563759"/>
+            <a:off x="2594262" y="3268360"/>
             <a:ext cx="1093635" cy="236841"/>
           </a:xfrm>
           <a:prstGeom prst="rect">
@@ -4005,7 +4005,7 @@
         </p:nvSpPr>
         <p:spPr>
           <a:xfrm>
-            <a:off x="2592526" y="3991960"/>
+            <a:off x="2594261" y="2696561"/>
             <a:ext cx="1093635" cy="236841"/>
           </a:xfrm>
           <a:prstGeom prst="rect">
@@ -4065,8 +4065,8 @@
         </p:nvSpPr>
         <p:spPr>
           <a:xfrm>
-            <a:off x="3839323" y="4228801"/>
-            <a:ext cx="1040906" cy="236841"/>
+            <a:off x="3841057" y="2933402"/>
+            <a:ext cx="1458015" cy="236841"/>
           </a:xfrm>
           <a:prstGeom prst="rect">
             <a:avLst/>
@@ -4125,7 +4125,7 @@
         </p:nvSpPr>
         <p:spPr>
           <a:xfrm>
-            <a:off x="2592528" y="4966000"/>
+            <a:off x="2590389" y="5972094"/>
             <a:ext cx="1093635" cy="236841"/>
           </a:xfrm>
           <a:prstGeom prst="rect">
@@ -4185,7 +4185,7 @@
         </p:nvSpPr>
         <p:spPr>
           <a:xfrm>
-            <a:off x="2324548" y="2706452"/>
+            <a:off x="2326283" y="1411053"/>
             <a:ext cx="183156" cy="161573"/>
           </a:xfrm>
           <a:prstGeom prst="flowChartDecision">
@@ -4236,7 +4236,7 @@
         </p:nvCxnSpPr>
         <p:spPr>
           <a:xfrm rot="16200000" flipH="1">
-            <a:off x="2393229" y="2890922"/>
+            <a:off x="2394964" y="1595523"/>
             <a:ext cx="222196" cy="176402"/>
           </a:xfrm>
           <a:prstGeom prst="bentConnector2">
@@ -4274,7 +4274,7 @@
         </p:nvSpPr>
         <p:spPr>
           <a:xfrm>
-            <a:off x="2590799" y="3304308"/>
+            <a:off x="2592534" y="2008909"/>
             <a:ext cx="1095361" cy="236841"/>
           </a:xfrm>
           <a:prstGeom prst="rect">
@@ -4337,7 +4337,7 @@
         </p:nvCxnSpPr>
         <p:spPr>
           <a:xfrm rot="16200000" flipH="1">
-            <a:off x="2054450" y="3229701"/>
+            <a:off x="2056185" y="1934302"/>
             <a:ext cx="899755" cy="176402"/>
           </a:xfrm>
           <a:prstGeom prst="bentConnector2">
@@ -4378,7 +4378,7 @@
         </p:nvCxnSpPr>
         <p:spPr>
           <a:xfrm rot="16200000" flipH="1">
-            <a:off x="1883148" y="3401003"/>
+            <a:off x="1884883" y="2105604"/>
             <a:ext cx="1242356" cy="176400"/>
           </a:xfrm>
           <a:prstGeom prst="bentConnector2">
@@ -4419,7 +4419,7 @@
         </p:nvCxnSpPr>
         <p:spPr>
           <a:xfrm rot="16200000" flipH="1">
-            <a:off x="1597249" y="3686901"/>
+            <a:off x="1598984" y="2391502"/>
             <a:ext cx="1814155" cy="176401"/>
           </a:xfrm>
           <a:prstGeom prst="bentConnector2">
@@ -4453,14 +4453,15 @@
         <p:nvCxnSpPr>
           <p:cNvPr id="53" name="Elbow Connector 63"/>
           <p:cNvCxnSpPr>
+            <a:cxnSpLocks/>
             <a:endCxn id="38" idx="1"/>
           </p:cNvCxnSpPr>
           <p:nvPr/>
         </p:nvCxnSpPr>
         <p:spPr>
           <a:xfrm rot="16200000" flipH="1">
-            <a:off x="1184119" y="3676012"/>
-            <a:ext cx="2396440" cy="420377"/>
+            <a:off x="25787" y="3525913"/>
+            <a:ext cx="4697934" cy="431270"/>
           </a:xfrm>
           <a:prstGeom prst="bentConnector2">
             <a:avLst/>
@@ -4497,7 +4498,7 @@
         </p:nvSpPr>
         <p:spPr>
           <a:xfrm>
-            <a:off x="5143948" y="1770924"/>
+            <a:off x="5145683" y="475525"/>
             <a:ext cx="772043" cy="346760"/>
           </a:xfrm>
           <a:prstGeom prst="rect">
@@ -4579,7 +4580,7 @@
         </p:nvCxnSpPr>
         <p:spPr>
           <a:xfrm flipV="1">
-            <a:off x="3686160" y="2286000"/>
+            <a:off x="3687895" y="990601"/>
             <a:ext cx="1843809" cy="1136729"/>
           </a:xfrm>
           <a:prstGeom prst="bentConnector2">
@@ -4613,6 +4614,7 @@
         <p:nvCxnSpPr>
           <p:cNvPr id="77" name="Elbow Connector 63"/>
           <p:cNvCxnSpPr>
+            <a:cxnSpLocks/>
             <a:stCxn id="16" idx="3"/>
             <a:endCxn id="37" idx="3"/>
           </p:cNvCxnSpPr>
@@ -4620,8 +4622,8 @@
         </p:nvCxnSpPr>
         <p:spPr>
           <a:xfrm rot="5400000">
-            <a:off x="4174488" y="2991741"/>
-            <a:ext cx="2061222" cy="649740"/>
+            <a:off x="4384777" y="1904896"/>
+            <a:ext cx="2061222" cy="232632"/>
           </a:xfrm>
           <a:prstGeom prst="bentConnector2">
             <a:avLst/>
@@ -4661,7 +4663,7 @@
         </p:nvCxnSpPr>
         <p:spPr>
           <a:xfrm rot="5400000">
-            <a:off x="3867176" y="2104987"/>
+            <a:off x="3868911" y="809588"/>
             <a:ext cx="1481780" cy="1843806"/>
           </a:xfrm>
           <a:prstGeom prst="bentConnector2">
@@ -4702,7 +4704,7 @@
         </p:nvCxnSpPr>
         <p:spPr>
           <a:xfrm flipV="1">
-            <a:off x="3189583" y="2286000"/>
+            <a:off x="3191318" y="990601"/>
             <a:ext cx="2340386" cy="228600"/>
           </a:xfrm>
           <a:prstGeom prst="bentConnector2">
@@ -4743,7 +4745,7 @@
         </p:nvCxnSpPr>
         <p:spPr>
           <a:xfrm rot="5400000">
-            <a:off x="3409976" y="2562187"/>
+            <a:off x="3411711" y="1266788"/>
             <a:ext cx="2396180" cy="1843807"/>
           </a:xfrm>
           <a:prstGeom prst="bentConnector2">
@@ -4777,15 +4779,15 @@
         <p:nvCxnSpPr>
           <p:cNvPr id="94" name="Elbow Connector 63"/>
           <p:cNvCxnSpPr>
-            <a:stCxn id="16" idx="3"/>
+            <a:cxnSpLocks/>
             <a:endCxn id="38" idx="3"/>
           </p:cNvCxnSpPr>
           <p:nvPr/>
         </p:nvCxnSpPr>
         <p:spPr>
           <a:xfrm rot="5400000">
-            <a:off x="3208856" y="2763307"/>
-            <a:ext cx="2798421" cy="1843806"/>
+            <a:off x="2729040" y="3291723"/>
+            <a:ext cx="3753777" cy="1843807"/>
           </a:xfrm>
           <a:prstGeom prst="bentConnector2">
             <a:avLst/>
@@ -4824,7 +4826,7 @@
         </p:nvCxnSpPr>
         <p:spPr>
           <a:xfrm rot="5400000" flipH="1" flipV="1">
-            <a:off x="4594921" y="-355061"/>
+            <a:off x="4596656" y="-1650460"/>
             <a:ext cx="170724" cy="4081246"/>
           </a:xfrm>
           <a:prstGeom prst="bentConnector2">
@@ -4863,8 +4865,8 @@
         </p:nvSpPr>
         <p:spPr>
           <a:xfrm rot="16200000">
-            <a:off x="6213739" y="4560376"/>
-            <a:ext cx="1371599" cy="328045"/>
+            <a:off x="5491573" y="3988876"/>
+            <a:ext cx="2819401" cy="328045"/>
           </a:xfrm>
           <a:prstGeom prst="roundRect">
             <a:avLst/>
@@ -4923,7 +4925,7 @@
         </p:nvSpPr>
         <p:spPr>
           <a:xfrm rot="16200000">
-            <a:off x="956202" y="2861202"/>
+            <a:off x="957937" y="1565803"/>
             <a:ext cx="1093635" cy="346760"/>
           </a:xfrm>
           <a:prstGeom prst="rect">
@@ -4993,7 +4995,7 @@
         </p:nvSpPr>
         <p:spPr>
           <a:xfrm flipV="1">
-            <a:off x="1367767" y="2286001"/>
+            <a:off x="1369502" y="990602"/>
             <a:ext cx="270504" cy="175523"/>
           </a:xfrm>
           <a:prstGeom prst="triangle">
@@ -5044,7 +5046,7 @@
         </p:nvCxnSpPr>
         <p:spPr>
           <a:xfrm rot="10800000" flipV="1">
-            <a:off x="1503020" y="1944303"/>
+            <a:off x="1504755" y="648904"/>
             <a:ext cx="589823" cy="341697"/>
           </a:xfrm>
           <a:prstGeom prst="bentConnector2">
@@ -5086,7 +5088,7 @@
         </p:nvCxnSpPr>
         <p:spPr>
           <a:xfrm rot="16200000" flipH="1">
-            <a:off x="2226110" y="3058040"/>
+            <a:off x="2227845" y="1762641"/>
             <a:ext cx="554704" cy="174673"/>
           </a:xfrm>
           <a:prstGeom prst="bentConnector2">
@@ -5127,7 +5129,7 @@
         </p:nvCxnSpPr>
         <p:spPr>
           <a:xfrm rot="5400000">
-            <a:off x="4205956" y="1766207"/>
+            <a:off x="4207691" y="470808"/>
             <a:ext cx="804221" cy="1843806"/>
           </a:xfrm>
           <a:prstGeom prst="bentConnector2">
@@ -5161,6 +5163,7 @@
         <p:nvCxnSpPr>
           <p:cNvPr id="137" name="Elbow Connector 136"/>
           <p:cNvCxnSpPr>
+            <a:cxnSpLocks/>
             <a:stCxn id="36" idx="2"/>
             <a:endCxn id="37" idx="1"/>
           </p:cNvCxnSpPr>
@@ -5168,8 +5171,8 @@
         </p:nvCxnSpPr>
         <p:spPr>
           <a:xfrm rot="16200000" flipH="1">
-            <a:off x="3430123" y="3938021"/>
-            <a:ext cx="118421" cy="699979"/>
+            <a:off x="3431858" y="2642623"/>
+            <a:ext cx="118421" cy="699978"/>
           </a:xfrm>
           <a:prstGeom prst="bentConnector2">
             <a:avLst/>
@@ -5209,7 +5212,7 @@
         </p:nvCxnSpPr>
         <p:spPr>
           <a:xfrm rot="5400000">
-            <a:off x="3695875" y="2276286"/>
+            <a:off x="3697610" y="980887"/>
             <a:ext cx="1824381" cy="1843808"/>
           </a:xfrm>
           <a:prstGeom prst="bentConnector2">
@@ -5247,7 +5250,7 @@
         </p:nvSpPr>
         <p:spPr>
           <a:xfrm>
-            <a:off x="5435896" y="2743200"/>
+            <a:off x="5437631" y="1447801"/>
             <a:ext cx="229325" cy="166560"/>
           </a:xfrm>
           <a:prstGeom prst="rect">
@@ -5300,7 +5303,7 @@
         </p:nvSpPr>
         <p:spPr>
           <a:xfrm>
-            <a:off x="3687515" y="2828802"/>
+            <a:off x="3689250" y="1533403"/>
             <a:ext cx="3048000" cy="203200"/>
           </a:xfrm>
           <a:custGeom>
@@ -5382,7 +5385,7 @@
         </p:nvSpPr>
         <p:spPr>
           <a:xfrm>
-            <a:off x="5431573" y="4488138"/>
+            <a:off x="5433308" y="3192739"/>
             <a:ext cx="229325" cy="160062"/>
           </a:xfrm>
           <a:prstGeom prst="rect">
@@ -5435,7 +5438,7 @@
         </p:nvSpPr>
         <p:spPr>
           <a:xfrm flipV="1">
-            <a:off x="4114799" y="4472708"/>
+            <a:off x="4116534" y="3177309"/>
             <a:ext cx="2642195" cy="101600"/>
           </a:xfrm>
           <a:custGeom>
@@ -5509,6 +5512,1091 @@
           </a:p>
         </p:txBody>
       </p:sp>
+      <p:sp>
+        <p:nvSpPr>
+          <p:cNvPr id="49" name="Rectangle 11">
+            <a:extLst>
+              <a:ext uri="{FF2B5EF4-FFF2-40B4-BE49-F238E27FC236}">
+                <a16:creationId xmlns:a16="http://schemas.microsoft.com/office/drawing/2014/main" id="{FCFF0650-B879-A449-BB52-ACBF6C4C8B88}"/>
+              </a:ext>
+            </a:extLst>
+          </p:cNvPr>
+          <p:cNvSpPr/>
+          <p:nvPr/>
+        </p:nvSpPr>
+        <p:spPr>
+          <a:xfrm>
+            <a:off x="2595063" y="3635355"/>
+            <a:ext cx="1093635" cy="236841"/>
+          </a:xfrm>
+          <a:prstGeom prst="rect">
+            <a:avLst/>
+          </a:prstGeom>
+          <a:ln w="19050">
+            <a:solidFill>
+              <a:schemeClr val="accent3"/>
+            </a:solidFill>
+          </a:ln>
+          <a:effectLst/>
+        </p:spPr>
+        <p:style>
+          <a:lnRef idx="1">
+            <a:schemeClr val="accent3"/>
+          </a:lnRef>
+          <a:fillRef idx="2">
+            <a:schemeClr val="accent3"/>
+          </a:fillRef>
+          <a:effectRef idx="1">
+            <a:schemeClr val="accent3"/>
+          </a:effectRef>
+          <a:fontRef idx="minor">
+            <a:schemeClr val="dk1"/>
+          </a:fontRef>
+        </p:style>
+        <p:txBody>
+          <a:bodyPr rtlCol="0" anchor="ctr"/>
+          <a:lstStyle/>
+          <a:p>
+            <a:pPr algn="ctr"/>
+            <a:r>
+              <a:rPr lang="en-US" sz="1050" b="1" dirty="0" err="1">
+                <a:solidFill>
+                  <a:schemeClr val="accent3">
+                    <a:lumMod val="75000"/>
+                  </a:schemeClr>
+                </a:solidFill>
+              </a:rPr>
+              <a:t>CalendarPanel</a:t>
+            </a:r>
+            <a:endParaRPr lang="en-SG" sz="1050" b="1" dirty="0">
+              <a:solidFill>
+                <a:schemeClr val="accent3">
+                  <a:lumMod val="75000"/>
+                </a:schemeClr>
+              </a:solidFill>
+            </a:endParaRPr>
+          </a:p>
+        </p:txBody>
+      </p:sp>
+      <p:sp>
+        <p:nvSpPr>
+          <p:cNvPr id="51" name="Rectangle 11">
+            <a:extLst>
+              <a:ext uri="{FF2B5EF4-FFF2-40B4-BE49-F238E27FC236}">
+                <a16:creationId xmlns:a16="http://schemas.microsoft.com/office/drawing/2014/main" id="{9FF38F50-8752-3F45-9E0F-D2988D8435C1}"/>
+              </a:ext>
+            </a:extLst>
+          </p:cNvPr>
+          <p:cNvSpPr/>
+          <p:nvPr/>
+        </p:nvSpPr>
+        <p:spPr>
+          <a:xfrm>
+            <a:off x="3841859" y="3872196"/>
+            <a:ext cx="1464555" cy="236841"/>
+          </a:xfrm>
+          <a:prstGeom prst="rect">
+            <a:avLst/>
+          </a:prstGeom>
+          <a:ln w="19050">
+            <a:solidFill>
+              <a:schemeClr val="accent3"/>
+            </a:solidFill>
+          </a:ln>
+          <a:effectLst/>
+        </p:spPr>
+        <p:style>
+          <a:lnRef idx="1">
+            <a:schemeClr val="accent3"/>
+          </a:lnRef>
+          <a:fillRef idx="2">
+            <a:schemeClr val="accent3"/>
+          </a:fillRef>
+          <a:effectRef idx="1">
+            <a:schemeClr val="accent3"/>
+          </a:effectRef>
+          <a:fontRef idx="minor">
+            <a:schemeClr val="dk1"/>
+          </a:fontRef>
+        </p:style>
+        <p:txBody>
+          <a:bodyPr rtlCol="0" anchor="ctr"/>
+          <a:lstStyle/>
+          <a:p>
+            <a:pPr algn="ctr"/>
+            <a:r>
+              <a:rPr lang="en-US" sz="1050" b="1" dirty="0" err="1">
+                <a:solidFill>
+                  <a:schemeClr val="accent3">
+                    <a:lumMod val="75000"/>
+                  </a:schemeClr>
+                </a:solidFill>
+              </a:rPr>
+              <a:t>CalendarTaskCard</a:t>
+            </a:r>
+            <a:endParaRPr lang="en-SG" sz="1050" b="1" dirty="0">
+              <a:solidFill>
+                <a:schemeClr val="accent3">
+                  <a:lumMod val="75000"/>
+                </a:schemeClr>
+              </a:solidFill>
+            </a:endParaRPr>
+          </a:p>
+        </p:txBody>
+      </p:sp>
+      <p:cxnSp>
+        <p:nvCxnSpPr>
+          <p:cNvPr id="52" name="Elbow Connector 63">
+            <a:extLst>
+              <a:ext uri="{FF2B5EF4-FFF2-40B4-BE49-F238E27FC236}">
+                <a16:creationId xmlns:a16="http://schemas.microsoft.com/office/drawing/2014/main" id="{4553070D-9519-FC45-AAC4-54553CDBB1F4}"/>
+              </a:ext>
+            </a:extLst>
+          </p:cNvPr>
+          <p:cNvCxnSpPr>
+            <a:endCxn id="49" idx="1"/>
+          </p:cNvCxnSpPr>
+          <p:nvPr/>
+        </p:nvCxnSpPr>
+        <p:spPr>
+          <a:xfrm rot="16200000" flipH="1">
+            <a:off x="1885685" y="3044398"/>
+            <a:ext cx="1242356" cy="176400"/>
+          </a:xfrm>
+          <a:prstGeom prst="bentConnector2">
+            <a:avLst/>
+          </a:prstGeom>
+          <a:ln w="19050">
+            <a:solidFill>
+              <a:schemeClr val="accent3"/>
+            </a:solidFill>
+            <a:headEnd type="none" w="med" len="med"/>
+            <a:tailEnd type="arrow" w="med" len="med"/>
+          </a:ln>
+          <a:effectLst/>
+        </p:spPr>
+        <p:style>
+          <a:lnRef idx="1">
+            <a:schemeClr val="accent2"/>
+          </a:lnRef>
+          <a:fillRef idx="2">
+            <a:schemeClr val="accent2"/>
+          </a:fillRef>
+          <a:effectRef idx="1">
+            <a:schemeClr val="accent2"/>
+          </a:effectRef>
+          <a:fontRef idx="minor">
+            <a:schemeClr val="dk1"/>
+          </a:fontRef>
+        </p:style>
+      </p:cxnSp>
+      <p:cxnSp>
+        <p:nvCxnSpPr>
+          <p:cNvPr id="54" name="Elbow Connector 63">
+            <a:extLst>
+              <a:ext uri="{FF2B5EF4-FFF2-40B4-BE49-F238E27FC236}">
+                <a16:creationId xmlns:a16="http://schemas.microsoft.com/office/drawing/2014/main" id="{1FDE5042-9434-1145-B2F3-E16B4F5D3FEC}"/>
+              </a:ext>
+            </a:extLst>
+          </p:cNvPr>
+          <p:cNvCxnSpPr>
+            <a:cxnSpLocks/>
+            <a:endCxn id="51" idx="3"/>
+          </p:cNvCxnSpPr>
+          <p:nvPr/>
+        </p:nvCxnSpPr>
+        <p:spPr>
+          <a:xfrm rot="5400000">
+            <a:off x="4388849" y="2846960"/>
+            <a:ext cx="2061222" cy="226092"/>
+          </a:xfrm>
+          <a:prstGeom prst="bentConnector2">
+            <a:avLst/>
+          </a:prstGeom>
+          <a:ln w="6350">
+            <a:solidFill>
+              <a:schemeClr val="accent3"/>
+            </a:solidFill>
+            <a:headEnd type="none" w="med" len="med"/>
+            <a:tailEnd type="none" w="med" len="med"/>
+          </a:ln>
+          <a:effectLst/>
+        </p:spPr>
+        <p:style>
+          <a:lnRef idx="1">
+            <a:schemeClr val="accent2"/>
+          </a:lnRef>
+          <a:fillRef idx="2">
+            <a:schemeClr val="accent2"/>
+          </a:fillRef>
+          <a:effectRef idx="1">
+            <a:schemeClr val="accent2"/>
+          </a:effectRef>
+          <a:fontRef idx="minor">
+            <a:schemeClr val="dk1"/>
+          </a:fontRef>
+        </p:style>
+      </p:cxnSp>
+      <p:cxnSp>
+        <p:nvCxnSpPr>
+          <p:cNvPr id="55" name="Elbow Connector 54">
+            <a:extLst>
+              <a:ext uri="{FF2B5EF4-FFF2-40B4-BE49-F238E27FC236}">
+                <a16:creationId xmlns:a16="http://schemas.microsoft.com/office/drawing/2014/main" id="{9850676D-A800-0B4E-AF10-5F973B20E71B}"/>
+              </a:ext>
+            </a:extLst>
+          </p:cNvPr>
+          <p:cNvCxnSpPr>
+            <a:cxnSpLocks/>
+            <a:stCxn id="49" idx="2"/>
+            <a:endCxn id="51" idx="1"/>
+          </p:cNvCxnSpPr>
+          <p:nvPr/>
+        </p:nvCxnSpPr>
+        <p:spPr>
+          <a:xfrm rot="16200000" flipH="1">
+            <a:off x="3432660" y="3581417"/>
+            <a:ext cx="118421" cy="699978"/>
+          </a:xfrm>
+          <a:prstGeom prst="bentConnector2">
+            <a:avLst/>
+          </a:prstGeom>
+          <a:ln w="19050">
+            <a:solidFill>
+              <a:schemeClr val="accent3"/>
+            </a:solidFill>
+            <a:headEnd type="none" w="med" len="med"/>
+            <a:tailEnd type="arrow" w="med" len="med"/>
+          </a:ln>
+          <a:effectLst/>
+        </p:spPr>
+        <p:style>
+          <a:lnRef idx="1">
+            <a:schemeClr val="accent2"/>
+          </a:lnRef>
+          <a:fillRef idx="2">
+            <a:schemeClr val="accent2"/>
+          </a:fillRef>
+          <a:effectRef idx="1">
+            <a:schemeClr val="accent2"/>
+          </a:effectRef>
+          <a:fontRef idx="minor">
+            <a:schemeClr val="dk1"/>
+          </a:fontRef>
+        </p:style>
+      </p:cxnSp>
+      <p:sp>
+        <p:nvSpPr>
+          <p:cNvPr id="56" name="Freeform 55">
+            <a:extLst>
+              <a:ext uri="{FF2B5EF4-FFF2-40B4-BE49-F238E27FC236}">
+                <a16:creationId xmlns:a16="http://schemas.microsoft.com/office/drawing/2014/main" id="{E2BEF637-8DCC-6C43-AC73-ACBA63C8B578}"/>
+              </a:ext>
+            </a:extLst>
+          </p:cNvPr>
+          <p:cNvSpPr/>
+          <p:nvPr/>
+        </p:nvSpPr>
+        <p:spPr>
+          <a:xfrm flipV="1">
+            <a:off x="4117336" y="4116103"/>
+            <a:ext cx="2642195" cy="101600"/>
+          </a:xfrm>
+          <a:custGeom>
+            <a:avLst/>
+            <a:gdLst>
+              <a:gd name="connsiteX0" fmla="*/ 0 w 3048000"/>
+              <a:gd name="connsiteY0" fmla="*/ 203200 h 203200"/>
+              <a:gd name="connsiteX1" fmla="*/ 221673 w 3048000"/>
+              <a:gd name="connsiteY1" fmla="*/ 0 h 203200"/>
+              <a:gd name="connsiteX2" fmla="*/ 3048000 w 3048000"/>
+              <a:gd name="connsiteY2" fmla="*/ 0 h 203200"/>
+            </a:gdLst>
+            <a:ahLst/>
+            <a:cxnLst>
+              <a:cxn ang="0">
+                <a:pos x="connsiteX0" y="connsiteY0"/>
+              </a:cxn>
+              <a:cxn ang="0">
+                <a:pos x="connsiteX1" y="connsiteY1"/>
+              </a:cxn>
+              <a:cxn ang="0">
+                <a:pos x="connsiteX2" y="connsiteY2"/>
+              </a:cxn>
+            </a:cxnLst>
+            <a:rect l="l" t="t" r="r" b="b"/>
+            <a:pathLst>
+              <a:path w="3048000" h="203200">
+                <a:moveTo>
+                  <a:pt x="0" y="203200"/>
+                </a:moveTo>
+                <a:lnTo>
+                  <a:pt x="221673" y="0"/>
+                </a:lnTo>
+                <a:lnTo>
+                  <a:pt x="3048000" y="0"/>
+                </a:lnTo>
+              </a:path>
+            </a:pathLst>
+          </a:custGeom>
+          <a:noFill/>
+          <a:ln w="19050">
+            <a:solidFill>
+              <a:schemeClr val="accent3"/>
+            </a:solidFill>
+            <a:prstDash val="sysDot"/>
+            <a:headEnd type="none" w="med" len="med"/>
+            <a:tailEnd type="arrow" w="med" len="med"/>
+          </a:ln>
+          <a:effectLst/>
+        </p:spPr>
+        <p:style>
+          <a:lnRef idx="1">
+            <a:schemeClr val="accent2"/>
+          </a:lnRef>
+          <a:fillRef idx="2">
+            <a:schemeClr val="accent2"/>
+          </a:fillRef>
+          <a:effectRef idx="1">
+            <a:schemeClr val="accent2"/>
+          </a:effectRef>
+          <a:fontRef idx="minor">
+            <a:schemeClr val="dk1"/>
+          </a:fontRef>
+        </p:style>
+        <p:txBody>
+          <a:bodyPr rtlCol="0" anchor="ctr"/>
+          <a:lstStyle/>
+          <a:p>
+            <a:pPr algn="ctr"/>
+            <a:endParaRPr lang="en-SG"/>
+          </a:p>
+        </p:txBody>
+      </p:sp>
+      <p:sp>
+        <p:nvSpPr>
+          <p:cNvPr id="57" name="Rectangle 11">
+            <a:extLst>
+              <a:ext uri="{FF2B5EF4-FFF2-40B4-BE49-F238E27FC236}">
+                <a16:creationId xmlns:a16="http://schemas.microsoft.com/office/drawing/2014/main" id="{EA67EE5A-95B2-F74C-80A0-EB4387B7B960}"/>
+              </a:ext>
+            </a:extLst>
+          </p:cNvPr>
+          <p:cNvSpPr/>
+          <p:nvPr/>
+        </p:nvSpPr>
+        <p:spPr>
+          <a:xfrm>
+            <a:off x="3841057" y="4279789"/>
+            <a:ext cx="1464555" cy="236841"/>
+          </a:xfrm>
+          <a:prstGeom prst="rect">
+            <a:avLst/>
+          </a:prstGeom>
+          <a:ln w="19050">
+            <a:solidFill>
+              <a:schemeClr val="accent3"/>
+            </a:solidFill>
+          </a:ln>
+          <a:effectLst/>
+        </p:spPr>
+        <p:style>
+          <a:lnRef idx="1">
+            <a:schemeClr val="accent3"/>
+          </a:lnRef>
+          <a:fillRef idx="2">
+            <a:schemeClr val="accent3"/>
+          </a:fillRef>
+          <a:effectRef idx="1">
+            <a:schemeClr val="accent3"/>
+          </a:effectRef>
+          <a:fontRef idx="minor">
+            <a:schemeClr val="dk1"/>
+          </a:fontRef>
+        </p:style>
+        <p:txBody>
+          <a:bodyPr rtlCol="0" anchor="ctr"/>
+          <a:lstStyle/>
+          <a:p>
+            <a:pPr algn="ctr"/>
+            <a:r>
+              <a:rPr lang="en-US" sz="1050" b="1" dirty="0" err="1">
+                <a:solidFill>
+                  <a:schemeClr val="accent3">
+                    <a:lumMod val="75000"/>
+                  </a:schemeClr>
+                </a:solidFill>
+              </a:rPr>
+              <a:t>CalendarHeaderCell</a:t>
+            </a:r>
+            <a:endParaRPr lang="en-SG" sz="1050" b="1" dirty="0">
+              <a:solidFill>
+                <a:schemeClr val="accent3">
+                  <a:lumMod val="75000"/>
+                </a:schemeClr>
+              </a:solidFill>
+            </a:endParaRPr>
+          </a:p>
+        </p:txBody>
+      </p:sp>
+      <p:cxnSp>
+        <p:nvCxnSpPr>
+          <p:cNvPr id="58" name="Elbow Connector 57">
+            <a:extLst>
+              <a:ext uri="{FF2B5EF4-FFF2-40B4-BE49-F238E27FC236}">
+                <a16:creationId xmlns:a16="http://schemas.microsoft.com/office/drawing/2014/main" id="{579BBC52-55FD-7E42-B5FA-E124C2FD1058}"/>
+              </a:ext>
+            </a:extLst>
+          </p:cNvPr>
+          <p:cNvCxnSpPr>
+            <a:cxnSpLocks/>
+            <a:stCxn id="49" idx="2"/>
+            <a:endCxn id="57" idx="1"/>
+          </p:cNvCxnSpPr>
+          <p:nvPr/>
+        </p:nvCxnSpPr>
+        <p:spPr>
+          <a:xfrm rot="16200000" flipH="1">
+            <a:off x="3228462" y="3785615"/>
+            <a:ext cx="526014" cy="699176"/>
+          </a:xfrm>
+          <a:prstGeom prst="bentConnector2">
+            <a:avLst/>
+          </a:prstGeom>
+          <a:ln w="19050">
+            <a:solidFill>
+              <a:schemeClr val="accent3"/>
+            </a:solidFill>
+            <a:headEnd type="none" w="med" len="med"/>
+            <a:tailEnd type="arrow" w="med" len="med"/>
+          </a:ln>
+          <a:effectLst/>
+        </p:spPr>
+        <p:style>
+          <a:lnRef idx="1">
+            <a:schemeClr val="accent2"/>
+          </a:lnRef>
+          <a:fillRef idx="2">
+            <a:schemeClr val="accent2"/>
+          </a:fillRef>
+          <a:effectRef idx="1">
+            <a:schemeClr val="accent2"/>
+          </a:effectRef>
+          <a:fontRef idx="minor">
+            <a:schemeClr val="dk1"/>
+          </a:fontRef>
+        </p:style>
+      </p:cxnSp>
+      <p:cxnSp>
+        <p:nvCxnSpPr>
+          <p:cNvPr id="63" name="Elbow Connector 63">
+            <a:extLst>
+              <a:ext uri="{FF2B5EF4-FFF2-40B4-BE49-F238E27FC236}">
+                <a16:creationId xmlns:a16="http://schemas.microsoft.com/office/drawing/2014/main" id="{C22F5A4C-D8A6-A54C-85CF-B6B21D59BE44}"/>
+              </a:ext>
+            </a:extLst>
+          </p:cNvPr>
+          <p:cNvCxnSpPr>
+            <a:cxnSpLocks/>
+          </p:cNvCxnSpPr>
+          <p:nvPr/>
+        </p:nvCxnSpPr>
+        <p:spPr>
+          <a:xfrm rot="5400000">
+            <a:off x="4385380" y="3256953"/>
+            <a:ext cx="2061222" cy="226092"/>
+          </a:xfrm>
+          <a:prstGeom prst="bentConnector2">
+            <a:avLst/>
+          </a:prstGeom>
+          <a:ln w="6350">
+            <a:solidFill>
+              <a:schemeClr val="accent3"/>
+            </a:solidFill>
+            <a:headEnd type="none" w="med" len="med"/>
+            <a:tailEnd type="none" w="med" len="med"/>
+          </a:ln>
+          <a:effectLst/>
+        </p:spPr>
+        <p:style>
+          <a:lnRef idx="1">
+            <a:schemeClr val="accent2"/>
+          </a:lnRef>
+          <a:fillRef idx="2">
+            <a:schemeClr val="accent2"/>
+          </a:fillRef>
+          <a:effectRef idx="1">
+            <a:schemeClr val="accent2"/>
+          </a:effectRef>
+          <a:fontRef idx="minor">
+            <a:schemeClr val="dk1"/>
+          </a:fontRef>
+        </p:style>
+      </p:cxnSp>
+      <p:sp>
+        <p:nvSpPr>
+          <p:cNvPr id="64" name="Rectangle 11">
+            <a:extLst>
+              <a:ext uri="{FF2B5EF4-FFF2-40B4-BE49-F238E27FC236}">
+                <a16:creationId xmlns:a16="http://schemas.microsoft.com/office/drawing/2014/main" id="{4475F23F-1797-B449-8363-375C10A3A2A9}"/>
+              </a:ext>
+            </a:extLst>
+          </p:cNvPr>
+          <p:cNvSpPr/>
+          <p:nvPr/>
+        </p:nvSpPr>
+        <p:spPr>
+          <a:xfrm>
+            <a:off x="3842323" y="4580009"/>
+            <a:ext cx="1464555" cy="236841"/>
+          </a:xfrm>
+          <a:prstGeom prst="rect">
+            <a:avLst/>
+          </a:prstGeom>
+          <a:ln w="19050">
+            <a:solidFill>
+              <a:schemeClr val="accent3"/>
+            </a:solidFill>
+          </a:ln>
+          <a:effectLst/>
+        </p:spPr>
+        <p:style>
+          <a:lnRef idx="1">
+            <a:schemeClr val="accent3"/>
+          </a:lnRef>
+          <a:fillRef idx="2">
+            <a:schemeClr val="accent3"/>
+          </a:fillRef>
+          <a:effectRef idx="1">
+            <a:schemeClr val="accent3"/>
+          </a:effectRef>
+          <a:fontRef idx="minor">
+            <a:schemeClr val="dk1"/>
+          </a:fontRef>
+        </p:style>
+        <p:txBody>
+          <a:bodyPr rtlCol="0" anchor="ctr"/>
+          <a:lstStyle/>
+          <a:p>
+            <a:pPr algn="ctr"/>
+            <a:r>
+              <a:rPr lang="en-US" sz="1050" b="1" dirty="0" err="1">
+                <a:solidFill>
+                  <a:schemeClr val="accent3">
+                    <a:lumMod val="75000"/>
+                  </a:schemeClr>
+                </a:solidFill>
+              </a:rPr>
+              <a:t>CalendarContentCell</a:t>
+            </a:r>
+            <a:endParaRPr lang="en-SG" sz="1050" b="1" dirty="0">
+              <a:solidFill>
+                <a:schemeClr val="accent3">
+                  <a:lumMod val="75000"/>
+                </a:schemeClr>
+              </a:solidFill>
+            </a:endParaRPr>
+          </a:p>
+        </p:txBody>
+      </p:sp>
+      <p:cxnSp>
+        <p:nvCxnSpPr>
+          <p:cNvPr id="65" name="Elbow Connector 64">
+            <a:extLst>
+              <a:ext uri="{FF2B5EF4-FFF2-40B4-BE49-F238E27FC236}">
+                <a16:creationId xmlns:a16="http://schemas.microsoft.com/office/drawing/2014/main" id="{89611432-D98C-D946-A94F-D347EA9D78B1}"/>
+              </a:ext>
+            </a:extLst>
+          </p:cNvPr>
+          <p:cNvCxnSpPr>
+            <a:cxnSpLocks/>
+            <a:endCxn id="64" idx="1"/>
+          </p:cNvCxnSpPr>
+          <p:nvPr/>
+        </p:nvCxnSpPr>
+        <p:spPr>
+          <a:xfrm rot="16200000" flipH="1">
+            <a:off x="3229728" y="4085835"/>
+            <a:ext cx="526014" cy="699176"/>
+          </a:xfrm>
+          <a:prstGeom prst="bentConnector2">
+            <a:avLst/>
+          </a:prstGeom>
+          <a:ln w="19050">
+            <a:solidFill>
+              <a:schemeClr val="accent3"/>
+            </a:solidFill>
+            <a:headEnd type="none" w="med" len="med"/>
+            <a:tailEnd type="arrow" w="med" len="med"/>
+          </a:ln>
+          <a:effectLst/>
+        </p:spPr>
+        <p:style>
+          <a:lnRef idx="1">
+            <a:schemeClr val="accent2"/>
+          </a:lnRef>
+          <a:fillRef idx="2">
+            <a:schemeClr val="accent2"/>
+          </a:fillRef>
+          <a:effectRef idx="1">
+            <a:schemeClr val="accent2"/>
+          </a:effectRef>
+          <a:fontRef idx="minor">
+            <a:schemeClr val="dk1"/>
+          </a:fontRef>
+        </p:style>
+      </p:cxnSp>
+      <p:cxnSp>
+        <p:nvCxnSpPr>
+          <p:cNvPr id="66" name="Elbow Connector 63">
+            <a:extLst>
+              <a:ext uri="{FF2B5EF4-FFF2-40B4-BE49-F238E27FC236}">
+                <a16:creationId xmlns:a16="http://schemas.microsoft.com/office/drawing/2014/main" id="{78D8074B-6053-9D4A-9407-3C7E538B941C}"/>
+              </a:ext>
+            </a:extLst>
+          </p:cNvPr>
+          <p:cNvCxnSpPr>
+            <a:cxnSpLocks/>
+          </p:cNvCxnSpPr>
+          <p:nvPr/>
+        </p:nvCxnSpPr>
+        <p:spPr>
+          <a:xfrm rot="5400000">
+            <a:off x="4386646" y="3557173"/>
+            <a:ext cx="2061222" cy="226092"/>
+          </a:xfrm>
+          <a:prstGeom prst="bentConnector2">
+            <a:avLst/>
+          </a:prstGeom>
+          <a:ln w="6350">
+            <a:solidFill>
+              <a:schemeClr val="accent3"/>
+            </a:solidFill>
+            <a:headEnd type="none" w="med" len="med"/>
+            <a:tailEnd type="none" w="med" len="med"/>
+          </a:ln>
+          <a:effectLst/>
+        </p:spPr>
+        <p:style>
+          <a:lnRef idx="1">
+            <a:schemeClr val="accent2"/>
+          </a:lnRef>
+          <a:fillRef idx="2">
+            <a:schemeClr val="accent2"/>
+          </a:fillRef>
+          <a:effectRef idx="1">
+            <a:schemeClr val="accent2"/>
+          </a:effectRef>
+          <a:fontRef idx="minor">
+            <a:schemeClr val="dk1"/>
+          </a:fontRef>
+        </p:style>
+      </p:cxnSp>
+      <p:sp>
+        <p:nvSpPr>
+          <p:cNvPr id="69" name="Rectangle 11">
+            <a:extLst>
+              <a:ext uri="{FF2B5EF4-FFF2-40B4-BE49-F238E27FC236}">
+                <a16:creationId xmlns:a16="http://schemas.microsoft.com/office/drawing/2014/main" id="{98FD16FA-1941-5943-A985-018B4C49E7B2}"/>
+              </a:ext>
+            </a:extLst>
+          </p:cNvPr>
+          <p:cNvSpPr/>
+          <p:nvPr/>
+        </p:nvSpPr>
+        <p:spPr>
+          <a:xfrm>
+            <a:off x="2590791" y="4858730"/>
+            <a:ext cx="1093635" cy="236841"/>
+          </a:xfrm>
+          <a:prstGeom prst="rect">
+            <a:avLst/>
+          </a:prstGeom>
+          <a:ln w="19050">
+            <a:solidFill>
+              <a:schemeClr val="accent3"/>
+            </a:solidFill>
+          </a:ln>
+          <a:effectLst/>
+        </p:spPr>
+        <p:style>
+          <a:lnRef idx="1">
+            <a:schemeClr val="accent3"/>
+          </a:lnRef>
+          <a:fillRef idx="2">
+            <a:schemeClr val="accent3"/>
+          </a:fillRef>
+          <a:effectRef idx="1">
+            <a:schemeClr val="accent3"/>
+          </a:effectRef>
+          <a:fontRef idx="minor">
+            <a:schemeClr val="dk1"/>
+          </a:fontRef>
+        </p:style>
+        <p:txBody>
+          <a:bodyPr rtlCol="0" anchor="ctr"/>
+          <a:lstStyle/>
+          <a:p>
+            <a:pPr algn="ctr"/>
+            <a:r>
+              <a:rPr lang="en-US" sz="1050" b="1" dirty="0" err="1">
+                <a:solidFill>
+                  <a:schemeClr val="accent3">
+                    <a:lumMod val="75000"/>
+                  </a:schemeClr>
+                </a:solidFill>
+              </a:rPr>
+              <a:t>TaskListPanel</a:t>
+            </a:r>
+            <a:endParaRPr lang="en-SG" sz="1050" b="1" dirty="0">
+              <a:solidFill>
+                <a:schemeClr val="accent3">
+                  <a:lumMod val="75000"/>
+                </a:schemeClr>
+              </a:solidFill>
+            </a:endParaRPr>
+          </a:p>
+        </p:txBody>
+      </p:sp>
+      <p:sp>
+        <p:nvSpPr>
+          <p:cNvPr id="70" name="Rectangle 11">
+            <a:extLst>
+              <a:ext uri="{FF2B5EF4-FFF2-40B4-BE49-F238E27FC236}">
+                <a16:creationId xmlns:a16="http://schemas.microsoft.com/office/drawing/2014/main" id="{5FD3DD4A-6E14-DC4B-BDAF-AD8D973399B4}"/>
+              </a:ext>
+            </a:extLst>
+          </p:cNvPr>
+          <p:cNvSpPr/>
+          <p:nvPr/>
+        </p:nvSpPr>
+        <p:spPr>
+          <a:xfrm>
+            <a:off x="3837587" y="5095571"/>
+            <a:ext cx="1458015" cy="236841"/>
+          </a:xfrm>
+          <a:prstGeom prst="rect">
+            <a:avLst/>
+          </a:prstGeom>
+          <a:ln w="19050">
+            <a:solidFill>
+              <a:schemeClr val="accent3"/>
+            </a:solidFill>
+          </a:ln>
+          <a:effectLst/>
+        </p:spPr>
+        <p:style>
+          <a:lnRef idx="1">
+            <a:schemeClr val="accent3"/>
+          </a:lnRef>
+          <a:fillRef idx="2">
+            <a:schemeClr val="accent3"/>
+          </a:fillRef>
+          <a:effectRef idx="1">
+            <a:schemeClr val="accent3"/>
+          </a:effectRef>
+          <a:fontRef idx="minor">
+            <a:schemeClr val="dk1"/>
+          </a:fontRef>
+        </p:style>
+        <p:txBody>
+          <a:bodyPr rtlCol="0" anchor="ctr"/>
+          <a:lstStyle/>
+          <a:p>
+            <a:pPr algn="ctr"/>
+            <a:r>
+              <a:rPr lang="en-US" sz="1050" b="1" dirty="0" err="1">
+                <a:solidFill>
+                  <a:schemeClr val="accent3">
+                    <a:lumMod val="75000"/>
+                  </a:schemeClr>
+                </a:solidFill>
+              </a:rPr>
+              <a:t>TaskCard</a:t>
+            </a:r>
+            <a:endParaRPr lang="en-SG" sz="1050" b="1" dirty="0">
+              <a:solidFill>
+                <a:schemeClr val="accent3">
+                  <a:lumMod val="75000"/>
+                </a:schemeClr>
+              </a:solidFill>
+            </a:endParaRPr>
+          </a:p>
+        </p:txBody>
+      </p:sp>
+      <p:cxnSp>
+        <p:nvCxnSpPr>
+          <p:cNvPr id="71" name="Elbow Connector 63">
+            <a:extLst>
+              <a:ext uri="{FF2B5EF4-FFF2-40B4-BE49-F238E27FC236}">
+                <a16:creationId xmlns:a16="http://schemas.microsoft.com/office/drawing/2014/main" id="{B6913EBE-ED48-F14B-BCB4-617B213FC7D4}"/>
+              </a:ext>
+            </a:extLst>
+          </p:cNvPr>
+          <p:cNvCxnSpPr>
+            <a:cxnSpLocks/>
+            <a:endCxn id="70" idx="3"/>
+          </p:cNvCxnSpPr>
+          <p:nvPr/>
+        </p:nvCxnSpPr>
+        <p:spPr>
+          <a:xfrm rot="5400000">
+            <a:off x="4381307" y="4067065"/>
+            <a:ext cx="2061222" cy="232632"/>
+          </a:xfrm>
+          <a:prstGeom prst="bentConnector2">
+            <a:avLst/>
+          </a:prstGeom>
+          <a:ln w="6350">
+            <a:solidFill>
+              <a:schemeClr val="accent3"/>
+            </a:solidFill>
+            <a:headEnd type="none" w="med" len="med"/>
+            <a:tailEnd type="none" w="med" len="med"/>
+          </a:ln>
+          <a:effectLst/>
+        </p:spPr>
+        <p:style>
+          <a:lnRef idx="1">
+            <a:schemeClr val="accent2"/>
+          </a:lnRef>
+          <a:fillRef idx="2">
+            <a:schemeClr val="accent2"/>
+          </a:fillRef>
+          <a:effectRef idx="1">
+            <a:schemeClr val="accent2"/>
+          </a:effectRef>
+          <a:fontRef idx="minor">
+            <a:schemeClr val="dk1"/>
+          </a:fontRef>
+        </p:style>
+      </p:cxnSp>
+      <p:cxnSp>
+        <p:nvCxnSpPr>
+          <p:cNvPr id="72" name="Elbow Connector 71">
+            <a:extLst>
+              <a:ext uri="{FF2B5EF4-FFF2-40B4-BE49-F238E27FC236}">
+                <a16:creationId xmlns:a16="http://schemas.microsoft.com/office/drawing/2014/main" id="{D5D4D218-428D-F847-A4BF-5117CF2EC800}"/>
+              </a:ext>
+            </a:extLst>
+          </p:cNvPr>
+          <p:cNvCxnSpPr>
+            <a:cxnSpLocks/>
+            <a:stCxn id="69" idx="2"/>
+            <a:endCxn id="70" idx="1"/>
+          </p:cNvCxnSpPr>
+          <p:nvPr/>
+        </p:nvCxnSpPr>
+        <p:spPr>
+          <a:xfrm rot="16200000" flipH="1">
+            <a:off x="3428388" y="4804792"/>
+            <a:ext cx="118421" cy="699978"/>
+          </a:xfrm>
+          <a:prstGeom prst="bentConnector2">
+            <a:avLst/>
+          </a:prstGeom>
+          <a:ln w="19050">
+            <a:solidFill>
+              <a:schemeClr val="accent3"/>
+            </a:solidFill>
+            <a:headEnd type="none" w="med" len="med"/>
+            <a:tailEnd type="arrow" w="med" len="med"/>
+          </a:ln>
+          <a:effectLst/>
+        </p:spPr>
+        <p:style>
+          <a:lnRef idx="1">
+            <a:schemeClr val="accent2"/>
+          </a:lnRef>
+          <a:fillRef idx="2">
+            <a:schemeClr val="accent2"/>
+          </a:fillRef>
+          <a:effectRef idx="1">
+            <a:schemeClr val="accent2"/>
+          </a:effectRef>
+          <a:fontRef idx="minor">
+            <a:schemeClr val="dk1"/>
+          </a:fontRef>
+        </p:style>
+      </p:cxnSp>
+      <p:cxnSp>
+        <p:nvCxnSpPr>
+          <p:cNvPr id="75" name="Elbow Connector 63">
+            <a:extLst>
+              <a:ext uri="{FF2B5EF4-FFF2-40B4-BE49-F238E27FC236}">
+                <a16:creationId xmlns:a16="http://schemas.microsoft.com/office/drawing/2014/main" id="{FE8857BB-BE58-034A-BBDD-5D78626DAC81}"/>
+              </a:ext>
+            </a:extLst>
+          </p:cNvPr>
+          <p:cNvCxnSpPr>
+            <a:endCxn id="69" idx="3"/>
+          </p:cNvCxnSpPr>
+          <p:nvPr/>
+        </p:nvCxnSpPr>
+        <p:spPr>
+          <a:xfrm rot="5400000">
+            <a:off x="3694140" y="3143056"/>
+            <a:ext cx="1824381" cy="1843808"/>
+          </a:xfrm>
+          <a:prstGeom prst="bentConnector2">
+            <a:avLst/>
+          </a:prstGeom>
+          <a:ln w="6350">
+            <a:solidFill>
+              <a:schemeClr val="accent3"/>
+            </a:solidFill>
+            <a:headEnd type="none" w="med" len="med"/>
+            <a:tailEnd type="none" w="med" len="med"/>
+          </a:ln>
+          <a:effectLst/>
+        </p:spPr>
+        <p:style>
+          <a:lnRef idx="1">
+            <a:schemeClr val="accent2"/>
+          </a:lnRef>
+          <a:fillRef idx="2">
+            <a:schemeClr val="accent2"/>
+          </a:fillRef>
+          <a:effectRef idx="1">
+            <a:schemeClr val="accent2"/>
+          </a:effectRef>
+          <a:fontRef idx="minor">
+            <a:schemeClr val="dk1"/>
+          </a:fontRef>
+        </p:style>
+      </p:cxnSp>
+      <p:sp>
+        <p:nvSpPr>
+          <p:cNvPr id="76" name="Freeform 75">
+            <a:extLst>
+              <a:ext uri="{FF2B5EF4-FFF2-40B4-BE49-F238E27FC236}">
+                <a16:creationId xmlns:a16="http://schemas.microsoft.com/office/drawing/2014/main" id="{D8DB4A6B-46AB-334F-80CC-C77E22AF49D8}"/>
+              </a:ext>
+            </a:extLst>
+          </p:cNvPr>
+          <p:cNvSpPr/>
+          <p:nvPr/>
+        </p:nvSpPr>
+        <p:spPr>
+          <a:xfrm flipV="1">
+            <a:off x="4113064" y="5339478"/>
+            <a:ext cx="2642195" cy="101600"/>
+          </a:xfrm>
+          <a:custGeom>
+            <a:avLst/>
+            <a:gdLst>
+              <a:gd name="connsiteX0" fmla="*/ 0 w 3048000"/>
+              <a:gd name="connsiteY0" fmla="*/ 203200 h 203200"/>
+              <a:gd name="connsiteX1" fmla="*/ 221673 w 3048000"/>
+              <a:gd name="connsiteY1" fmla="*/ 0 h 203200"/>
+              <a:gd name="connsiteX2" fmla="*/ 3048000 w 3048000"/>
+              <a:gd name="connsiteY2" fmla="*/ 0 h 203200"/>
+            </a:gdLst>
+            <a:ahLst/>
+            <a:cxnLst>
+              <a:cxn ang="0">
+                <a:pos x="connsiteX0" y="connsiteY0"/>
+              </a:cxn>
+              <a:cxn ang="0">
+                <a:pos x="connsiteX1" y="connsiteY1"/>
+              </a:cxn>
+              <a:cxn ang="0">
+                <a:pos x="connsiteX2" y="connsiteY2"/>
+              </a:cxn>
+            </a:cxnLst>
+            <a:rect l="l" t="t" r="r" b="b"/>
+            <a:pathLst>
+              <a:path w="3048000" h="203200">
+                <a:moveTo>
+                  <a:pt x="0" y="203200"/>
+                </a:moveTo>
+                <a:lnTo>
+                  <a:pt x="221673" y="0"/>
+                </a:lnTo>
+                <a:lnTo>
+                  <a:pt x="3048000" y="0"/>
+                </a:lnTo>
+              </a:path>
+            </a:pathLst>
+          </a:custGeom>
+          <a:noFill/>
+          <a:ln w="19050">
+            <a:solidFill>
+              <a:schemeClr val="accent3"/>
+            </a:solidFill>
+            <a:prstDash val="sysDot"/>
+            <a:headEnd type="none" w="med" len="med"/>
+            <a:tailEnd type="arrow" w="med" len="med"/>
+          </a:ln>
+          <a:effectLst/>
+        </p:spPr>
+        <p:style>
+          <a:lnRef idx="1">
+            <a:schemeClr val="accent2"/>
+          </a:lnRef>
+          <a:fillRef idx="2">
+            <a:schemeClr val="accent2"/>
+          </a:fillRef>
+          <a:effectRef idx="1">
+            <a:schemeClr val="accent2"/>
+          </a:effectRef>
+          <a:fontRef idx="minor">
+            <a:schemeClr val="dk1"/>
+          </a:fontRef>
+        </p:style>
+        <p:txBody>
+          <a:bodyPr rtlCol="0" anchor="ctr"/>
+          <a:lstStyle/>
+          <a:p>
+            <a:pPr algn="ctr"/>
+            <a:endParaRPr lang="en-SG"/>
+          </a:p>
+        </p:txBody>
+      </p:sp>
+      <p:cxnSp>
+        <p:nvCxnSpPr>
+          <p:cNvPr id="78" name="Elbow Connector 63">
+            <a:extLst>
+              <a:ext uri="{FF2B5EF4-FFF2-40B4-BE49-F238E27FC236}">
+                <a16:creationId xmlns:a16="http://schemas.microsoft.com/office/drawing/2014/main" id="{DA049ED4-F36C-B649-ADB3-CE254FB64D6F}"/>
+              </a:ext>
+            </a:extLst>
+          </p:cNvPr>
+          <p:cNvCxnSpPr/>
+          <p:nvPr/>
+        </p:nvCxnSpPr>
+        <p:spPr>
+          <a:xfrm rot="16200000" flipH="1">
+            <a:off x="1881813" y="4229484"/>
+            <a:ext cx="1242356" cy="176400"/>
+          </a:xfrm>
+          <a:prstGeom prst="bentConnector2">
+            <a:avLst/>
+          </a:prstGeom>
+          <a:ln w="19050">
+            <a:solidFill>
+              <a:schemeClr val="accent3"/>
+            </a:solidFill>
+            <a:headEnd type="none" w="med" len="med"/>
+            <a:tailEnd type="arrow" w="med" len="med"/>
+          </a:ln>
+          <a:effectLst/>
+        </p:spPr>
+        <p:style>
+          <a:lnRef idx="1">
+            <a:schemeClr val="accent2"/>
+          </a:lnRef>
+          <a:fillRef idx="2">
+            <a:schemeClr val="accent2"/>
+          </a:fillRef>
+          <a:effectRef idx="1">
+            <a:schemeClr val="accent2"/>
+          </a:effectRef>
+          <a:fontRef idx="minor">
+            <a:schemeClr val="dk1"/>
+          </a:fontRef>
+        </p:style>
+      </p:cxnSp>
     </p:spTree>
     <p:extLst>
       <p:ext uri="{BB962C8B-B14F-4D97-AF65-F5344CB8AC3E}">

</xml_diff>

<commit_message>
Fix Ui Component Diagram
</commit_message>
<xml_diff>
--- a/docs/diagrams/UiComponentClassDiagram.pptx
+++ b/docs/diagrams/UiComponentClassDiagram.pptx
@@ -6429,6 +6429,130 @@
           </a:effectRef>
           <a:fontRef idx="minor">
             <a:schemeClr val="dk1"/>
+          </a:fontRef>
+        </p:style>
+      </p:cxnSp>
+      <p:cxnSp>
+        <p:nvCxnSpPr>
+          <p:cNvPr id="57" name="Elbow Connector 63">
+            <a:extLst>
+              <a:ext uri="{FF2B5EF4-FFF2-40B4-BE49-F238E27FC236}">
+                <a16:creationId xmlns:a16="http://schemas.microsoft.com/office/drawing/2014/main" id="{52C15EB4-5679-E443-916F-7737B395DA80}"/>
+              </a:ext>
+            </a:extLst>
+          </p:cNvPr>
+          <p:cNvCxnSpPr>
+            <a:cxnSpLocks/>
+          </p:cNvCxnSpPr>
+          <p:nvPr/>
+        </p:nvCxnSpPr>
+        <p:spPr>
+          <a:xfrm rot="16200000" flipH="1">
+            <a:off x="1738480" y="3657582"/>
+            <a:ext cx="1090215" cy="564104"/>
+          </a:xfrm>
+          <a:prstGeom prst="bentConnector2">
+            <a:avLst/>
+          </a:prstGeom>
+          <a:ln w="19050">
+            <a:solidFill>
+              <a:schemeClr val="accent3"/>
+            </a:solidFill>
+            <a:headEnd type="none" w="med" len="med"/>
+            <a:tailEnd type="arrow" w="med" len="med"/>
+          </a:ln>
+          <a:effectLst/>
+        </p:spPr>
+        <p:style>
+          <a:lnRef idx="1">
+            <a:schemeClr val="accent2"/>
+          </a:lnRef>
+          <a:fillRef idx="2">
+            <a:schemeClr val="accent2"/>
+          </a:fillRef>
+          <a:effectRef idx="1">
+            <a:schemeClr val="accent2"/>
+          </a:effectRef>
+          <a:fontRef idx="minor">
+            <a:schemeClr val="dk1"/>
+          </a:fontRef>
+        </p:style>
+      </p:cxnSp>
+      <p:cxnSp>
+        <p:nvCxnSpPr>
+          <p:cNvPr id="11" name="Straight Connector 10">
+            <a:extLst>
+              <a:ext uri="{FF2B5EF4-FFF2-40B4-BE49-F238E27FC236}">
+                <a16:creationId xmlns:a16="http://schemas.microsoft.com/office/drawing/2014/main" id="{8F3AC83B-3768-DD48-B494-97C6E4BA2073}"/>
+              </a:ext>
+            </a:extLst>
+          </p:cNvPr>
+          <p:cNvCxnSpPr>
+            <a:cxnSpLocks/>
+          </p:cNvCxnSpPr>
+          <p:nvPr/>
+        </p:nvCxnSpPr>
+        <p:spPr>
+          <a:xfrm>
+            <a:off x="4042357" y="4111116"/>
+            <a:ext cx="1487612" cy="0"/>
+          </a:xfrm>
+          <a:prstGeom prst="line">
+            <a:avLst/>
+          </a:prstGeom>
+          <a:ln w="6350"/>
+        </p:spPr>
+        <p:style>
+          <a:lnRef idx="1">
+            <a:schemeClr val="accent3"/>
+          </a:lnRef>
+          <a:fillRef idx="0">
+            <a:schemeClr val="accent3"/>
+          </a:fillRef>
+          <a:effectRef idx="0">
+            <a:schemeClr val="accent3"/>
+          </a:effectRef>
+          <a:fontRef idx="minor">
+            <a:schemeClr val="tx1"/>
+          </a:fontRef>
+        </p:style>
+      </p:cxnSp>
+      <p:cxnSp>
+        <p:nvCxnSpPr>
+          <p:cNvPr id="67" name="Straight Connector 66">
+            <a:extLst>
+              <a:ext uri="{FF2B5EF4-FFF2-40B4-BE49-F238E27FC236}">
+                <a16:creationId xmlns:a16="http://schemas.microsoft.com/office/drawing/2014/main" id="{DB77C6A1-67A2-1E42-8C55-87EE67153327}"/>
+              </a:ext>
+            </a:extLst>
+          </p:cNvPr>
+          <p:cNvCxnSpPr>
+            <a:cxnSpLocks/>
+          </p:cNvCxnSpPr>
+          <p:nvPr/>
+        </p:nvCxnSpPr>
+        <p:spPr>
+          <a:xfrm>
+            <a:off x="3996773" y="4471760"/>
+            <a:ext cx="1533196" cy="0"/>
+          </a:xfrm>
+          <a:prstGeom prst="line">
+            <a:avLst/>
+          </a:prstGeom>
+          <a:ln w="6350"/>
+        </p:spPr>
+        <p:style>
+          <a:lnRef idx="1">
+            <a:schemeClr val="accent3"/>
+          </a:lnRef>
+          <a:fillRef idx="0">
+            <a:schemeClr val="accent3"/>
+          </a:fillRef>
+          <a:effectRef idx="0">
+            <a:schemeClr val="accent3"/>
+          </a:effectRef>
+          <a:fontRef idx="minor">
+            <a:schemeClr val="tx1"/>
           </a:fontRef>
         </p:style>
       </p:cxnSp>

</xml_diff>

<commit_message>
Update diagram and use case.
</commit_message>
<xml_diff>
--- a/docs/diagrams/UiComponentClassDiagram.pptx
+++ b/docs/diagrams/UiComponentClassDiagram.pptx
@@ -3450,8 +3450,8 @@
         </p:nvSpPr>
         <p:spPr>
           <a:xfrm>
-            <a:off x="1217465" y="1447800"/>
-            <a:ext cx="4917083" cy="3962400"/>
+            <a:off x="1217465" y="1447799"/>
+            <a:ext cx="4878535" cy="4571991"/>
           </a:xfrm>
           <a:prstGeom prst="roundRect">
             <a:avLst>
@@ -5509,6 +5509,314 @@
           </a:p>
         </p:txBody>
       </p:sp>
+      <p:sp>
+        <p:nvSpPr>
+          <p:cNvPr id="45" name="Rectangle 11">
+            <a:extLst>
+              <a:ext uri="{FF2B5EF4-FFF2-40B4-BE49-F238E27FC236}">
+                <a16:creationId xmlns:a16="http://schemas.microsoft.com/office/drawing/2014/main" id="{91B5E78E-5C7D-46BB-A6A1-6688DF8EF77A}"/>
+              </a:ext>
+            </a:extLst>
+          </p:cNvPr>
+          <p:cNvSpPr/>
+          <p:nvPr/>
+        </p:nvSpPr>
+        <p:spPr>
+          <a:xfrm>
+            <a:off x="2592529" y="5383538"/>
+            <a:ext cx="1093635" cy="236841"/>
+          </a:xfrm>
+          <a:prstGeom prst="rect">
+            <a:avLst/>
+          </a:prstGeom>
+          <a:ln w="19050">
+            <a:solidFill>
+              <a:schemeClr val="accent3"/>
+            </a:solidFill>
+          </a:ln>
+          <a:effectLst/>
+        </p:spPr>
+        <p:style>
+          <a:lnRef idx="1">
+            <a:schemeClr val="accent3"/>
+          </a:lnRef>
+          <a:fillRef idx="2">
+            <a:schemeClr val="accent3"/>
+          </a:fillRef>
+          <a:effectRef idx="1">
+            <a:schemeClr val="accent3"/>
+          </a:effectRef>
+          <a:fontRef idx="minor">
+            <a:schemeClr val="dk1"/>
+          </a:fontRef>
+        </p:style>
+        <p:txBody>
+          <a:bodyPr rtlCol="0" anchor="ctr"/>
+          <a:lstStyle/>
+          <a:p>
+            <a:pPr algn="ctr"/>
+            <a:r>
+              <a:rPr lang="en-US" sz="1050" b="1" dirty="0" err="1">
+                <a:solidFill>
+                  <a:schemeClr val="accent3">
+                    <a:lumMod val="75000"/>
+                  </a:schemeClr>
+                </a:solidFill>
+              </a:rPr>
+              <a:t>HistoryWindow</a:t>
+            </a:r>
+            <a:endParaRPr lang="en-SG" sz="1050" b="1" dirty="0">
+              <a:solidFill>
+                <a:schemeClr val="accent3">
+                  <a:lumMod val="75000"/>
+                </a:schemeClr>
+              </a:solidFill>
+            </a:endParaRPr>
+          </a:p>
+        </p:txBody>
+      </p:sp>
+      <p:sp>
+        <p:nvSpPr>
+          <p:cNvPr id="46" name="Rectangle 11">
+            <a:extLst>
+              <a:ext uri="{FF2B5EF4-FFF2-40B4-BE49-F238E27FC236}">
+                <a16:creationId xmlns:a16="http://schemas.microsoft.com/office/drawing/2014/main" id="{106613AC-26E1-4989-A243-8F53B9002BF7}"/>
+              </a:ext>
+            </a:extLst>
+          </p:cNvPr>
+          <p:cNvSpPr/>
+          <p:nvPr/>
+        </p:nvSpPr>
+        <p:spPr>
+          <a:xfrm>
+            <a:off x="2590799" y="5763930"/>
+            <a:ext cx="1143001" cy="236841"/>
+          </a:xfrm>
+          <a:prstGeom prst="rect">
+            <a:avLst/>
+          </a:prstGeom>
+          <a:ln w="19050">
+            <a:solidFill>
+              <a:schemeClr val="accent3"/>
+            </a:solidFill>
+          </a:ln>
+          <a:effectLst/>
+        </p:spPr>
+        <p:style>
+          <a:lnRef idx="1">
+            <a:schemeClr val="accent3"/>
+          </a:lnRef>
+          <a:fillRef idx="2">
+            <a:schemeClr val="accent3"/>
+          </a:fillRef>
+          <a:effectRef idx="1">
+            <a:schemeClr val="accent3"/>
+          </a:effectRef>
+          <a:fontRef idx="minor">
+            <a:schemeClr val="dk1"/>
+          </a:fontRef>
+        </p:style>
+        <p:txBody>
+          <a:bodyPr rtlCol="0" anchor="ctr"/>
+          <a:lstStyle/>
+          <a:p>
+            <a:pPr algn="ctr"/>
+            <a:r>
+              <a:rPr lang="en-US" sz="1050" b="1" dirty="0" err="1">
+                <a:solidFill>
+                  <a:schemeClr val="accent3">
+                    <a:lumMod val="75000"/>
+                  </a:schemeClr>
+                </a:solidFill>
+              </a:rPr>
+              <a:t>AboutUsWindow</a:t>
+            </a:r>
+            <a:endParaRPr lang="en-SG" sz="1050" b="1" dirty="0">
+              <a:solidFill>
+                <a:schemeClr val="accent3">
+                  <a:lumMod val="75000"/>
+                </a:schemeClr>
+              </a:solidFill>
+            </a:endParaRPr>
+          </a:p>
+        </p:txBody>
+      </p:sp>
+      <p:cxnSp>
+        <p:nvCxnSpPr>
+          <p:cNvPr id="48" name="Elbow Connector 63">
+            <a:extLst>
+              <a:ext uri="{FF2B5EF4-FFF2-40B4-BE49-F238E27FC236}">
+                <a16:creationId xmlns:a16="http://schemas.microsoft.com/office/drawing/2014/main" id="{F4349893-4B28-4808-8AC7-8690387517FC}"/>
+              </a:ext>
+            </a:extLst>
+          </p:cNvPr>
+          <p:cNvCxnSpPr/>
+          <p:nvPr/>
+        </p:nvCxnSpPr>
+        <p:spPr>
+          <a:xfrm rot="16200000" flipH="1">
+            <a:off x="1184947" y="4074978"/>
+            <a:ext cx="2396440" cy="420377"/>
+          </a:xfrm>
+          <a:prstGeom prst="bentConnector2">
+            <a:avLst/>
+          </a:prstGeom>
+          <a:ln w="19050">
+            <a:solidFill>
+              <a:schemeClr val="accent3"/>
+            </a:solidFill>
+            <a:headEnd type="none" w="med" len="med"/>
+            <a:tailEnd type="arrow" w="med" len="med"/>
+          </a:ln>
+          <a:effectLst/>
+        </p:spPr>
+        <p:style>
+          <a:lnRef idx="1">
+            <a:schemeClr val="accent2"/>
+          </a:lnRef>
+          <a:fillRef idx="2">
+            <a:schemeClr val="accent2"/>
+          </a:fillRef>
+          <a:effectRef idx="1">
+            <a:schemeClr val="accent2"/>
+          </a:effectRef>
+          <a:fontRef idx="minor">
+            <a:schemeClr val="dk1"/>
+          </a:fontRef>
+        </p:style>
+      </p:cxnSp>
+      <p:cxnSp>
+        <p:nvCxnSpPr>
+          <p:cNvPr id="49" name="Elbow Connector 63">
+            <a:extLst>
+              <a:ext uri="{FF2B5EF4-FFF2-40B4-BE49-F238E27FC236}">
+                <a16:creationId xmlns:a16="http://schemas.microsoft.com/office/drawing/2014/main" id="{3EB59816-08AA-4DA7-B3BA-75A4F9AF9021}"/>
+              </a:ext>
+            </a:extLst>
+          </p:cNvPr>
+          <p:cNvCxnSpPr/>
+          <p:nvPr/>
+        </p:nvCxnSpPr>
+        <p:spPr>
+          <a:xfrm rot="16200000" flipH="1">
+            <a:off x="1184946" y="4488029"/>
+            <a:ext cx="2396440" cy="420377"/>
+          </a:xfrm>
+          <a:prstGeom prst="bentConnector2">
+            <a:avLst/>
+          </a:prstGeom>
+          <a:ln w="19050">
+            <a:solidFill>
+              <a:schemeClr val="accent3"/>
+            </a:solidFill>
+            <a:headEnd type="none" w="med" len="med"/>
+            <a:tailEnd type="arrow" w="med" len="med"/>
+          </a:ln>
+          <a:effectLst/>
+        </p:spPr>
+        <p:style>
+          <a:lnRef idx="1">
+            <a:schemeClr val="accent2"/>
+          </a:lnRef>
+          <a:fillRef idx="2">
+            <a:schemeClr val="accent2"/>
+          </a:fillRef>
+          <a:effectRef idx="1">
+            <a:schemeClr val="accent2"/>
+          </a:effectRef>
+          <a:fontRef idx="minor">
+            <a:schemeClr val="dk1"/>
+          </a:fontRef>
+        </p:style>
+      </p:cxnSp>
+      <p:cxnSp>
+        <p:nvCxnSpPr>
+          <p:cNvPr id="51" name="Elbow Connector 63">
+            <a:extLst>
+              <a:ext uri="{FF2B5EF4-FFF2-40B4-BE49-F238E27FC236}">
+                <a16:creationId xmlns:a16="http://schemas.microsoft.com/office/drawing/2014/main" id="{630DEDD8-A9A0-4049-8DB6-A2D6064087A7}"/>
+              </a:ext>
+            </a:extLst>
+          </p:cNvPr>
+          <p:cNvCxnSpPr/>
+          <p:nvPr/>
+        </p:nvCxnSpPr>
+        <p:spPr>
+          <a:xfrm rot="5400000">
+            <a:off x="3208855" y="3197988"/>
+            <a:ext cx="2798421" cy="1843806"/>
+          </a:xfrm>
+          <a:prstGeom prst="bentConnector2">
+            <a:avLst/>
+          </a:prstGeom>
+          <a:ln w="6350">
+            <a:solidFill>
+              <a:schemeClr val="accent3"/>
+            </a:solidFill>
+            <a:headEnd type="none" w="med" len="med"/>
+            <a:tailEnd type="none" w="med" len="med"/>
+          </a:ln>
+          <a:effectLst/>
+        </p:spPr>
+        <p:style>
+          <a:lnRef idx="1">
+            <a:schemeClr val="accent2"/>
+          </a:lnRef>
+          <a:fillRef idx="2">
+            <a:schemeClr val="accent2"/>
+          </a:fillRef>
+          <a:effectRef idx="1">
+            <a:schemeClr val="accent2"/>
+          </a:effectRef>
+          <a:fontRef idx="minor">
+            <a:schemeClr val="dk1"/>
+          </a:fontRef>
+        </p:style>
+      </p:cxnSp>
+      <p:cxnSp>
+        <p:nvCxnSpPr>
+          <p:cNvPr id="52" name="Elbow Connector 63">
+            <a:extLst>
+              <a:ext uri="{FF2B5EF4-FFF2-40B4-BE49-F238E27FC236}">
+                <a16:creationId xmlns:a16="http://schemas.microsoft.com/office/drawing/2014/main" id="{2E08B5F2-6446-47E2-B82D-310A4DE15F31}"/>
+              </a:ext>
+            </a:extLst>
+          </p:cNvPr>
+          <p:cNvCxnSpPr/>
+          <p:nvPr/>
+        </p:nvCxnSpPr>
+        <p:spPr>
+          <a:xfrm rot="5400000">
+            <a:off x="3208855" y="3532012"/>
+            <a:ext cx="2798421" cy="1843806"/>
+          </a:xfrm>
+          <a:prstGeom prst="bentConnector2">
+            <a:avLst/>
+          </a:prstGeom>
+          <a:ln w="6350">
+            <a:solidFill>
+              <a:schemeClr val="accent3"/>
+            </a:solidFill>
+            <a:headEnd type="none" w="med" len="med"/>
+            <a:tailEnd type="none" w="med" len="med"/>
+          </a:ln>
+          <a:effectLst/>
+        </p:spPr>
+        <p:style>
+          <a:lnRef idx="1">
+            <a:schemeClr val="accent2"/>
+          </a:lnRef>
+          <a:fillRef idx="2">
+            <a:schemeClr val="accent2"/>
+          </a:fillRef>
+          <a:effectRef idx="1">
+            <a:schemeClr val="accent2"/>
+          </a:effectRef>
+          <a:fontRef idx="minor">
+            <a:schemeClr val="dk1"/>
+          </a:fontRef>
+        </p:style>
+      </p:cxnSp>
     </p:spTree>
     <p:extLst>
       <p:ext uri="{BB962C8B-B14F-4D97-AF65-F5344CB8AC3E}">

</xml_diff>